<commit_message>
Forcefully dismiss the GDPR/CCPA overlays if they exist in DOM
</commit_message>
<xml_diff>
--- a/SolutionArchitecture.pptx
+++ b/SolutionArchitecture.pptx
@@ -104,6 +104,11 @@
       </a:defRPr>
     </a:lvl9pPr>
   </p:defaultTextStyle>
+  <p:extLst>
+    <p:ext uri="{EFAFB233-063F-42B5-8137-9DF3F51BA10A}">
+      <p15:sldGuideLst xmlns:p15="http://schemas.microsoft.com/office/powerpoint/2012/main"/>
+    </p:ext>
+  </p:extLst>
 </p:presentation>
 </file>
 
@@ -3335,15 +3340,25 @@
         </p:nvSpPr>
         <p:spPr>
           <a:xfrm>
-            <a:off x="7626101" y="4648200"/>
+            <a:off x="9887776" y="4645222"/>
             <a:ext cx="1895939" cy="1169101"/>
           </a:xfrm>
           <a:prstGeom prst="rect">
             <a:avLst/>
           </a:prstGeom>
           <a:solidFill>
-            <a:schemeClr val="bg1"/>
+            <a:schemeClr val="accent4">
+              <a:lumMod val="20000"/>
+              <a:lumOff val="80000"/>
+            </a:schemeClr>
           </a:solidFill>
+          <a:effectLst>
+            <a:outerShdw blurRad="50800" dist="38100" dir="2700000" algn="tl" rotWithShape="0">
+              <a:prstClr val="black">
+                <a:alpha val="40000"/>
+              </a:prstClr>
+            </a:outerShdw>
+          </a:effectLst>
         </p:spPr>
         <p:style>
           <a:lnRef idx="2">
@@ -3394,8 +3409,8 @@
         </p:nvSpPr>
         <p:spPr>
           <a:xfrm>
-            <a:off x="4798504" y="2824247"/>
-            <a:ext cx="5794058" cy="1519153"/>
+            <a:off x="5798612" y="2667000"/>
+            <a:ext cx="5364764" cy="1519153"/>
           </a:xfrm>
           <a:prstGeom prst="roundRect">
             <a:avLst>
@@ -3424,13 +3439,18 @@
           <a:p>
             <a:pPr algn="ctr"/>
             <a:r>
-              <a:rPr lang="en-US" sz="1600" b="1" dirty="0">
+              <a:rPr lang="en-US" sz="1600" b="1" dirty="0" err="1">
                 <a:latin typeface="Calibri" panose="020F0502020204030204" pitchFamily="34" charset="0"/>
                 <a:ea typeface="Calibri" panose="020F0502020204030204" pitchFamily="34" charset="0"/>
                 <a:cs typeface="Calibri" panose="020F0502020204030204" pitchFamily="34" charset="0"/>
               </a:rPr>
-              <a:t>Infrastructure as Code (IAC)</a:t>
-            </a:r>
+              <a:t>IaC</a:t>
+            </a:r>
+            <a:endParaRPr lang="en-US" sz="1600" b="1" dirty="0">
+              <a:latin typeface="Calibri" panose="020F0502020204030204" pitchFamily="34" charset="0"/>
+              <a:ea typeface="Calibri" panose="020F0502020204030204" pitchFamily="34" charset="0"/>
+              <a:cs typeface="Calibri" panose="020F0502020204030204" pitchFamily="34" charset="0"/>
+            </a:endParaRPr>
           </a:p>
         </p:txBody>
       </p:sp>
@@ -3455,8 +3475,18 @@
             <a:avLst/>
           </a:prstGeom>
           <a:solidFill>
-            <a:schemeClr val="bg1"/>
+            <a:schemeClr val="accent4">
+              <a:lumMod val="20000"/>
+              <a:lumOff val="80000"/>
+            </a:schemeClr>
           </a:solidFill>
+          <a:effectLst>
+            <a:outerShdw blurRad="50800" dist="38100" dir="2700000" algn="tl" rotWithShape="0">
+              <a:prstClr val="black">
+                <a:alpha val="40000"/>
+              </a:prstClr>
+            </a:outerShdw>
+          </a:effectLst>
         </p:spPr>
         <p:style>
           <a:lnRef idx="2">
@@ -3569,7 +3599,7 @@
         </p:blipFill>
         <p:spPr bwMode="auto">
           <a:xfrm>
-            <a:off x="4798504" y="1668732"/>
+            <a:off x="4914223" y="1668732"/>
             <a:ext cx="533400" cy="533400"/>
           </a:xfrm>
           <a:prstGeom prst="rect">
@@ -3601,7 +3631,7 @@
         </p:nvSpPr>
         <p:spPr>
           <a:xfrm>
-            <a:off x="4628048" y="1167071"/>
+            <a:off x="4743767" y="1167071"/>
             <a:ext cx="907542" cy="523220"/>
           </a:xfrm>
           <a:prstGeom prst="rect">
@@ -3656,7 +3686,7 @@
         </p:blipFill>
         <p:spPr bwMode="auto">
           <a:xfrm>
-            <a:off x="3591496" y="1650799"/>
+            <a:off x="3707215" y="1650799"/>
             <a:ext cx="576072" cy="576072"/>
           </a:xfrm>
           <a:prstGeom prst="rect">
@@ -3688,7 +3718,7 @@
         </p:nvSpPr>
         <p:spPr>
           <a:xfrm>
-            <a:off x="3438662" y="1185207"/>
+            <a:off x="3554381" y="1185207"/>
             <a:ext cx="907542" cy="523220"/>
           </a:xfrm>
           <a:prstGeom prst="rect">
@@ -3743,7 +3773,7 @@
         </p:blipFill>
         <p:spPr bwMode="auto">
           <a:xfrm>
-            <a:off x="2420112" y="1697307"/>
+            <a:off x="2432685" y="1697307"/>
             <a:ext cx="475488" cy="475488"/>
           </a:xfrm>
           <a:prstGeom prst="rect">
@@ -3775,8 +3805,8 @@
         </p:nvSpPr>
         <p:spPr>
           <a:xfrm>
-            <a:off x="2204085" y="1167071"/>
-            <a:ext cx="907542" cy="523220"/>
+            <a:off x="2270723" y="1380365"/>
+            <a:ext cx="907542" cy="307777"/>
           </a:xfrm>
           <a:prstGeom prst="rect">
             <a:avLst/>
@@ -3799,17 +3829,6 @@
               <a:t>VS Code</a:t>
             </a:r>
           </a:p>
-          <a:p>
-            <a:pPr algn="ctr"/>
-            <a:r>
-              <a:rPr lang="en-US" sz="1400" dirty="0">
-                <a:latin typeface="Calibri" panose="020F0502020204030204" pitchFamily="34" charset="0"/>
-                <a:ea typeface="Calibri" panose="020F0502020204030204" pitchFamily="34" charset="0"/>
-                <a:cs typeface="Calibri" panose="020F0502020204030204" pitchFamily="34" charset="0"/>
-              </a:rPr>
-              <a:t>IDE</a:t>
-            </a:r>
-          </a:p>
         </p:txBody>
       </p:sp>
       <p:cxnSp>
@@ -3829,7 +3848,7 @@
         </p:nvCxnSpPr>
         <p:spPr>
           <a:xfrm>
-            <a:off x="1848231" y="1935051"/>
+            <a:off x="1860804" y="1935051"/>
             <a:ext cx="571881" cy="0"/>
           </a:xfrm>
           <a:prstGeom prst="straightConnector1">
@@ -3872,8 +3891,8 @@
         </p:nvCxnSpPr>
         <p:spPr>
           <a:xfrm>
-            <a:off x="2895600" y="1935051"/>
-            <a:ext cx="695896" cy="3784"/>
+            <a:off x="2908173" y="1935051"/>
+            <a:ext cx="799042" cy="3784"/>
           </a:xfrm>
           <a:prstGeom prst="straightConnector1">
             <a:avLst/>
@@ -3915,7 +3934,7 @@
         </p:nvCxnSpPr>
         <p:spPr>
           <a:xfrm flipV="1">
-            <a:off x="4167568" y="1935432"/>
+            <a:off x="4283287" y="1935432"/>
             <a:ext cx="630936" cy="3403"/>
           </a:xfrm>
           <a:prstGeom prst="straightConnector1">
@@ -3954,7 +3973,7 @@
           </p:cNvPicPr>
           <p:nvPr/>
         </p:nvPicPr>
-        <p:blipFill>
+        <p:blipFill rotWithShape="1">
           <a:blip r:embed="rId6">
             <a:extLst>
               <a:ext uri="{28A0092B-C50C-407E-A947-70E740481C1C}">
@@ -3962,15 +3981,13 @@
               </a:ext>
             </a:extLst>
           </a:blip>
-          <a:srcRect/>
-          <a:stretch>
-            <a:fillRect/>
-          </a:stretch>
+          <a:srcRect b="18487"/>
+          <a:stretch/>
         </p:blipFill>
         <p:spPr bwMode="auto">
           <a:xfrm>
-            <a:off x="5895593" y="1557835"/>
-            <a:ext cx="754432" cy="754432"/>
+            <a:off x="5898444" y="1628338"/>
+            <a:ext cx="754432" cy="614960"/>
           </a:xfrm>
           <a:prstGeom prst="rect">
             <a:avLst/>
@@ -4004,9 +4021,9 @@
           <p:nvPr/>
         </p:nvCxnSpPr>
         <p:spPr>
-          <a:xfrm flipV="1">
-            <a:off x="5331904" y="1935051"/>
-            <a:ext cx="563689" cy="381"/>
+          <a:xfrm>
+            <a:off x="5447623" y="1935432"/>
+            <a:ext cx="450821" cy="386"/>
           </a:xfrm>
           <a:prstGeom prst="straightConnector1">
             <a:avLst/>
@@ -4044,7 +4061,7 @@
         </p:nvSpPr>
         <p:spPr>
           <a:xfrm>
-            <a:off x="5742483" y="1220927"/>
+            <a:off x="5764181" y="1220927"/>
             <a:ext cx="907542" cy="523220"/>
           </a:xfrm>
           <a:prstGeom prst="rect">
@@ -4083,10 +4100,10 @@
       </p:sp>
       <p:pic>
         <p:nvPicPr>
-          <p:cNvPr id="1036" name="Picture 12" descr="Amazon ECR | AWS Compute">
-            <a:extLst>
-              <a:ext uri="{FF2B5EF4-FFF2-40B4-BE49-F238E27FC236}">
-                <a16:creationId xmlns:a16="http://schemas.microsoft.com/office/drawing/2014/main" id="{BF3CD309-1E68-641B-7A1A-D0982D1C69D6}"/>
+          <p:cNvPr id="1038" name="Picture 14" descr="terraform&quot; Icon - Download for free – Iconduck">
+            <a:extLst>
+              <a:ext uri="{FF2B5EF4-FFF2-40B4-BE49-F238E27FC236}">
+                <a16:creationId xmlns:a16="http://schemas.microsoft.com/office/drawing/2014/main" id="{5CC8CA65-62F7-16DF-CA8E-729786397C75}"/>
               </a:ext>
             </a:extLst>
           </p:cNvPr>
@@ -4110,8 +4127,8 @@
         </p:blipFill>
         <p:spPr bwMode="auto">
           <a:xfrm>
-            <a:off x="7433454" y="1685437"/>
-            <a:ext cx="534162" cy="534162"/>
+            <a:off x="4533713" y="3087674"/>
+            <a:ext cx="600395" cy="682016"/>
           </a:xfrm>
           <a:prstGeom prst="rect">
             <a:avLst/>
@@ -4128,106 +4145,12 @@
           </a:extLst>
         </p:spPr>
       </p:pic>
-      <p:cxnSp>
-        <p:nvCxnSpPr>
-          <p:cNvPr id="29" name="Straight Arrow Connector 28">
-            <a:extLst>
-              <a:ext uri="{FF2B5EF4-FFF2-40B4-BE49-F238E27FC236}">
-                <a16:creationId xmlns:a16="http://schemas.microsoft.com/office/drawing/2014/main" id="{189B1ADF-5309-A09B-5F1E-B4360A3142CE}"/>
-              </a:ext>
-            </a:extLst>
-          </p:cNvPr>
-          <p:cNvCxnSpPr>
-            <a:cxnSpLocks/>
-            <a:stCxn id="1034" idx="3"/>
-            <a:endCxn id="1036" idx="1"/>
-          </p:cNvCxnSpPr>
-          <p:nvPr/>
-        </p:nvCxnSpPr>
-        <p:spPr>
-          <a:xfrm>
-            <a:off x="6650025" y="1935051"/>
-            <a:ext cx="783429" cy="17467"/>
-          </a:xfrm>
-          <a:prstGeom prst="straightConnector1">
-            <a:avLst/>
-          </a:prstGeom>
-          <a:ln>
-            <a:tailEnd type="triangle"/>
-          </a:ln>
-        </p:spPr>
-        <p:style>
-          <a:lnRef idx="2">
-            <a:schemeClr val="accent1"/>
-          </a:lnRef>
-          <a:fillRef idx="0">
-            <a:schemeClr val="accent1"/>
-          </a:fillRef>
-          <a:effectRef idx="1">
-            <a:schemeClr val="accent1"/>
-          </a:effectRef>
-          <a:fontRef idx="minor">
-            <a:schemeClr val="tx1"/>
-          </a:fontRef>
-        </p:style>
-      </p:cxnSp>
-      <p:sp>
-        <p:nvSpPr>
-          <p:cNvPr id="33" name="TextBox 32">
-            <a:extLst>
-              <a:ext uri="{FF2B5EF4-FFF2-40B4-BE49-F238E27FC236}">
-                <a16:creationId xmlns:a16="http://schemas.microsoft.com/office/drawing/2014/main" id="{14AABD2C-B364-5395-D2ED-2AB31237BB61}"/>
-              </a:ext>
-            </a:extLst>
-          </p:cNvPr>
-          <p:cNvSpPr txBox="1"/>
-          <p:nvPr/>
-        </p:nvSpPr>
-        <p:spPr>
-          <a:xfrm>
-            <a:off x="7264235" y="1171337"/>
-            <a:ext cx="907542" cy="523220"/>
-          </a:xfrm>
-          <a:prstGeom prst="rect">
-            <a:avLst/>
-          </a:prstGeom>
-          <a:noFill/>
-        </p:spPr>
-        <p:txBody>
-          <a:bodyPr wrap="square" rtlCol="0">
-            <a:spAutoFit/>
-          </a:bodyPr>
-          <a:lstStyle/>
-          <a:p>
-            <a:pPr algn="ctr"/>
-            <a:r>
-              <a:rPr lang="en-US" sz="1400" dirty="0">
-                <a:latin typeface="Calibri" panose="020F0502020204030204" pitchFamily="34" charset="0"/>
-                <a:ea typeface="Calibri" panose="020F0502020204030204" pitchFamily="34" charset="0"/>
-                <a:cs typeface="Calibri" panose="020F0502020204030204" pitchFamily="34" charset="0"/>
-              </a:rPr>
-              <a:t>ECR</a:t>
-            </a:r>
-          </a:p>
-          <a:p>
-            <a:pPr algn="ctr"/>
-            <a:r>
-              <a:rPr lang="en-US" sz="1400" dirty="0">
-                <a:latin typeface="Calibri" panose="020F0502020204030204" pitchFamily="34" charset="0"/>
-                <a:ea typeface="Calibri" panose="020F0502020204030204" pitchFamily="34" charset="0"/>
-                <a:cs typeface="Calibri" panose="020F0502020204030204" pitchFamily="34" charset="0"/>
-              </a:rPr>
-              <a:t>Image</a:t>
-            </a:r>
-          </a:p>
-        </p:txBody>
-      </p:sp>
       <p:pic>
         <p:nvPicPr>
-          <p:cNvPr id="1038" name="Picture 14" descr="terraform&quot; Icon - Download for free – Iconduck">
-            <a:extLst>
-              <a:ext uri="{FF2B5EF4-FFF2-40B4-BE49-F238E27FC236}">
-                <a16:creationId xmlns:a16="http://schemas.microsoft.com/office/drawing/2014/main" id="{5CC8CA65-62F7-16DF-CA8E-729786397C75}"/>
+          <p:cNvPr id="1040" name="Picture 16" descr="Playwright icon - Free Download PNG &amp; SVG | Streamline">
+            <a:extLst>
+              <a:ext uri="{FF2B5EF4-FFF2-40B4-BE49-F238E27FC236}">
+                <a16:creationId xmlns:a16="http://schemas.microsoft.com/office/drawing/2014/main" id="{0E0BD699-002E-169C-8197-0AA77DBDB3E1}"/>
               </a:ext>
             </a:extLst>
           </p:cNvPr>
@@ -4251,8 +4174,8 @@
         </p:blipFill>
         <p:spPr bwMode="auto">
           <a:xfrm>
-            <a:off x="3533606" y="3244921"/>
-            <a:ext cx="600395" cy="682016"/>
+            <a:off x="821137" y="2344508"/>
+            <a:ext cx="682016" cy="682016"/>
           </a:xfrm>
           <a:prstGeom prst="rect">
             <a:avLst/>
@@ -4269,12 +4192,92 @@
           </a:extLst>
         </p:spPr>
       </p:pic>
+      <p:sp>
+        <p:nvSpPr>
+          <p:cNvPr id="36" name="TextBox 35">
+            <a:extLst>
+              <a:ext uri="{FF2B5EF4-FFF2-40B4-BE49-F238E27FC236}">
+                <a16:creationId xmlns:a16="http://schemas.microsoft.com/office/drawing/2014/main" id="{EFA5496C-FF0C-FEEB-A77F-81EBBA8785F8}"/>
+              </a:ext>
+            </a:extLst>
+          </p:cNvPr>
+          <p:cNvSpPr txBox="1"/>
+          <p:nvPr/>
+        </p:nvSpPr>
+        <p:spPr>
+          <a:xfrm>
+            <a:off x="657430" y="2932215"/>
+            <a:ext cx="1009430" cy="307777"/>
+          </a:xfrm>
+          <a:prstGeom prst="rect">
+            <a:avLst/>
+          </a:prstGeom>
+          <a:noFill/>
+        </p:spPr>
+        <p:txBody>
+          <a:bodyPr wrap="square" rtlCol="0">
+            <a:spAutoFit/>
+          </a:bodyPr>
+          <a:lstStyle/>
+          <a:p>
+            <a:pPr algn="ctr"/>
+            <a:r>
+              <a:rPr lang="en-US" sz="1400" dirty="0">
+                <a:latin typeface="Calibri" panose="020F0502020204030204" pitchFamily="34" charset="0"/>
+                <a:ea typeface="Calibri" panose="020F0502020204030204" pitchFamily="34" charset="0"/>
+                <a:cs typeface="Calibri" panose="020F0502020204030204" pitchFamily="34" charset="0"/>
+              </a:rPr>
+              <a:t>Playwright</a:t>
+            </a:r>
+          </a:p>
+        </p:txBody>
+      </p:sp>
+      <p:sp>
+        <p:nvSpPr>
+          <p:cNvPr id="37" name="TextBox 36">
+            <a:extLst>
+              <a:ext uri="{FF2B5EF4-FFF2-40B4-BE49-F238E27FC236}">
+                <a16:creationId xmlns:a16="http://schemas.microsoft.com/office/drawing/2014/main" id="{96B7F055-FC1D-A079-FF00-54B9EA6554A6}"/>
+              </a:ext>
+            </a:extLst>
+          </p:cNvPr>
+          <p:cNvSpPr txBox="1"/>
+          <p:nvPr/>
+        </p:nvSpPr>
+        <p:spPr>
+          <a:xfrm>
+            <a:off x="657430" y="2115522"/>
+            <a:ext cx="1009430" cy="307777"/>
+          </a:xfrm>
+          <a:prstGeom prst="rect">
+            <a:avLst/>
+          </a:prstGeom>
+          <a:noFill/>
+        </p:spPr>
+        <p:txBody>
+          <a:bodyPr wrap="square" rtlCol="0">
+            <a:spAutoFit/>
+          </a:bodyPr>
+          <a:lstStyle/>
+          <a:p>
+            <a:pPr algn="ctr"/>
+            <a:r>
+              <a:rPr lang="en-US" sz="1400" dirty="0">
+                <a:latin typeface="Calibri" panose="020F0502020204030204" pitchFamily="34" charset="0"/>
+                <a:ea typeface="Calibri" panose="020F0502020204030204" pitchFamily="34" charset="0"/>
+                <a:cs typeface="Calibri" panose="020F0502020204030204" pitchFamily="34" charset="0"/>
+              </a:rPr>
+              <a:t>Python</a:t>
+            </a:r>
+          </a:p>
+        </p:txBody>
+      </p:sp>
       <p:pic>
         <p:nvPicPr>
-          <p:cNvPr id="1040" name="Picture 16" descr="Playwright icon - Free Download PNG &amp; SVG | Streamline">
-            <a:extLst>
-              <a:ext uri="{FF2B5EF4-FFF2-40B4-BE49-F238E27FC236}">
-                <a16:creationId xmlns:a16="http://schemas.microsoft.com/office/drawing/2014/main" id="{0E0BD699-002E-169C-8197-0AA77DBDB3E1}"/>
+          <p:cNvPr id="1042" name="Picture 18" descr="GitHub Actions SVG and transparent PNG icons | TechIcons">
+            <a:extLst>
+              <a:ext uri="{FF2B5EF4-FFF2-40B4-BE49-F238E27FC236}">
+                <a16:creationId xmlns:a16="http://schemas.microsoft.com/office/drawing/2014/main" id="{F0AB6D14-A7DA-224C-8BDF-126A49D477F5}"/>
               </a:ext>
             </a:extLst>
           </p:cNvPr>
@@ -4298,8 +4301,8 @@
         </p:blipFill>
         <p:spPr bwMode="auto">
           <a:xfrm>
-            <a:off x="821137" y="2344508"/>
-            <a:ext cx="682016" cy="682016"/>
+            <a:off x="911372" y="3614398"/>
+            <a:ext cx="517805" cy="517805"/>
           </a:xfrm>
           <a:prstGeom prst="rect">
             <a:avLst/>
@@ -4318,10 +4321,10 @@
       </p:pic>
       <p:sp>
         <p:nvSpPr>
-          <p:cNvPr id="36" name="TextBox 35">
-            <a:extLst>
-              <a:ext uri="{FF2B5EF4-FFF2-40B4-BE49-F238E27FC236}">
-                <a16:creationId xmlns:a16="http://schemas.microsoft.com/office/drawing/2014/main" id="{EFA5496C-FF0C-FEEB-A77F-81EBBA8785F8}"/>
+          <p:cNvPr id="39" name="TextBox 38">
+            <a:extLst>
+              <a:ext uri="{FF2B5EF4-FFF2-40B4-BE49-F238E27FC236}">
+                <a16:creationId xmlns:a16="http://schemas.microsoft.com/office/drawing/2014/main" id="{A7842FB3-7F63-E19D-0132-8B9C4FEB3782}"/>
               </a:ext>
             </a:extLst>
           </p:cNvPr>
@@ -4330,8 +4333,8 @@
         </p:nvSpPr>
         <p:spPr>
           <a:xfrm>
-            <a:off x="657430" y="2932215"/>
-            <a:ext cx="1009430" cy="307777"/>
+            <a:off x="665559" y="4153799"/>
+            <a:ext cx="1009430" cy="523220"/>
           </a:xfrm>
           <a:prstGeom prst="rect">
             <a:avLst/>
@@ -4351,57 +4354,17 @@
                 <a:ea typeface="Calibri" panose="020F0502020204030204" pitchFamily="34" charset="0"/>
                 <a:cs typeface="Calibri" panose="020F0502020204030204" pitchFamily="34" charset="0"/>
               </a:rPr>
-              <a:t>Playwright</a:t>
-            </a:r>
-          </a:p>
-        </p:txBody>
-      </p:sp>
-      <p:sp>
-        <p:nvSpPr>
-          <p:cNvPr id="37" name="TextBox 36">
-            <a:extLst>
-              <a:ext uri="{FF2B5EF4-FFF2-40B4-BE49-F238E27FC236}">
-                <a16:creationId xmlns:a16="http://schemas.microsoft.com/office/drawing/2014/main" id="{96B7F055-FC1D-A079-FF00-54B9EA6554A6}"/>
-              </a:ext>
-            </a:extLst>
-          </p:cNvPr>
-          <p:cNvSpPr txBox="1"/>
-          <p:nvPr/>
-        </p:nvSpPr>
-        <p:spPr>
-          <a:xfrm>
-            <a:off x="657430" y="2115522"/>
-            <a:ext cx="1009430" cy="307777"/>
-          </a:xfrm>
-          <a:prstGeom prst="rect">
-            <a:avLst/>
-          </a:prstGeom>
-          <a:noFill/>
-        </p:spPr>
-        <p:txBody>
-          <a:bodyPr wrap="square" rtlCol="0">
-            <a:spAutoFit/>
-          </a:bodyPr>
-          <a:lstStyle/>
-          <a:p>
-            <a:pPr algn="ctr"/>
-            <a:r>
-              <a:rPr lang="en-US" sz="1400" dirty="0">
-                <a:latin typeface="Calibri" panose="020F0502020204030204" pitchFamily="34" charset="0"/>
-                <a:ea typeface="Calibri" panose="020F0502020204030204" pitchFamily="34" charset="0"/>
-                <a:cs typeface="Calibri" panose="020F0502020204030204" pitchFamily="34" charset="0"/>
-              </a:rPr>
-              <a:t>Python</a:t>
+              <a:t>GitHub Workflow</a:t>
             </a:r>
           </a:p>
         </p:txBody>
       </p:sp>
       <p:pic>
         <p:nvPicPr>
-          <p:cNvPr id="1042" name="Picture 18" descr="GitHub Actions SVG and transparent PNG icons | TechIcons">
-            <a:extLst>
-              <a:ext uri="{FF2B5EF4-FFF2-40B4-BE49-F238E27FC236}">
-                <a16:creationId xmlns:a16="http://schemas.microsoft.com/office/drawing/2014/main" id="{F0AB6D14-A7DA-224C-8BDF-126A49D477F5}"/>
+          <p:cNvPr id="1044" name="Picture 20" descr="Auth0&quot; Icon - Download for free – Iconduck">
+            <a:extLst>
+              <a:ext uri="{FF2B5EF4-FFF2-40B4-BE49-F238E27FC236}">
+                <a16:creationId xmlns:a16="http://schemas.microsoft.com/office/drawing/2014/main" id="{0D04FA19-5FDD-C8D9-C547-EBFE8FEB3C00}"/>
               </a:ext>
             </a:extLst>
           </p:cNvPr>
@@ -4425,8 +4388,8 @@
         </p:blipFill>
         <p:spPr bwMode="auto">
           <a:xfrm>
-            <a:off x="911372" y="3614398"/>
-            <a:ext cx="517805" cy="517805"/>
+            <a:off x="4516659" y="4919166"/>
+            <a:ext cx="545253" cy="609600"/>
           </a:xfrm>
           <a:prstGeom prst="rect">
             <a:avLst/>
@@ -4443,12 +4406,55 @@
           </a:extLst>
         </p:spPr>
       </p:pic>
-      <p:sp>
-        <p:nvSpPr>
-          <p:cNvPr id="39" name="TextBox 38">
-            <a:extLst>
-              <a:ext uri="{FF2B5EF4-FFF2-40B4-BE49-F238E27FC236}">
-                <a16:creationId xmlns:a16="http://schemas.microsoft.com/office/drawing/2014/main" id="{A7842FB3-7F63-E19D-0132-8B9C4FEB3782}"/>
+      <p:cxnSp>
+        <p:nvCxnSpPr>
+          <p:cNvPr id="40" name="Straight Arrow Connector 39">
+            <a:extLst>
+              <a:ext uri="{FF2B5EF4-FFF2-40B4-BE49-F238E27FC236}">
+                <a16:creationId xmlns:a16="http://schemas.microsoft.com/office/drawing/2014/main" id="{07FC32E8-7872-D3C2-AB4E-62C4964953BE}"/>
+              </a:ext>
+            </a:extLst>
+          </p:cNvPr>
+          <p:cNvCxnSpPr>
+            <a:cxnSpLocks/>
+            <a:stCxn id="1056" idx="3"/>
+            <a:endCxn id="1044" idx="1"/>
+          </p:cNvCxnSpPr>
+          <p:nvPr/>
+        </p:nvCxnSpPr>
+        <p:spPr>
+          <a:xfrm>
+            <a:off x="3002815" y="4450177"/>
+            <a:ext cx="1513844" cy="773789"/>
+          </a:xfrm>
+          <a:prstGeom prst="straightConnector1">
+            <a:avLst/>
+          </a:prstGeom>
+          <a:ln>
+            <a:tailEnd type="triangle"/>
+          </a:ln>
+        </p:spPr>
+        <p:style>
+          <a:lnRef idx="2">
+            <a:schemeClr val="accent1"/>
+          </a:lnRef>
+          <a:fillRef idx="0">
+            <a:schemeClr val="accent1"/>
+          </a:fillRef>
+          <a:effectRef idx="1">
+            <a:schemeClr val="accent1"/>
+          </a:effectRef>
+          <a:fontRef idx="minor">
+            <a:schemeClr val="tx1"/>
+          </a:fontRef>
+        </p:style>
+      </p:cxnSp>
+      <p:sp>
+        <p:nvSpPr>
+          <p:cNvPr id="43" name="TextBox 42">
+            <a:extLst>
+              <a:ext uri="{FF2B5EF4-FFF2-40B4-BE49-F238E27FC236}">
+                <a16:creationId xmlns:a16="http://schemas.microsoft.com/office/drawing/2014/main" id="{03558389-AFFC-C272-23BC-D7C892BC93A7}"/>
               </a:ext>
             </a:extLst>
           </p:cNvPr>
@@ -4457,8 +4463,8 @@
         </p:nvSpPr>
         <p:spPr>
           <a:xfrm>
-            <a:off x="665559" y="4153799"/>
-            <a:ext cx="1009430" cy="523220"/>
+            <a:off x="4446180" y="4666901"/>
+            <a:ext cx="756780" cy="307777"/>
           </a:xfrm>
           <a:prstGeom prst="rect">
             <a:avLst/>
@@ -4478,17 +4484,17 @@
                 <a:ea typeface="Calibri" panose="020F0502020204030204" pitchFamily="34" charset="0"/>
                 <a:cs typeface="Calibri" panose="020F0502020204030204" pitchFamily="34" charset="0"/>
               </a:rPr>
-              <a:t>GitHub Workflow</a:t>
+              <a:t>Auth0</a:t>
             </a:r>
           </a:p>
         </p:txBody>
       </p:sp>
       <p:pic>
         <p:nvPicPr>
-          <p:cNvPr id="1044" name="Picture 20" descr="Auth0&quot; Icon - Download for free – Iconduck">
-            <a:extLst>
-              <a:ext uri="{FF2B5EF4-FFF2-40B4-BE49-F238E27FC236}">
-                <a16:creationId xmlns:a16="http://schemas.microsoft.com/office/drawing/2014/main" id="{0D04FA19-5FDD-C8D9-C547-EBFE8FEB3C00}"/>
+          <p:cNvPr id="1046" name="Picture 22" descr="Twilio SendGrid Logo">
+            <a:extLst>
+              <a:ext uri="{FF2B5EF4-FFF2-40B4-BE49-F238E27FC236}">
+                <a16:creationId xmlns:a16="http://schemas.microsoft.com/office/drawing/2014/main" id="{E5D06890-C51D-017E-2672-61F72F88BB6D}"/>
               </a:ext>
             </a:extLst>
           </p:cNvPr>
@@ -4512,8 +4518,8 @@
         </p:blipFill>
         <p:spPr bwMode="auto">
           <a:xfrm>
-            <a:off x="3516552" y="4919166"/>
-            <a:ext cx="545253" cy="609600"/>
+            <a:off x="4489440" y="5833274"/>
+            <a:ext cx="572472" cy="572472"/>
           </a:xfrm>
           <a:prstGeom prst="rect">
             <a:avLst/>
@@ -4532,24 +4538,24 @@
       </p:pic>
       <p:cxnSp>
         <p:nvCxnSpPr>
-          <p:cNvPr id="40" name="Straight Arrow Connector 39">
-            <a:extLst>
-              <a:ext uri="{FF2B5EF4-FFF2-40B4-BE49-F238E27FC236}">
-                <a16:creationId xmlns:a16="http://schemas.microsoft.com/office/drawing/2014/main" id="{07FC32E8-7872-D3C2-AB4E-62C4964953BE}"/>
+          <p:cNvPr id="44" name="Straight Arrow Connector 43">
+            <a:extLst>
+              <a:ext uri="{FF2B5EF4-FFF2-40B4-BE49-F238E27FC236}">
+                <a16:creationId xmlns:a16="http://schemas.microsoft.com/office/drawing/2014/main" id="{348B408E-001D-F05D-EBB0-9216E843B68E}"/>
               </a:ext>
             </a:extLst>
           </p:cNvPr>
           <p:cNvCxnSpPr>
             <a:cxnSpLocks/>
-            <a:stCxn id="1056" idx="3"/>
-            <a:endCxn id="1044" idx="1"/>
+            <a:stCxn id="1044" idx="2"/>
+            <a:endCxn id="1046" idx="0"/>
           </p:cNvCxnSpPr>
           <p:nvPr/>
         </p:nvCxnSpPr>
         <p:spPr>
-          <a:xfrm>
-            <a:off x="2990242" y="4450177"/>
-            <a:ext cx="526310" cy="773789"/>
+          <a:xfrm flipH="1">
+            <a:off x="4775676" y="5528766"/>
+            <a:ext cx="13610" cy="304508"/>
           </a:xfrm>
           <a:prstGeom prst="straightConnector1">
             <a:avLst/>
@@ -4575,10 +4581,10 @@
       </p:cxnSp>
       <p:sp>
         <p:nvSpPr>
-          <p:cNvPr id="43" name="TextBox 42">
-            <a:extLst>
-              <a:ext uri="{FF2B5EF4-FFF2-40B4-BE49-F238E27FC236}">
-                <a16:creationId xmlns:a16="http://schemas.microsoft.com/office/drawing/2014/main" id="{03558389-AFFC-C272-23BC-D7C892BC93A7}"/>
+          <p:cNvPr id="48" name="TextBox 47">
+            <a:extLst>
+              <a:ext uri="{FF2B5EF4-FFF2-40B4-BE49-F238E27FC236}">
+                <a16:creationId xmlns:a16="http://schemas.microsoft.com/office/drawing/2014/main" id="{0A617A33-B284-9CD1-7D73-892FDCB281C5}"/>
               </a:ext>
             </a:extLst>
           </p:cNvPr>
@@ -4587,8 +4593,8 @@
         </p:nvSpPr>
         <p:spPr>
           <a:xfrm>
-            <a:off x="3391683" y="4563901"/>
-            <a:ext cx="756780" cy="307777"/>
+            <a:off x="4195442" y="6386530"/>
+            <a:ext cx="1009430" cy="307777"/>
           </a:xfrm>
           <a:prstGeom prst="rect">
             <a:avLst/>
@@ -4608,17 +4614,17 @@
                 <a:ea typeface="Calibri" panose="020F0502020204030204" pitchFamily="34" charset="0"/>
                 <a:cs typeface="Calibri" panose="020F0502020204030204" pitchFamily="34" charset="0"/>
               </a:rPr>
-              <a:t>Auth0</a:t>
+              <a:t>SendGrid</a:t>
             </a:r>
           </a:p>
         </p:txBody>
       </p:sp>
       <p:pic>
         <p:nvPicPr>
-          <p:cNvPr id="1046" name="Picture 22" descr="Twilio SendGrid Logo">
-            <a:extLst>
-              <a:ext uri="{FF2B5EF4-FFF2-40B4-BE49-F238E27FC236}">
-                <a16:creationId xmlns:a16="http://schemas.microsoft.com/office/drawing/2014/main" id="{E5D06890-C51D-017E-2672-61F72F88BB6D}"/>
+          <p:cNvPr id="1048" name="Picture 24" descr="Email Icon Blue transparent PNG - StickPNG">
+            <a:extLst>
+              <a:ext uri="{FF2B5EF4-FFF2-40B4-BE49-F238E27FC236}">
+                <a16:creationId xmlns:a16="http://schemas.microsoft.com/office/drawing/2014/main" id="{CBA05949-38D8-2256-66E6-6555EE5A016B}"/>
               </a:ext>
             </a:extLst>
           </p:cNvPr>
@@ -4642,8 +4648,8 @@
         </p:blipFill>
         <p:spPr bwMode="auto">
           <a:xfrm>
-            <a:off x="3489333" y="5833274"/>
-            <a:ext cx="572472" cy="572472"/>
+            <a:off x="6103891" y="5860607"/>
+            <a:ext cx="517805" cy="517805"/>
           </a:xfrm>
           <a:prstGeom prst="rect">
             <a:avLst/>
@@ -4662,24 +4668,24 @@
       </p:pic>
       <p:cxnSp>
         <p:nvCxnSpPr>
-          <p:cNvPr id="44" name="Straight Arrow Connector 43">
-            <a:extLst>
-              <a:ext uri="{FF2B5EF4-FFF2-40B4-BE49-F238E27FC236}">
-                <a16:creationId xmlns:a16="http://schemas.microsoft.com/office/drawing/2014/main" id="{348B408E-001D-F05D-EBB0-9216E843B68E}"/>
+          <p:cNvPr id="49" name="Straight Arrow Connector 48">
+            <a:extLst>
+              <a:ext uri="{FF2B5EF4-FFF2-40B4-BE49-F238E27FC236}">
+                <a16:creationId xmlns:a16="http://schemas.microsoft.com/office/drawing/2014/main" id="{CFD14797-80EE-DCC4-B370-3B9E2A0E83ED}"/>
               </a:ext>
             </a:extLst>
           </p:cNvPr>
           <p:cNvCxnSpPr>
             <a:cxnSpLocks/>
-            <a:stCxn id="1044" idx="2"/>
-            <a:endCxn id="1046" idx="0"/>
+            <a:stCxn id="1046" idx="3"/>
+            <a:endCxn id="1048" idx="1"/>
           </p:cNvCxnSpPr>
           <p:nvPr/>
         </p:nvCxnSpPr>
         <p:spPr>
-          <a:xfrm flipH="1">
-            <a:off x="3775569" y="5528766"/>
-            <a:ext cx="13610" cy="304508"/>
+          <a:xfrm>
+            <a:off x="5061912" y="6119510"/>
+            <a:ext cx="1041979" cy="0"/>
           </a:xfrm>
           <a:prstGeom prst="straightConnector1">
             <a:avLst/>
@@ -4703,52 +4709,12 @@
           </a:fontRef>
         </p:style>
       </p:cxnSp>
-      <p:sp>
-        <p:nvSpPr>
-          <p:cNvPr id="48" name="TextBox 47">
-            <a:extLst>
-              <a:ext uri="{FF2B5EF4-FFF2-40B4-BE49-F238E27FC236}">
-                <a16:creationId xmlns:a16="http://schemas.microsoft.com/office/drawing/2014/main" id="{0A617A33-B284-9CD1-7D73-892FDCB281C5}"/>
-              </a:ext>
-            </a:extLst>
-          </p:cNvPr>
-          <p:cNvSpPr txBox="1"/>
-          <p:nvPr/>
-        </p:nvSpPr>
-        <p:spPr>
-          <a:xfrm>
-            <a:off x="3195335" y="6386530"/>
-            <a:ext cx="1009430" cy="307777"/>
-          </a:xfrm>
-          <a:prstGeom prst="rect">
-            <a:avLst/>
-          </a:prstGeom>
-          <a:noFill/>
-        </p:spPr>
-        <p:txBody>
-          <a:bodyPr wrap="square" rtlCol="0">
-            <a:spAutoFit/>
-          </a:bodyPr>
-          <a:lstStyle/>
-          <a:p>
-            <a:pPr algn="ctr"/>
-            <a:r>
-              <a:rPr lang="en-US" sz="1400" dirty="0">
-                <a:latin typeface="Calibri" panose="020F0502020204030204" pitchFamily="34" charset="0"/>
-                <a:ea typeface="Calibri" panose="020F0502020204030204" pitchFamily="34" charset="0"/>
-                <a:cs typeface="Calibri" panose="020F0502020204030204" pitchFamily="34" charset="0"/>
-              </a:rPr>
-              <a:t>SendGrid</a:t>
-            </a:r>
-          </a:p>
-        </p:txBody>
-      </p:sp>
       <p:pic>
         <p:nvPicPr>
-          <p:cNvPr id="1048" name="Picture 24" descr="Email Icon Blue transparent PNG - StickPNG">
-            <a:extLst>
-              <a:ext uri="{FF2B5EF4-FFF2-40B4-BE49-F238E27FC236}">
-                <a16:creationId xmlns:a16="http://schemas.microsoft.com/office/drawing/2014/main" id="{CBA05949-38D8-2256-66E6-6555EE5A016B}"/>
+          <p:cNvPr id="1050" name="Picture 26" descr="End-user | Definition">
+            <a:extLst>
+              <a:ext uri="{FF2B5EF4-FFF2-40B4-BE49-F238E27FC236}">
+                <a16:creationId xmlns:a16="http://schemas.microsoft.com/office/drawing/2014/main" id="{0F86FC8B-4A28-8241-4D17-E361290CAD48}"/>
               </a:ext>
             </a:extLst>
           </p:cNvPr>
@@ -4772,8 +4738,8 @@
         </p:blipFill>
         <p:spPr bwMode="auto">
           <a:xfrm>
-            <a:off x="4798504" y="5860607"/>
-            <a:ext cx="517805" cy="517805"/>
+            <a:off x="6185502" y="4995602"/>
+            <a:ext cx="354581" cy="468342"/>
           </a:xfrm>
           <a:prstGeom prst="rect">
             <a:avLst/>
@@ -4792,24 +4758,24 @@
       </p:pic>
       <p:cxnSp>
         <p:nvCxnSpPr>
-          <p:cNvPr id="49" name="Straight Arrow Connector 48">
-            <a:extLst>
-              <a:ext uri="{FF2B5EF4-FFF2-40B4-BE49-F238E27FC236}">
-                <a16:creationId xmlns:a16="http://schemas.microsoft.com/office/drawing/2014/main" id="{CFD14797-80EE-DCC4-B370-3B9E2A0E83ED}"/>
+          <p:cNvPr id="53" name="Straight Arrow Connector 52">
+            <a:extLst>
+              <a:ext uri="{FF2B5EF4-FFF2-40B4-BE49-F238E27FC236}">
+                <a16:creationId xmlns:a16="http://schemas.microsoft.com/office/drawing/2014/main" id="{469BFDCC-C167-A878-9E98-BC92B869633B}"/>
               </a:ext>
             </a:extLst>
           </p:cNvPr>
           <p:cNvCxnSpPr>
             <a:cxnSpLocks/>
-            <a:stCxn id="1046" idx="3"/>
-            <a:endCxn id="1048" idx="1"/>
+            <a:stCxn id="1048" idx="0"/>
+            <a:endCxn id="1050" idx="2"/>
           </p:cNvCxnSpPr>
           <p:nvPr/>
         </p:nvCxnSpPr>
         <p:spPr>
-          <a:xfrm>
-            <a:off x="4061805" y="6119510"/>
-            <a:ext cx="736699" cy="0"/>
+          <a:xfrm flipH="1" flipV="1">
+            <a:off x="6362793" y="5463944"/>
+            <a:ext cx="1" cy="396663"/>
           </a:xfrm>
           <a:prstGeom prst="straightConnector1">
             <a:avLst/>
@@ -4833,12 +4799,52 @@
           </a:fontRef>
         </p:style>
       </p:cxnSp>
+      <p:sp>
+        <p:nvSpPr>
+          <p:cNvPr id="57" name="TextBox 56">
+            <a:extLst>
+              <a:ext uri="{FF2B5EF4-FFF2-40B4-BE49-F238E27FC236}">
+                <a16:creationId xmlns:a16="http://schemas.microsoft.com/office/drawing/2014/main" id="{E91DA162-5227-C815-0AED-446160566AC1}"/>
+              </a:ext>
+            </a:extLst>
+          </p:cNvPr>
+          <p:cNvSpPr txBox="1"/>
+          <p:nvPr/>
+        </p:nvSpPr>
+        <p:spPr>
+          <a:xfrm>
+            <a:off x="5858077" y="4699465"/>
+            <a:ext cx="1009430" cy="307777"/>
+          </a:xfrm>
+          <a:prstGeom prst="rect">
+            <a:avLst/>
+          </a:prstGeom>
+          <a:noFill/>
+        </p:spPr>
+        <p:txBody>
+          <a:bodyPr wrap="square" rtlCol="0">
+            <a:spAutoFit/>
+          </a:bodyPr>
+          <a:lstStyle/>
+          <a:p>
+            <a:pPr algn="ctr"/>
+            <a:r>
+              <a:rPr lang="en-US" sz="1400" dirty="0">
+                <a:latin typeface="Calibri" panose="020F0502020204030204" pitchFamily="34" charset="0"/>
+                <a:ea typeface="Calibri" panose="020F0502020204030204" pitchFamily="34" charset="0"/>
+                <a:cs typeface="Calibri" panose="020F0502020204030204" pitchFamily="34" charset="0"/>
+              </a:rPr>
+              <a:t>End User</a:t>
+            </a:r>
+          </a:p>
+        </p:txBody>
+      </p:sp>
       <p:pic>
         <p:nvPicPr>
-          <p:cNvPr id="1050" name="Picture 26" descr="End-user | Definition">
-            <a:extLst>
-              <a:ext uri="{FF2B5EF4-FFF2-40B4-BE49-F238E27FC236}">
-                <a16:creationId xmlns:a16="http://schemas.microsoft.com/office/drawing/2014/main" id="{0F86FC8B-4A28-8241-4D17-E361290CAD48}"/>
+          <p:cNvPr id="1052" name="Picture 28" descr="Cloudflare SVG and transparent PNG icons | TechIcons">
+            <a:extLst>
+              <a:ext uri="{FF2B5EF4-FFF2-40B4-BE49-F238E27FC236}">
+                <a16:creationId xmlns:a16="http://schemas.microsoft.com/office/drawing/2014/main" id="{5A3F2F3A-AB1E-44C3-A9E0-7872CDB7AF09}"/>
               </a:ext>
             </a:extLst>
           </p:cNvPr>
@@ -4847,7 +4853,7 @@
           </p:cNvPicPr>
           <p:nvPr/>
         </p:nvPicPr>
-        <p:blipFill>
+        <p:blipFill rotWithShape="1">
           <a:blip r:embed="rId14">
             <a:extLst>
               <a:ext uri="{28A0092B-C50C-407E-A947-70E740481C1C}">
@@ -4855,15 +4861,13 @@
               </a:ext>
             </a:extLst>
           </a:blip>
-          <a:srcRect/>
-          <a:stretch>
-            <a:fillRect/>
-          </a:stretch>
+          <a:srcRect t="23480" b="22055"/>
+          <a:stretch/>
         </p:blipFill>
         <p:spPr bwMode="auto">
           <a:xfrm>
-            <a:off x="4880115" y="4995602"/>
-            <a:ext cx="354581" cy="468342"/>
+            <a:off x="2455347" y="5851245"/>
+            <a:ext cx="1009652" cy="549905"/>
           </a:xfrm>
           <a:prstGeom prst="rect">
             <a:avLst/>
@@ -4880,26 +4884,66 @@
           </a:extLst>
         </p:spPr>
       </p:pic>
+      <p:sp>
+        <p:nvSpPr>
+          <p:cNvPr id="58" name="TextBox 57">
+            <a:extLst>
+              <a:ext uri="{FF2B5EF4-FFF2-40B4-BE49-F238E27FC236}">
+                <a16:creationId xmlns:a16="http://schemas.microsoft.com/office/drawing/2014/main" id="{9CD8DA83-A52B-67C3-CF4D-D7292100392A}"/>
+              </a:ext>
+            </a:extLst>
+          </p:cNvPr>
+          <p:cNvSpPr txBox="1"/>
+          <p:nvPr/>
+        </p:nvSpPr>
+        <p:spPr>
+          <a:xfrm>
+            <a:off x="2438400" y="6304930"/>
+            <a:ext cx="1009430" cy="307777"/>
+          </a:xfrm>
+          <a:prstGeom prst="rect">
+            <a:avLst/>
+          </a:prstGeom>
+          <a:noFill/>
+        </p:spPr>
+        <p:txBody>
+          <a:bodyPr wrap="square" rtlCol="0">
+            <a:spAutoFit/>
+          </a:bodyPr>
+          <a:lstStyle/>
+          <a:p>
+            <a:pPr algn="ctr"/>
+            <a:r>
+              <a:rPr lang="en-US" sz="1400" dirty="0">
+                <a:latin typeface="Calibri" panose="020F0502020204030204" pitchFamily="34" charset="0"/>
+                <a:ea typeface="Calibri" panose="020F0502020204030204" pitchFamily="34" charset="0"/>
+                <a:cs typeface="Calibri" panose="020F0502020204030204" pitchFamily="34" charset="0"/>
+              </a:rPr>
+              <a:t>Cloudflare</a:t>
+            </a:r>
+          </a:p>
+        </p:txBody>
+      </p:sp>
       <p:cxnSp>
         <p:nvCxnSpPr>
-          <p:cNvPr id="53" name="Straight Arrow Connector 52">
-            <a:extLst>
-              <a:ext uri="{FF2B5EF4-FFF2-40B4-BE49-F238E27FC236}">
-                <a16:creationId xmlns:a16="http://schemas.microsoft.com/office/drawing/2014/main" id="{469BFDCC-C167-A878-9E98-BC92B869633B}"/>
+          <p:cNvPr id="59" name="Straight Arrow Connector 58">
+            <a:extLst>
+              <a:ext uri="{FF2B5EF4-FFF2-40B4-BE49-F238E27FC236}">
+                <a16:creationId xmlns:a16="http://schemas.microsoft.com/office/drawing/2014/main" id="{80D4E4B7-CEFD-1BBD-34D7-A0FD062A4D57}"/>
               </a:ext>
             </a:extLst>
           </p:cNvPr>
           <p:cNvCxnSpPr>
             <a:cxnSpLocks/>
-            <a:stCxn id="1048" idx="0"/>
-            <a:endCxn id="1050" idx="2"/>
+            <a:stCxn id="1052" idx="3"/>
+            <a:endCxn id="1046" idx="1"/>
           </p:cNvCxnSpPr>
           <p:nvPr/>
         </p:nvCxnSpPr>
         <p:spPr>
-          <a:xfrm flipH="1" flipV="1">
-            <a:off x="5057406" y="5463944"/>
-            <a:ext cx="1" cy="396663"/>
+          <a:xfrm flipV="1">
+            <a:off x="3464999" y="6119510"/>
+            <a:ext cx="1024441" cy="6688"/>
           </a:xfrm>
           <a:prstGeom prst="straightConnector1">
             <a:avLst/>
@@ -4923,52 +4967,12 @@
           </a:fontRef>
         </p:style>
       </p:cxnSp>
-      <p:sp>
-        <p:nvSpPr>
-          <p:cNvPr id="57" name="TextBox 56">
-            <a:extLst>
-              <a:ext uri="{FF2B5EF4-FFF2-40B4-BE49-F238E27FC236}">
-                <a16:creationId xmlns:a16="http://schemas.microsoft.com/office/drawing/2014/main" id="{E91DA162-5227-C815-0AED-446160566AC1}"/>
-              </a:ext>
-            </a:extLst>
-          </p:cNvPr>
-          <p:cNvSpPr txBox="1"/>
-          <p:nvPr/>
-        </p:nvSpPr>
-        <p:spPr>
-          <a:xfrm>
-            <a:off x="4552690" y="4699465"/>
-            <a:ext cx="1009430" cy="307777"/>
-          </a:xfrm>
-          <a:prstGeom prst="rect">
-            <a:avLst/>
-          </a:prstGeom>
-          <a:noFill/>
-        </p:spPr>
-        <p:txBody>
-          <a:bodyPr wrap="square" rtlCol="0">
-            <a:spAutoFit/>
-          </a:bodyPr>
-          <a:lstStyle/>
-          <a:p>
-            <a:pPr algn="ctr"/>
-            <a:r>
-              <a:rPr lang="en-US" sz="1400" dirty="0">
-                <a:latin typeface="Calibri" panose="020F0502020204030204" pitchFamily="34" charset="0"/>
-                <a:ea typeface="Calibri" panose="020F0502020204030204" pitchFamily="34" charset="0"/>
-                <a:cs typeface="Calibri" panose="020F0502020204030204" pitchFamily="34" charset="0"/>
-              </a:rPr>
-              <a:t>End User</a:t>
-            </a:r>
-          </a:p>
-        </p:txBody>
-      </p:sp>
       <p:pic>
         <p:nvPicPr>
-          <p:cNvPr id="1052" name="Picture 28" descr="Cloudflare SVG and transparent PNG icons | TechIcons">
-            <a:extLst>
-              <a:ext uri="{FF2B5EF4-FFF2-40B4-BE49-F238E27FC236}">
-                <a16:creationId xmlns:a16="http://schemas.microsoft.com/office/drawing/2014/main" id="{5A3F2F3A-AB1E-44C3-A9E0-7872CDB7AF09}"/>
+          <p:cNvPr id="1054" name="Picture 30" descr="Terraform Generic color lineal-color icon | Freepik">
+            <a:extLst>
+              <a:ext uri="{FF2B5EF4-FFF2-40B4-BE49-F238E27FC236}">
+                <a16:creationId xmlns:a16="http://schemas.microsoft.com/office/drawing/2014/main" id="{6E7C5707-4501-A291-6932-FE1833A77E3E}"/>
               </a:ext>
             </a:extLst>
           </p:cNvPr>
@@ -4977,7 +4981,7 @@
           </p:cNvPicPr>
           <p:nvPr/>
         </p:nvPicPr>
-        <p:blipFill rotWithShape="1">
+        <p:blipFill>
           <a:blip r:embed="rId15">
             <a:extLst>
               <a:ext uri="{28A0092B-C50C-407E-A947-70E740481C1C}">
@@ -4985,13 +4989,15 @@
               </a:ext>
             </a:extLst>
           </a:blip>
-          <a:srcRect t="23480" b="22055"/>
-          <a:stretch/>
+          <a:srcRect/>
+          <a:stretch>
+            <a:fillRect/>
+          </a:stretch>
         </p:blipFill>
         <p:spPr bwMode="auto">
           <a:xfrm>
-            <a:off x="2016957" y="5851245"/>
-            <a:ext cx="1009652" cy="549905"/>
+            <a:off x="872280" y="4774445"/>
+            <a:ext cx="689499" cy="689499"/>
           </a:xfrm>
           <a:prstGeom prst="rect">
             <a:avLst/>
@@ -5010,10 +5016,10 @@
       </p:pic>
       <p:sp>
         <p:nvSpPr>
-          <p:cNvPr id="58" name="TextBox 57">
-            <a:extLst>
-              <a:ext uri="{FF2B5EF4-FFF2-40B4-BE49-F238E27FC236}">
-                <a16:creationId xmlns:a16="http://schemas.microsoft.com/office/drawing/2014/main" id="{9CD8DA83-A52B-67C3-CF4D-D7292100392A}"/>
+          <p:cNvPr id="63" name="TextBox 62">
+            <a:extLst>
+              <a:ext uri="{FF2B5EF4-FFF2-40B4-BE49-F238E27FC236}">
+                <a16:creationId xmlns:a16="http://schemas.microsoft.com/office/drawing/2014/main" id="{9B4D3861-000D-77D2-A1DD-C066FC3BA9EB}"/>
               </a:ext>
             </a:extLst>
           </p:cNvPr>
@@ -5022,8 +5028,8 @@
         </p:nvSpPr>
         <p:spPr>
           <a:xfrm>
-            <a:off x="2000010" y="6304930"/>
-            <a:ext cx="1009430" cy="307777"/>
+            <a:off x="665559" y="5310055"/>
+            <a:ext cx="1009430" cy="523220"/>
           </a:xfrm>
           <a:prstGeom prst="rect">
             <a:avLst/>
@@ -5043,60 +5049,28 @@
                 <a:ea typeface="Calibri" panose="020F0502020204030204" pitchFamily="34" charset="0"/>
                 <a:cs typeface="Calibri" panose="020F0502020204030204" pitchFamily="34" charset="0"/>
               </a:rPr>
-              <a:t>Cloudflare</a:t>
-            </a:r>
-          </a:p>
-        </p:txBody>
-      </p:sp>
-      <p:cxnSp>
-        <p:nvCxnSpPr>
-          <p:cNvPr id="59" name="Straight Arrow Connector 58">
-            <a:extLst>
-              <a:ext uri="{FF2B5EF4-FFF2-40B4-BE49-F238E27FC236}">
-                <a16:creationId xmlns:a16="http://schemas.microsoft.com/office/drawing/2014/main" id="{80D4E4B7-CEFD-1BBD-34D7-A0FD062A4D57}"/>
-              </a:ext>
-            </a:extLst>
-          </p:cNvPr>
-          <p:cNvCxnSpPr>
-            <a:cxnSpLocks/>
-            <a:stCxn id="1052" idx="3"/>
-            <a:endCxn id="1046" idx="1"/>
-          </p:cNvCxnSpPr>
-          <p:nvPr/>
-        </p:nvCxnSpPr>
-        <p:spPr>
-          <a:xfrm flipV="1">
-            <a:off x="3026609" y="6119510"/>
-            <a:ext cx="462724" cy="6688"/>
-          </a:xfrm>
-          <a:prstGeom prst="straightConnector1">
-            <a:avLst/>
-          </a:prstGeom>
-          <a:ln>
-            <a:tailEnd type="triangle"/>
-          </a:ln>
-        </p:spPr>
-        <p:style>
-          <a:lnRef idx="2">
-            <a:schemeClr val="accent1"/>
-          </a:lnRef>
-          <a:fillRef idx="0">
-            <a:schemeClr val="accent1"/>
-          </a:fillRef>
-          <a:effectRef idx="1">
-            <a:schemeClr val="accent1"/>
-          </a:effectRef>
-          <a:fontRef idx="minor">
-            <a:schemeClr val="tx1"/>
-          </a:fontRef>
-        </p:style>
-      </p:cxnSp>
+              <a:t>Terraform</a:t>
+            </a:r>
+          </a:p>
+          <a:p>
+            <a:pPr algn="ctr"/>
+            <a:r>
+              <a:rPr lang="en-US" sz="1400" dirty="0">
+                <a:latin typeface="Calibri" panose="020F0502020204030204" pitchFamily="34" charset="0"/>
+                <a:ea typeface="Calibri" panose="020F0502020204030204" pitchFamily="34" charset="0"/>
+                <a:cs typeface="Calibri" panose="020F0502020204030204" pitchFamily="34" charset="0"/>
+              </a:rPr>
+              <a:t>Script</a:t>
+            </a:r>
+          </a:p>
+        </p:txBody>
+      </p:sp>
       <p:pic>
         <p:nvPicPr>
-          <p:cNvPr id="1054" name="Picture 30" descr="Terraform Generic color lineal-color icon | Freepik">
-            <a:extLst>
-              <a:ext uri="{FF2B5EF4-FFF2-40B4-BE49-F238E27FC236}">
-                <a16:creationId xmlns:a16="http://schemas.microsoft.com/office/drawing/2014/main" id="{6E7C5707-4501-A291-6932-FE1833A77E3E}"/>
+          <p:cNvPr id="1056" name="Picture 32">
+            <a:extLst>
+              <a:ext uri="{FF2B5EF4-FFF2-40B4-BE49-F238E27FC236}">
+                <a16:creationId xmlns:a16="http://schemas.microsoft.com/office/drawing/2014/main" id="{C719067A-A43E-204C-E676-F5AA951BC9FD}"/>
               </a:ext>
             </a:extLst>
           </p:cNvPr>
@@ -5120,8 +5094,8 @@
         </p:blipFill>
         <p:spPr bwMode="auto">
           <a:xfrm>
-            <a:off x="872280" y="4774445"/>
-            <a:ext cx="689499" cy="689499"/>
+            <a:off x="2319029" y="4108284"/>
+            <a:ext cx="683786" cy="683786"/>
           </a:xfrm>
           <a:prstGeom prst="rect">
             <a:avLst/>
@@ -5138,12 +5112,48 @@
           </a:extLst>
         </p:spPr>
       </p:pic>
-      <p:sp>
-        <p:nvSpPr>
-          <p:cNvPr id="63" name="TextBox 62">
-            <a:extLst>
-              <a:ext uri="{FF2B5EF4-FFF2-40B4-BE49-F238E27FC236}">
-                <a16:creationId xmlns:a16="http://schemas.microsoft.com/office/drawing/2014/main" id="{9B4D3861-000D-77D2-A1DD-C066FC3BA9EB}"/>
+      <p:cxnSp>
+        <p:nvCxnSpPr>
+          <p:cNvPr id="1025" name="Straight Connector 1024">
+            <a:extLst>
+              <a:ext uri="{FF2B5EF4-FFF2-40B4-BE49-F238E27FC236}">
+                <a16:creationId xmlns:a16="http://schemas.microsoft.com/office/drawing/2014/main" id="{F66A32E0-DBA3-FDB7-4D42-0DEFB49CA37F}"/>
+              </a:ext>
+            </a:extLst>
+          </p:cNvPr>
+          <p:cNvCxnSpPr/>
+          <p:nvPr/>
+        </p:nvCxnSpPr>
+        <p:spPr>
+          <a:xfrm>
+            <a:off x="476060" y="3308639"/>
+            <a:ext cx="1372171" cy="0"/>
+          </a:xfrm>
+          <a:prstGeom prst="line">
+            <a:avLst/>
+          </a:prstGeom>
+        </p:spPr>
+        <p:style>
+          <a:lnRef idx="2">
+            <a:schemeClr val="accent1"/>
+          </a:lnRef>
+          <a:fillRef idx="0">
+            <a:schemeClr val="accent1"/>
+          </a:fillRef>
+          <a:effectRef idx="1">
+            <a:schemeClr val="accent1"/>
+          </a:effectRef>
+          <a:fontRef idx="minor">
+            <a:schemeClr val="tx1"/>
+          </a:fontRef>
+        </p:style>
+      </p:cxnSp>
+      <p:sp>
+        <p:nvSpPr>
+          <p:cNvPr id="1027" name="TextBox 1026">
+            <a:extLst>
+              <a:ext uri="{FF2B5EF4-FFF2-40B4-BE49-F238E27FC236}">
+                <a16:creationId xmlns:a16="http://schemas.microsoft.com/office/drawing/2014/main" id="{875664C3-BA4F-E134-8A6B-0C82306A02B8}"/>
               </a:ext>
             </a:extLst>
           </p:cNvPr>
@@ -5152,8 +5162,145 @@
         </p:nvSpPr>
         <p:spPr>
           <a:xfrm>
-            <a:off x="665559" y="5310055"/>
-            <a:ext cx="1009430" cy="523220"/>
+            <a:off x="2216658" y="4677019"/>
+            <a:ext cx="907542" cy="523220"/>
+          </a:xfrm>
+          <a:prstGeom prst="rect">
+            <a:avLst/>
+          </a:prstGeom>
+          <a:noFill/>
+        </p:spPr>
+        <p:txBody>
+          <a:bodyPr wrap="square" rtlCol="0">
+            <a:spAutoFit/>
+          </a:bodyPr>
+          <a:lstStyle/>
+          <a:p>
+            <a:pPr algn="ctr"/>
+            <a:r>
+              <a:rPr lang="en-US" sz="1400" dirty="0">
+                <a:latin typeface="Calibri" panose="020F0502020204030204" pitchFamily="34" charset="0"/>
+                <a:ea typeface="Calibri" panose="020F0502020204030204" pitchFamily="34" charset="0"/>
+                <a:cs typeface="Calibri" panose="020F0502020204030204" pitchFamily="34" charset="0"/>
+              </a:rPr>
+              <a:t>Power</a:t>
+            </a:r>
+          </a:p>
+          <a:p>
+            <a:pPr algn="ctr"/>
+            <a:r>
+              <a:rPr lang="en-US" sz="1400" dirty="0">
+                <a:latin typeface="Calibri" panose="020F0502020204030204" pitchFamily="34" charset="0"/>
+                <a:ea typeface="Calibri" panose="020F0502020204030204" pitchFamily="34" charset="0"/>
+                <a:cs typeface="Calibri" panose="020F0502020204030204" pitchFamily="34" charset="0"/>
+              </a:rPr>
+              <a:t>Shell</a:t>
+            </a:r>
+          </a:p>
+        </p:txBody>
+      </p:sp>
+      <p:cxnSp>
+        <p:nvCxnSpPr>
+          <p:cNvPr id="1029" name="Straight Arrow Connector 1028">
+            <a:extLst>
+              <a:ext uri="{FF2B5EF4-FFF2-40B4-BE49-F238E27FC236}">
+                <a16:creationId xmlns:a16="http://schemas.microsoft.com/office/drawing/2014/main" id="{8223D2E7-6D3D-DAA8-0516-634BE9191A80}"/>
+              </a:ext>
+            </a:extLst>
+          </p:cNvPr>
+          <p:cNvCxnSpPr>
+            <a:cxnSpLocks/>
+            <a:stCxn id="1032" idx="2"/>
+            <a:endCxn id="1056" idx="0"/>
+          </p:cNvCxnSpPr>
+          <p:nvPr/>
+        </p:nvCxnSpPr>
+        <p:spPr>
+          <a:xfrm flipH="1">
+            <a:off x="2660922" y="2172795"/>
+            <a:ext cx="9507" cy="1935489"/>
+          </a:xfrm>
+          <a:prstGeom prst="straightConnector1">
+            <a:avLst/>
+          </a:prstGeom>
+          <a:ln>
+            <a:tailEnd type="triangle"/>
+          </a:ln>
+        </p:spPr>
+        <p:style>
+          <a:lnRef idx="2">
+            <a:schemeClr val="accent1"/>
+          </a:lnRef>
+          <a:fillRef idx="0">
+            <a:schemeClr val="accent1"/>
+          </a:fillRef>
+          <a:effectRef idx="1">
+            <a:schemeClr val="accent1"/>
+          </a:effectRef>
+          <a:fontRef idx="minor">
+            <a:schemeClr val="tx1"/>
+          </a:fontRef>
+        </p:style>
+      </p:cxnSp>
+      <p:cxnSp>
+        <p:nvCxnSpPr>
+          <p:cNvPr id="1047" name="Straight Arrow Connector 1046">
+            <a:extLst>
+              <a:ext uri="{FF2B5EF4-FFF2-40B4-BE49-F238E27FC236}">
+                <a16:creationId xmlns:a16="http://schemas.microsoft.com/office/drawing/2014/main" id="{640D9D03-2B5C-5DEC-EE91-6D870C422BDA}"/>
+              </a:ext>
+            </a:extLst>
+          </p:cNvPr>
+          <p:cNvCxnSpPr>
+            <a:cxnSpLocks/>
+            <a:stCxn id="1056" idx="3"/>
+            <a:endCxn id="1038" idx="1"/>
+          </p:cNvCxnSpPr>
+          <p:nvPr/>
+        </p:nvCxnSpPr>
+        <p:spPr>
+          <a:xfrm flipV="1">
+            <a:off x="3002815" y="3428682"/>
+            <a:ext cx="1530898" cy="1021495"/>
+          </a:xfrm>
+          <a:prstGeom prst="straightConnector1">
+            <a:avLst/>
+          </a:prstGeom>
+          <a:ln>
+            <a:tailEnd type="triangle"/>
+          </a:ln>
+        </p:spPr>
+        <p:style>
+          <a:lnRef idx="2">
+            <a:schemeClr val="accent1"/>
+          </a:lnRef>
+          <a:fillRef idx="0">
+            <a:schemeClr val="accent1"/>
+          </a:fillRef>
+          <a:effectRef idx="1">
+            <a:schemeClr val="accent1"/>
+          </a:effectRef>
+          <a:fontRef idx="minor">
+            <a:schemeClr val="tx1"/>
+          </a:fontRef>
+        </p:style>
+      </p:cxnSp>
+      <p:sp>
+        <p:nvSpPr>
+          <p:cNvPr id="1058" name="TextBox 1057">
+            <a:extLst>
+              <a:ext uri="{FF2B5EF4-FFF2-40B4-BE49-F238E27FC236}">
+                <a16:creationId xmlns:a16="http://schemas.microsoft.com/office/drawing/2014/main" id="{28B36C56-EA83-23C0-7FEC-FF76E98069F1}"/>
+              </a:ext>
+            </a:extLst>
+          </p:cNvPr>
+          <p:cNvSpPr txBox="1"/>
+          <p:nvPr/>
+        </p:nvSpPr>
+        <p:spPr>
+          <a:xfrm>
+            <a:off x="4322466" y="2800318"/>
+            <a:ext cx="1009430" cy="307777"/>
           </a:xfrm>
           <a:prstGeom prst="rect">
             <a:avLst/>
@@ -5176,25 +5323,57 @@
               <a:t>Terraform</a:t>
             </a:r>
           </a:p>
-          <a:p>
-            <a:pPr algn="ctr"/>
-            <a:r>
-              <a:rPr lang="en-US" sz="1400" dirty="0">
-                <a:latin typeface="Calibri" panose="020F0502020204030204" pitchFamily="34" charset="0"/>
-                <a:ea typeface="Calibri" panose="020F0502020204030204" pitchFamily="34" charset="0"/>
-                <a:cs typeface="Calibri" panose="020F0502020204030204" pitchFamily="34" charset="0"/>
-              </a:rPr>
-              <a:t>Script</a:t>
-            </a:r>
-          </a:p>
-        </p:txBody>
-      </p:sp>
+        </p:txBody>
+      </p:sp>
+      <p:cxnSp>
+        <p:nvCxnSpPr>
+          <p:cNvPr id="1059" name="Straight Arrow Connector 1058">
+            <a:extLst>
+              <a:ext uri="{FF2B5EF4-FFF2-40B4-BE49-F238E27FC236}">
+                <a16:creationId xmlns:a16="http://schemas.microsoft.com/office/drawing/2014/main" id="{0C85B7E7-F35F-560A-DC4F-2CA61190A912}"/>
+              </a:ext>
+            </a:extLst>
+          </p:cNvPr>
+          <p:cNvCxnSpPr>
+            <a:cxnSpLocks/>
+            <a:stCxn id="1038" idx="3"/>
+            <a:endCxn id="1062" idx="1"/>
+          </p:cNvCxnSpPr>
+          <p:nvPr/>
+        </p:nvCxnSpPr>
+        <p:spPr>
+          <a:xfrm flipV="1">
+            <a:off x="5134108" y="3426577"/>
+            <a:ext cx="664504" cy="2105"/>
+          </a:xfrm>
+          <a:prstGeom prst="straightConnector1">
+            <a:avLst/>
+          </a:prstGeom>
+          <a:ln>
+            <a:tailEnd type="triangle"/>
+          </a:ln>
+        </p:spPr>
+        <p:style>
+          <a:lnRef idx="2">
+            <a:schemeClr val="accent1"/>
+          </a:lnRef>
+          <a:fillRef idx="0">
+            <a:schemeClr val="accent1"/>
+          </a:fillRef>
+          <a:effectRef idx="1">
+            <a:schemeClr val="accent1"/>
+          </a:effectRef>
+          <a:fontRef idx="minor">
+            <a:schemeClr val="tx1"/>
+          </a:fontRef>
+        </p:style>
+      </p:cxnSp>
       <p:pic>
         <p:nvPicPr>
-          <p:cNvPr id="1056" name="Picture 32">
-            <a:extLst>
-              <a:ext uri="{FF2B5EF4-FFF2-40B4-BE49-F238E27FC236}">
-                <a16:creationId xmlns:a16="http://schemas.microsoft.com/office/drawing/2014/main" id="{C719067A-A43E-204C-E676-F5AA951BC9FD}"/>
+          <p:cNvPr id="1064" name="Picture 34" descr="S3 Bucket with Objects | AWS Storage">
+            <a:extLst>
+              <a:ext uri="{FF2B5EF4-FFF2-40B4-BE49-F238E27FC236}">
+                <a16:creationId xmlns:a16="http://schemas.microsoft.com/office/drawing/2014/main" id="{A5A4A68B-8011-4642-F2BC-15481AE36249}"/>
               </a:ext>
             </a:extLst>
           </p:cNvPr>
@@ -5218,8 +5397,8 @@
         </p:blipFill>
         <p:spPr bwMode="auto">
           <a:xfrm>
-            <a:off x="2306456" y="4108284"/>
-            <a:ext cx="683786" cy="683786"/>
+            <a:off x="7713445" y="3186574"/>
+            <a:ext cx="572109" cy="572109"/>
           </a:xfrm>
           <a:prstGeom prst="rect">
             <a:avLst/>
@@ -5236,48 +5415,12 @@
           </a:extLst>
         </p:spPr>
       </p:pic>
-      <p:cxnSp>
-        <p:nvCxnSpPr>
-          <p:cNvPr id="1025" name="Straight Connector 1024">
-            <a:extLst>
-              <a:ext uri="{FF2B5EF4-FFF2-40B4-BE49-F238E27FC236}">
-                <a16:creationId xmlns:a16="http://schemas.microsoft.com/office/drawing/2014/main" id="{F66A32E0-DBA3-FDB7-4D42-0DEFB49CA37F}"/>
-              </a:ext>
-            </a:extLst>
-          </p:cNvPr>
-          <p:cNvCxnSpPr/>
-          <p:nvPr/>
-        </p:nvCxnSpPr>
-        <p:spPr>
-          <a:xfrm>
-            <a:off x="476060" y="3308639"/>
-            <a:ext cx="1372171" cy="0"/>
-          </a:xfrm>
-          <a:prstGeom prst="line">
-            <a:avLst/>
-          </a:prstGeom>
-        </p:spPr>
-        <p:style>
-          <a:lnRef idx="2">
-            <a:schemeClr val="accent1"/>
-          </a:lnRef>
-          <a:fillRef idx="0">
-            <a:schemeClr val="accent1"/>
-          </a:fillRef>
-          <a:effectRef idx="1">
-            <a:schemeClr val="accent1"/>
-          </a:effectRef>
-          <a:fontRef idx="minor">
-            <a:schemeClr val="tx1"/>
-          </a:fontRef>
-        </p:style>
-      </p:cxnSp>
-      <p:sp>
-        <p:nvSpPr>
-          <p:cNvPr id="1027" name="TextBox 1026">
-            <a:extLst>
-              <a:ext uri="{FF2B5EF4-FFF2-40B4-BE49-F238E27FC236}">
-                <a16:creationId xmlns:a16="http://schemas.microsoft.com/office/drawing/2014/main" id="{875664C3-BA4F-E134-8A6B-0C82306A02B8}"/>
+      <p:sp>
+        <p:nvSpPr>
+          <p:cNvPr id="1065" name="TextBox 1064">
+            <a:extLst>
+              <a:ext uri="{FF2B5EF4-FFF2-40B4-BE49-F238E27FC236}">
+                <a16:creationId xmlns:a16="http://schemas.microsoft.com/office/drawing/2014/main" id="{342520CE-ED39-0C9D-DFDF-5365D256DCE4}"/>
               </a:ext>
             </a:extLst>
           </p:cNvPr>
@@ -5286,8 +5429,8 @@
         </p:nvSpPr>
         <p:spPr>
           <a:xfrm>
-            <a:off x="2204085" y="4677019"/>
-            <a:ext cx="907542" cy="523220"/>
+            <a:off x="7805077" y="3712612"/>
+            <a:ext cx="418236" cy="307777"/>
           </a:xfrm>
           <a:prstGeom prst="rect">
             <a:avLst/>
@@ -5307,197 +5450,17 @@
                 <a:ea typeface="Calibri" panose="020F0502020204030204" pitchFamily="34" charset="0"/>
                 <a:cs typeface="Calibri" panose="020F0502020204030204" pitchFamily="34" charset="0"/>
               </a:rPr>
-              <a:t>Power</a:t>
-            </a:r>
-          </a:p>
-          <a:p>
-            <a:pPr algn="ctr"/>
-            <a:r>
-              <a:rPr lang="en-US" sz="1400" dirty="0">
-                <a:latin typeface="Calibri" panose="020F0502020204030204" pitchFamily="34" charset="0"/>
-                <a:ea typeface="Calibri" panose="020F0502020204030204" pitchFamily="34" charset="0"/>
-                <a:cs typeface="Calibri" panose="020F0502020204030204" pitchFamily="34" charset="0"/>
-              </a:rPr>
-              <a:t>Shell</a:t>
-            </a:r>
-          </a:p>
-        </p:txBody>
-      </p:sp>
-      <p:cxnSp>
-        <p:nvCxnSpPr>
-          <p:cNvPr id="1029" name="Straight Arrow Connector 1028">
-            <a:extLst>
-              <a:ext uri="{FF2B5EF4-FFF2-40B4-BE49-F238E27FC236}">
-                <a16:creationId xmlns:a16="http://schemas.microsoft.com/office/drawing/2014/main" id="{8223D2E7-6D3D-DAA8-0516-634BE9191A80}"/>
-              </a:ext>
-            </a:extLst>
-          </p:cNvPr>
-          <p:cNvCxnSpPr>
-            <a:cxnSpLocks/>
-            <a:stCxn id="1032" idx="2"/>
-            <a:endCxn id="1056" idx="0"/>
-          </p:cNvCxnSpPr>
-          <p:nvPr/>
-        </p:nvCxnSpPr>
-        <p:spPr>
-          <a:xfrm flipH="1">
-            <a:off x="2648349" y="2172795"/>
-            <a:ext cx="9507" cy="1935489"/>
-          </a:xfrm>
-          <a:prstGeom prst="straightConnector1">
-            <a:avLst/>
-          </a:prstGeom>
-          <a:ln>
-            <a:tailEnd type="triangle"/>
-          </a:ln>
-        </p:spPr>
-        <p:style>
-          <a:lnRef idx="2">
-            <a:schemeClr val="accent1"/>
-          </a:lnRef>
-          <a:fillRef idx="0">
-            <a:schemeClr val="accent1"/>
-          </a:fillRef>
-          <a:effectRef idx="1">
-            <a:schemeClr val="accent1"/>
-          </a:effectRef>
-          <a:fontRef idx="minor">
-            <a:schemeClr val="tx1"/>
-          </a:fontRef>
-        </p:style>
-      </p:cxnSp>
-      <p:cxnSp>
-        <p:nvCxnSpPr>
-          <p:cNvPr id="1047" name="Straight Arrow Connector 1046">
-            <a:extLst>
-              <a:ext uri="{FF2B5EF4-FFF2-40B4-BE49-F238E27FC236}">
-                <a16:creationId xmlns:a16="http://schemas.microsoft.com/office/drawing/2014/main" id="{640D9D03-2B5C-5DEC-EE91-6D870C422BDA}"/>
-              </a:ext>
-            </a:extLst>
-          </p:cNvPr>
-          <p:cNvCxnSpPr>
-            <a:cxnSpLocks/>
-            <a:stCxn id="1056" idx="3"/>
-            <a:endCxn id="1038" idx="1"/>
-          </p:cNvCxnSpPr>
-          <p:nvPr/>
-        </p:nvCxnSpPr>
-        <p:spPr>
-          <a:xfrm flipV="1">
-            <a:off x="2990242" y="3585929"/>
-            <a:ext cx="543364" cy="864248"/>
-          </a:xfrm>
-          <a:prstGeom prst="straightConnector1">
-            <a:avLst/>
-          </a:prstGeom>
-          <a:ln>
-            <a:tailEnd type="triangle"/>
-          </a:ln>
-        </p:spPr>
-        <p:style>
-          <a:lnRef idx="2">
-            <a:schemeClr val="accent1"/>
-          </a:lnRef>
-          <a:fillRef idx="0">
-            <a:schemeClr val="accent1"/>
-          </a:fillRef>
-          <a:effectRef idx="1">
-            <a:schemeClr val="accent1"/>
-          </a:effectRef>
-          <a:fontRef idx="minor">
-            <a:schemeClr val="tx1"/>
-          </a:fontRef>
-        </p:style>
-      </p:cxnSp>
-      <p:sp>
-        <p:nvSpPr>
-          <p:cNvPr id="1058" name="TextBox 1057">
-            <a:extLst>
-              <a:ext uri="{FF2B5EF4-FFF2-40B4-BE49-F238E27FC236}">
-                <a16:creationId xmlns:a16="http://schemas.microsoft.com/office/drawing/2014/main" id="{28B36C56-EA83-23C0-7FEC-FF76E98069F1}"/>
-              </a:ext>
-            </a:extLst>
-          </p:cNvPr>
-          <p:cNvSpPr txBox="1"/>
-          <p:nvPr/>
-        </p:nvSpPr>
-        <p:spPr>
-          <a:xfrm>
-            <a:off x="3322359" y="2957565"/>
-            <a:ext cx="1009430" cy="307777"/>
-          </a:xfrm>
-          <a:prstGeom prst="rect">
-            <a:avLst/>
-          </a:prstGeom>
-          <a:noFill/>
-        </p:spPr>
-        <p:txBody>
-          <a:bodyPr wrap="square" rtlCol="0">
-            <a:spAutoFit/>
-          </a:bodyPr>
-          <a:lstStyle/>
-          <a:p>
-            <a:pPr algn="ctr"/>
-            <a:r>
-              <a:rPr lang="en-US" sz="1400" dirty="0">
-                <a:latin typeface="Calibri" panose="020F0502020204030204" pitchFamily="34" charset="0"/>
-                <a:ea typeface="Calibri" panose="020F0502020204030204" pitchFamily="34" charset="0"/>
-                <a:cs typeface="Calibri" panose="020F0502020204030204" pitchFamily="34" charset="0"/>
-              </a:rPr>
-              <a:t>Terraform</a:t>
-            </a:r>
-          </a:p>
-        </p:txBody>
-      </p:sp>
-      <p:cxnSp>
-        <p:nvCxnSpPr>
-          <p:cNvPr id="1059" name="Straight Arrow Connector 1058">
-            <a:extLst>
-              <a:ext uri="{FF2B5EF4-FFF2-40B4-BE49-F238E27FC236}">
-                <a16:creationId xmlns:a16="http://schemas.microsoft.com/office/drawing/2014/main" id="{0C85B7E7-F35F-560A-DC4F-2CA61190A912}"/>
-              </a:ext>
-            </a:extLst>
-          </p:cNvPr>
-          <p:cNvCxnSpPr>
-            <a:cxnSpLocks/>
-            <a:stCxn id="1038" idx="3"/>
-            <a:endCxn id="1062" idx="1"/>
-          </p:cNvCxnSpPr>
-          <p:nvPr/>
-        </p:nvCxnSpPr>
-        <p:spPr>
-          <a:xfrm flipV="1">
-            <a:off x="4134001" y="3583824"/>
-            <a:ext cx="664503" cy="2105"/>
-          </a:xfrm>
-          <a:prstGeom prst="straightConnector1">
-            <a:avLst/>
-          </a:prstGeom>
-          <a:ln>
-            <a:tailEnd type="triangle"/>
-          </a:ln>
-        </p:spPr>
-        <p:style>
-          <a:lnRef idx="2">
-            <a:schemeClr val="accent1"/>
-          </a:lnRef>
-          <a:fillRef idx="0">
-            <a:schemeClr val="accent1"/>
-          </a:fillRef>
-          <a:effectRef idx="1">
-            <a:schemeClr val="accent1"/>
-          </a:effectRef>
-          <a:fontRef idx="minor">
-            <a:schemeClr val="tx1"/>
-          </a:fontRef>
-        </p:style>
-      </p:cxnSp>
+              <a:t>S3</a:t>
+            </a:r>
+          </a:p>
+        </p:txBody>
+      </p:sp>
       <p:pic>
         <p:nvPicPr>
-          <p:cNvPr id="1064" name="Picture 34" descr="S3 Bucket with Objects | AWS Storage">
-            <a:extLst>
-              <a:ext uri="{FF2B5EF4-FFF2-40B4-BE49-F238E27FC236}">
-                <a16:creationId xmlns:a16="http://schemas.microsoft.com/office/drawing/2014/main" id="{A5A4A68B-8011-4642-F2BC-15481AE36249}"/>
+          <p:cNvPr id="1066" name="Picture 36" descr="5 New Features in AWS Fargate Version 1.4 | Logicata">
+            <a:extLst>
+              <a:ext uri="{FF2B5EF4-FFF2-40B4-BE49-F238E27FC236}">
+                <a16:creationId xmlns:a16="http://schemas.microsoft.com/office/drawing/2014/main" id="{91F03A5F-AEBE-7725-00D8-332651B9CEA6}"/>
               </a:ext>
             </a:extLst>
           </p:cNvPr>
@@ -5521,8 +5484,8 @@
         </p:blipFill>
         <p:spPr bwMode="auto">
           <a:xfrm>
-            <a:off x="5962438" y="3369270"/>
-            <a:ext cx="572109" cy="572109"/>
+            <a:off x="6831616" y="3200290"/>
+            <a:ext cx="532391" cy="532391"/>
           </a:xfrm>
           <a:prstGeom prst="rect">
             <a:avLst/>
@@ -5541,10 +5504,10 @@
       </p:pic>
       <p:sp>
         <p:nvSpPr>
-          <p:cNvPr id="1065" name="TextBox 1064">
-            <a:extLst>
-              <a:ext uri="{FF2B5EF4-FFF2-40B4-BE49-F238E27FC236}">
-                <a16:creationId xmlns:a16="http://schemas.microsoft.com/office/drawing/2014/main" id="{342520CE-ED39-0C9D-DFDF-5365D256DCE4}"/>
+          <p:cNvPr id="1067" name="TextBox 1066">
+            <a:extLst>
+              <a:ext uri="{FF2B5EF4-FFF2-40B4-BE49-F238E27FC236}">
+                <a16:creationId xmlns:a16="http://schemas.microsoft.com/office/drawing/2014/main" id="{5BA1E7F6-046C-11AD-6215-9EC01E14C1D2}"/>
               </a:ext>
             </a:extLst>
           </p:cNvPr>
@@ -5553,8 +5516,8 @@
         </p:nvSpPr>
         <p:spPr>
           <a:xfrm>
-            <a:off x="6033556" y="3926937"/>
-            <a:ext cx="418236" cy="307777"/>
+            <a:off x="6492432" y="3725993"/>
+            <a:ext cx="1238748" cy="307777"/>
           </a:xfrm>
           <a:prstGeom prst="rect">
             <a:avLst/>
@@ -5574,17 +5537,17 @@
                 <a:ea typeface="Calibri" panose="020F0502020204030204" pitchFamily="34" charset="0"/>
                 <a:cs typeface="Calibri" panose="020F0502020204030204" pitchFamily="34" charset="0"/>
               </a:rPr>
-              <a:t>S3</a:t>
+              <a:t>ECS Fargate</a:t>
             </a:r>
           </a:p>
         </p:txBody>
       </p:sp>
       <p:pic>
         <p:nvPicPr>
-          <p:cNvPr id="1066" name="Picture 36" descr="5 New Features in AWS Fargate Version 1.4 | Logicata">
-            <a:extLst>
-              <a:ext uri="{FF2B5EF4-FFF2-40B4-BE49-F238E27FC236}">
-                <a16:creationId xmlns:a16="http://schemas.microsoft.com/office/drawing/2014/main" id="{91F03A5F-AEBE-7725-00D8-332651B9CEA6}"/>
+          <p:cNvPr id="1068" name="Picture 38" descr="AWS CloudWatch Logs">
+            <a:extLst>
+              <a:ext uri="{FF2B5EF4-FFF2-40B4-BE49-F238E27FC236}">
+                <a16:creationId xmlns:a16="http://schemas.microsoft.com/office/drawing/2014/main" id="{DD6F94E4-68A2-2931-22E1-F009F72290BC}"/>
               </a:ext>
             </a:extLst>
           </p:cNvPr>
@@ -5608,7 +5571,7 @@
         </p:blipFill>
         <p:spPr bwMode="auto">
           <a:xfrm>
-            <a:off x="5089457" y="3369270"/>
+            <a:off x="9710759" y="3178658"/>
             <a:ext cx="532391" cy="532391"/>
           </a:xfrm>
           <a:prstGeom prst="rect">
@@ -5628,10 +5591,10 @@
       </p:pic>
       <p:sp>
         <p:nvSpPr>
-          <p:cNvPr id="1067" name="TextBox 1066">
-            <a:extLst>
-              <a:ext uri="{FF2B5EF4-FFF2-40B4-BE49-F238E27FC236}">
-                <a16:creationId xmlns:a16="http://schemas.microsoft.com/office/drawing/2014/main" id="{5BA1E7F6-046C-11AD-6215-9EC01E14C1D2}"/>
+          <p:cNvPr id="1069" name="TextBox 1068">
+            <a:extLst>
+              <a:ext uri="{FF2B5EF4-FFF2-40B4-BE49-F238E27FC236}">
+                <a16:creationId xmlns:a16="http://schemas.microsoft.com/office/drawing/2014/main" id="{E49CA972-1D65-1B94-3DAD-6572F6E65EDF}"/>
               </a:ext>
             </a:extLst>
           </p:cNvPr>
@@ -5640,7 +5603,7 @@
         </p:nvSpPr>
         <p:spPr>
           <a:xfrm>
-            <a:off x="4750273" y="3894973"/>
+            <a:off x="9357580" y="3698466"/>
             <a:ext cx="1238748" cy="307777"/>
           </a:xfrm>
           <a:prstGeom prst="rect">
@@ -5661,17 +5624,17 @@
                 <a:ea typeface="Calibri" panose="020F0502020204030204" pitchFamily="34" charset="0"/>
                 <a:cs typeface="Calibri" panose="020F0502020204030204" pitchFamily="34" charset="0"/>
               </a:rPr>
-              <a:t>ECS Fargate</a:t>
+              <a:t>CloudWatch</a:t>
             </a:r>
           </a:p>
         </p:txBody>
       </p:sp>
       <p:pic>
         <p:nvPicPr>
-          <p:cNvPr id="1068" name="Picture 38" descr="AWS CloudWatch Logs">
-            <a:extLst>
-              <a:ext uri="{FF2B5EF4-FFF2-40B4-BE49-F238E27FC236}">
-                <a16:creationId xmlns:a16="http://schemas.microsoft.com/office/drawing/2014/main" id="{DD6F94E4-68A2-2931-22E1-F009F72290BC}"/>
+          <p:cNvPr id="1070" name="Picture 12" descr="Amazon ECR | AWS Compute">
+            <a:extLst>
+              <a:ext uri="{FF2B5EF4-FFF2-40B4-BE49-F238E27FC236}">
+                <a16:creationId xmlns:a16="http://schemas.microsoft.com/office/drawing/2014/main" id="{A859DE0B-A0FA-C1DE-3F64-105B6F55486A}"/>
               </a:ext>
             </a:extLst>
           </p:cNvPr>
@@ -5695,8 +5658,8 @@
         </p:blipFill>
         <p:spPr bwMode="auto">
           <a:xfrm>
-            <a:off x="6939138" y="3369270"/>
-            <a:ext cx="532391" cy="532391"/>
+            <a:off x="5998457" y="3191260"/>
+            <a:ext cx="543520" cy="543520"/>
           </a:xfrm>
           <a:prstGeom prst="rect">
             <a:avLst/>
@@ -5715,10 +5678,10 @@
       </p:pic>
       <p:sp>
         <p:nvSpPr>
-          <p:cNvPr id="1069" name="TextBox 1068">
-            <a:extLst>
-              <a:ext uri="{FF2B5EF4-FFF2-40B4-BE49-F238E27FC236}">
-                <a16:creationId xmlns:a16="http://schemas.microsoft.com/office/drawing/2014/main" id="{E49CA972-1D65-1B94-3DAD-6572F6E65EDF}"/>
+          <p:cNvPr id="1071" name="TextBox 1070">
+            <a:extLst>
+              <a:ext uri="{FF2B5EF4-FFF2-40B4-BE49-F238E27FC236}">
+                <a16:creationId xmlns:a16="http://schemas.microsoft.com/office/drawing/2014/main" id="{8A655825-CEB7-4CD8-6121-6FBCFFBD6AED}"/>
               </a:ext>
             </a:extLst>
           </p:cNvPr>
@@ -5727,94 +5690,7 @@
         </p:nvSpPr>
         <p:spPr>
           <a:xfrm>
-            <a:off x="6585959" y="3889078"/>
-            <a:ext cx="1238748" cy="307777"/>
-          </a:xfrm>
-          <a:prstGeom prst="rect">
-            <a:avLst/>
-          </a:prstGeom>
-          <a:noFill/>
-        </p:spPr>
-        <p:txBody>
-          <a:bodyPr wrap="square" rtlCol="0">
-            <a:spAutoFit/>
-          </a:bodyPr>
-          <a:lstStyle/>
-          <a:p>
-            <a:pPr algn="ctr"/>
-            <a:r>
-              <a:rPr lang="en-US" sz="1400" dirty="0">
-                <a:latin typeface="Calibri" panose="020F0502020204030204" pitchFamily="34" charset="0"/>
-                <a:ea typeface="Calibri" panose="020F0502020204030204" pitchFamily="34" charset="0"/>
-                <a:cs typeface="Calibri" panose="020F0502020204030204" pitchFamily="34" charset="0"/>
-              </a:rPr>
-              <a:t>CloudWatch</a:t>
-            </a:r>
-          </a:p>
-        </p:txBody>
-      </p:sp>
-      <p:pic>
-        <p:nvPicPr>
-          <p:cNvPr id="1070" name="Picture 12" descr="Amazon ECR | AWS Compute">
-            <a:extLst>
-              <a:ext uri="{FF2B5EF4-FFF2-40B4-BE49-F238E27FC236}">
-                <a16:creationId xmlns:a16="http://schemas.microsoft.com/office/drawing/2014/main" id="{A859DE0B-A0FA-C1DE-3F64-105B6F55486A}"/>
-              </a:ext>
-            </a:extLst>
-          </p:cNvPr>
-          <p:cNvPicPr>
-            <a:picLocks noChangeAspect="1" noChangeArrowheads="1"/>
-          </p:cNvPicPr>
-          <p:nvPr/>
-        </p:nvPicPr>
-        <p:blipFill>
-          <a:blip r:embed="rId7">
-            <a:extLst>
-              <a:ext uri="{28A0092B-C50C-407E-A947-70E740481C1C}">
-                <a14:useLocalDpi xmlns:a14="http://schemas.microsoft.com/office/drawing/2010/main" val="0"/>
-              </a:ext>
-            </a:extLst>
-          </a:blip>
-          <a:srcRect/>
-          <a:stretch>
-            <a:fillRect/>
-          </a:stretch>
-        </p:blipFill>
-        <p:spPr bwMode="auto">
-          <a:xfrm>
-            <a:off x="7937334" y="3348507"/>
-            <a:ext cx="543520" cy="543520"/>
-          </a:xfrm>
-          <a:prstGeom prst="rect">
-            <a:avLst/>
-          </a:prstGeom>
-          <a:noFill/>
-          <a:extLst>
-            <a:ext uri="{909E8E84-426E-40DD-AFC4-6F175D3DCCD1}">
-              <a14:hiddenFill xmlns:a14="http://schemas.microsoft.com/office/drawing/2010/main">
-                <a:solidFill>
-                  <a:srgbClr val="FFFFFF"/>
-                </a:solidFill>
-              </a14:hiddenFill>
-            </a:ext>
-          </a:extLst>
-        </p:spPr>
-      </p:pic>
-      <p:sp>
-        <p:nvSpPr>
-          <p:cNvPr id="1071" name="TextBox 1070">
-            <a:extLst>
-              <a:ext uri="{FF2B5EF4-FFF2-40B4-BE49-F238E27FC236}">
-                <a16:creationId xmlns:a16="http://schemas.microsoft.com/office/drawing/2014/main" id="{8A655825-CEB7-4CD8-6121-6FBCFFBD6AED}"/>
-              </a:ext>
-            </a:extLst>
-          </p:cNvPr>
-          <p:cNvSpPr txBox="1"/>
-          <p:nvPr/>
-        </p:nvSpPr>
-        <p:spPr>
-          <a:xfrm>
-            <a:off x="7937334" y="3867185"/>
+            <a:off x="5994306" y="3730888"/>
             <a:ext cx="543520" cy="307777"/>
           </a:xfrm>
           <a:prstGeom prst="rect">
@@ -5861,7 +5737,7 @@
         </p:blipFill>
         <p:spPr>
           <a:xfrm>
-            <a:off x="8870467" y="3354174"/>
+            <a:off x="8762603" y="3169440"/>
             <a:ext cx="483659" cy="510656"/>
           </a:xfrm>
           <a:prstGeom prst="rect">
@@ -5883,7 +5759,7 @@
         </p:nvSpPr>
         <p:spPr>
           <a:xfrm>
-            <a:off x="8549311" y="3869608"/>
+            <a:off x="8441447" y="3684874"/>
             <a:ext cx="1124066" cy="307777"/>
           </a:xfrm>
           <a:prstGeom prst="rect">
@@ -5923,7 +5799,7 @@
         </p:nvSpPr>
         <p:spPr>
           <a:xfrm>
-            <a:off x="4705520" y="6359463"/>
+            <a:off x="6010907" y="6359463"/>
             <a:ext cx="719368" cy="307777"/>
           </a:xfrm>
           <a:prstGeom prst="rect">
@@ -5967,8 +5843,8 @@
         </p:nvCxnSpPr>
         <p:spPr>
           <a:xfrm flipH="1" flipV="1">
-            <a:off x="4061805" y="5223966"/>
-            <a:ext cx="818310" cy="5807"/>
+            <a:off x="5061912" y="5223966"/>
+            <a:ext cx="1123590" cy="5807"/>
           </a:xfrm>
           <a:prstGeom prst="straightConnector1">
             <a:avLst/>
@@ -6006,7 +5882,7 @@
         </p:nvGrpSpPr>
         <p:grpSpPr>
           <a:xfrm>
-            <a:off x="8669088" y="4935361"/>
+            <a:off x="10930763" y="4932383"/>
             <a:ext cx="685038" cy="782983"/>
             <a:chOff x="10592562" y="765594"/>
             <a:chExt cx="685038" cy="782983"/>
@@ -6114,7 +5990,7 @@
         </p:nvGrpSpPr>
         <p:grpSpPr>
           <a:xfrm>
-            <a:off x="10877746" y="2810618"/>
+            <a:off x="8023766" y="1136748"/>
             <a:ext cx="979714" cy="1065384"/>
             <a:chOff x="8650522" y="4178692"/>
             <a:chExt cx="979714" cy="1065384"/>
@@ -6220,7 +6096,7 @@
         </p:blipFill>
         <p:spPr bwMode="auto">
           <a:xfrm>
-            <a:off x="9868432" y="3363392"/>
+            <a:off x="10641585" y="3200290"/>
             <a:ext cx="302540" cy="577987"/>
           </a:xfrm>
           <a:prstGeom prst="rect">
@@ -6252,7 +6128,7 @@
         </p:nvSpPr>
         <p:spPr>
           <a:xfrm>
-            <a:off x="9741834" y="3889078"/>
+            <a:off x="10514987" y="3725976"/>
             <a:ext cx="543520" cy="307777"/>
           </a:xfrm>
           <a:prstGeom prst="rect">
@@ -6307,7 +6183,7 @@
         </p:blipFill>
         <p:spPr bwMode="auto">
           <a:xfrm>
-            <a:off x="6033556" y="4957174"/>
+            <a:off x="7803012" y="4940704"/>
             <a:ext cx="440320" cy="529266"/>
           </a:xfrm>
           <a:prstGeom prst="rect">
@@ -6339,7 +6215,7 @@
         </p:nvSpPr>
         <p:spPr>
           <a:xfrm>
-            <a:off x="5702907" y="5528766"/>
+            <a:off x="7472363" y="5512296"/>
             <a:ext cx="1085684" cy="307777"/>
           </a:xfrm>
           <a:prstGeom prst="rect">
@@ -6379,7 +6255,7 @@
         </p:nvGrpSpPr>
         <p:grpSpPr>
           <a:xfrm>
-            <a:off x="7809158" y="4912931"/>
+            <a:off x="10070833" y="4909953"/>
             <a:ext cx="685038" cy="849837"/>
             <a:chOff x="10571369" y="1827248"/>
             <a:chExt cx="685038" cy="849837"/>
@@ -6491,8 +6367,8 @@
         </p:nvCxnSpPr>
         <p:spPr>
           <a:xfrm flipV="1">
-            <a:off x="5234696" y="5221807"/>
-            <a:ext cx="798860" cy="7966"/>
+            <a:off x="6540083" y="5205337"/>
+            <a:ext cx="1262929" cy="24436"/>
           </a:xfrm>
           <a:prstGeom prst="straightConnector1">
             <a:avLst/>
@@ -6528,15 +6404,15 @@
           </p:cNvPr>
           <p:cNvCxnSpPr>
             <a:cxnSpLocks/>
-            <a:stCxn id="1116" idx="1"/>
+            <a:stCxn id="46" idx="1"/>
             <a:endCxn id="1113" idx="3"/>
           </p:cNvCxnSpPr>
           <p:nvPr/>
         </p:nvCxnSpPr>
         <p:spPr>
           <a:xfrm flipH="1">
-            <a:off x="6473876" y="5201205"/>
-            <a:ext cx="1389527" cy="20602"/>
+            <a:off x="8243332" y="5205337"/>
+            <a:ext cx="537249" cy="0"/>
           </a:xfrm>
           <a:prstGeom prst="straightConnector1">
             <a:avLst/>
@@ -6571,15 +6447,15 @@
           </p:cNvPr>
           <p:cNvCxnSpPr>
             <a:cxnSpLocks/>
-            <a:stCxn id="1036" idx="2"/>
-            <a:endCxn id="1062" idx="0"/>
+            <a:stCxn id="1034" idx="2"/>
+            <a:endCxn id="1070" idx="0"/>
           </p:cNvCxnSpPr>
           <p:nvPr/>
         </p:nvCxnSpPr>
         <p:spPr>
           <a:xfrm flipH="1">
-            <a:off x="7695533" y="2219599"/>
-            <a:ext cx="5002" cy="604648"/>
+            <a:off x="6270217" y="2243298"/>
+            <a:ext cx="5443" cy="947962"/>
           </a:xfrm>
           <a:prstGeom prst="straightConnector1">
             <a:avLst/>
@@ -6621,8 +6497,8 @@
         </p:nvCxnSpPr>
         <p:spPr>
           <a:xfrm>
-            <a:off x="6242674" y="4234714"/>
-            <a:ext cx="11042" cy="722460"/>
+            <a:off x="8014195" y="4020389"/>
+            <a:ext cx="8977" cy="920315"/>
           </a:xfrm>
           <a:prstGeom prst="straightConnector1">
             <a:avLst/>
@@ -6657,15 +6533,15 @@
           </p:cNvPr>
           <p:cNvCxnSpPr>
             <a:cxnSpLocks/>
-            <a:stCxn id="1082" idx="1"/>
-            <a:endCxn id="1062" idx="3"/>
+            <a:stCxn id="1082" idx="2"/>
+            <a:endCxn id="1062" idx="0"/>
           </p:cNvCxnSpPr>
           <p:nvPr/>
         </p:nvCxnSpPr>
         <p:spPr>
-          <a:xfrm flipH="1" flipV="1">
-            <a:off x="10592562" y="3583824"/>
-            <a:ext cx="469146" cy="15319"/>
+          <a:xfrm flipH="1">
+            <a:off x="8480994" y="2202132"/>
+            <a:ext cx="3594" cy="464868"/>
           </a:xfrm>
           <a:prstGeom prst="straightConnector1">
             <a:avLst/>
@@ -6745,8 +6621,343 @@
         </p:nvCxnSpPr>
         <p:spPr>
           <a:xfrm>
-            <a:off x="1848231" y="4450177"/>
+            <a:off x="1860804" y="4450177"/>
             <a:ext cx="458225" cy="0"/>
+          </a:xfrm>
+          <a:prstGeom prst="straightConnector1">
+            <a:avLst/>
+          </a:prstGeom>
+          <a:ln>
+            <a:tailEnd type="triangle"/>
+          </a:ln>
+        </p:spPr>
+        <p:style>
+          <a:lnRef idx="2">
+            <a:schemeClr val="accent1"/>
+          </a:lnRef>
+          <a:fillRef idx="0">
+            <a:schemeClr val="accent1"/>
+          </a:fillRef>
+          <a:effectRef idx="1">
+            <a:schemeClr val="accent1"/>
+          </a:effectRef>
+          <a:fontRef idx="minor">
+            <a:schemeClr val="tx1"/>
+          </a:fontRef>
+        </p:style>
+      </p:cxnSp>
+      <p:sp>
+        <p:nvSpPr>
+          <p:cNvPr id="5" name="Rectangle: Rounded Corners 4">
+            <a:extLst>
+              <a:ext uri="{FF2B5EF4-FFF2-40B4-BE49-F238E27FC236}">
+                <a16:creationId xmlns:a16="http://schemas.microsoft.com/office/drawing/2014/main" id="{C05D0CD4-DB14-E3B0-45F6-A761F03AAE0B}"/>
+              </a:ext>
+            </a:extLst>
+          </p:cNvPr>
+          <p:cNvSpPr/>
+          <p:nvPr/>
+        </p:nvSpPr>
+        <p:spPr>
+          <a:xfrm>
+            <a:off x="3505200" y="838200"/>
+            <a:ext cx="3331882" cy="1519153"/>
+          </a:xfrm>
+          <a:prstGeom prst="roundRect">
+            <a:avLst>
+              <a:gd name="adj" fmla="val 9409"/>
+            </a:avLst>
+          </a:prstGeom>
+          <a:noFill/>
+        </p:spPr>
+        <p:style>
+          <a:lnRef idx="2">
+            <a:schemeClr val="accent1"/>
+          </a:lnRef>
+          <a:fillRef idx="1">
+            <a:schemeClr val="lt1"/>
+          </a:fillRef>
+          <a:effectRef idx="0">
+            <a:schemeClr val="accent1"/>
+          </a:effectRef>
+          <a:fontRef idx="minor">
+            <a:schemeClr val="dk1"/>
+          </a:fontRef>
+        </p:style>
+        <p:txBody>
+          <a:bodyPr rtlCol="0" anchor="t"/>
+          <a:lstStyle/>
+          <a:p>
+            <a:pPr algn="ctr"/>
+            <a:r>
+              <a:rPr lang="en-US" sz="1600" b="1" dirty="0">
+                <a:latin typeface="Calibri" panose="020F0502020204030204" pitchFamily="34" charset="0"/>
+                <a:ea typeface="Calibri" panose="020F0502020204030204" pitchFamily="34" charset="0"/>
+                <a:cs typeface="Calibri" panose="020F0502020204030204" pitchFamily="34" charset="0"/>
+              </a:rPr>
+              <a:t>Continuous Integration</a:t>
+            </a:r>
+          </a:p>
+        </p:txBody>
+      </p:sp>
+      <p:sp>
+        <p:nvSpPr>
+          <p:cNvPr id="30" name="Rectangle: Rounded Corners 29">
+            <a:extLst>
+              <a:ext uri="{FF2B5EF4-FFF2-40B4-BE49-F238E27FC236}">
+                <a16:creationId xmlns:a16="http://schemas.microsoft.com/office/drawing/2014/main" id="{02AD8ADB-14CD-711A-6C9F-6B3A01E84F77}"/>
+              </a:ext>
+            </a:extLst>
+          </p:cNvPr>
+          <p:cNvSpPr/>
+          <p:nvPr/>
+        </p:nvSpPr>
+        <p:spPr>
+          <a:xfrm>
+            <a:off x="3984892" y="4427364"/>
+            <a:ext cx="3127484" cy="2327684"/>
+          </a:xfrm>
+          <a:prstGeom prst="roundRect">
+            <a:avLst>
+              <a:gd name="adj" fmla="val 3124"/>
+            </a:avLst>
+          </a:prstGeom>
+          <a:noFill/>
+        </p:spPr>
+        <p:style>
+          <a:lnRef idx="2">
+            <a:schemeClr val="accent1"/>
+          </a:lnRef>
+          <a:fillRef idx="1">
+            <a:schemeClr val="lt1"/>
+          </a:fillRef>
+          <a:effectRef idx="0">
+            <a:schemeClr val="accent1"/>
+          </a:effectRef>
+          <a:fontRef idx="minor">
+            <a:schemeClr val="dk1"/>
+          </a:fontRef>
+        </p:style>
+        <p:txBody>
+          <a:bodyPr rtlCol="0" anchor="t"/>
+          <a:lstStyle/>
+          <a:p>
+            <a:pPr algn="ctr"/>
+            <a:r>
+              <a:rPr lang="en-US" sz="1600" b="1" dirty="0">
+                <a:latin typeface="Calibri" panose="020F0502020204030204" pitchFamily="34" charset="0"/>
+                <a:ea typeface="Calibri" panose="020F0502020204030204" pitchFamily="34" charset="0"/>
+                <a:cs typeface="Calibri" panose="020F0502020204030204" pitchFamily="34" charset="0"/>
+              </a:rPr>
+              <a:t>User Management</a:t>
+            </a:r>
+          </a:p>
+        </p:txBody>
+      </p:sp>
+      <p:cxnSp>
+        <p:nvCxnSpPr>
+          <p:cNvPr id="32" name="Straight Arrow Connector 31">
+            <a:extLst>
+              <a:ext uri="{FF2B5EF4-FFF2-40B4-BE49-F238E27FC236}">
+                <a16:creationId xmlns:a16="http://schemas.microsoft.com/office/drawing/2014/main" id="{51B7A95B-81D7-073F-B7BE-B7D766A0FEA2}"/>
+              </a:ext>
+            </a:extLst>
+          </p:cNvPr>
+          <p:cNvCxnSpPr>
+            <a:cxnSpLocks/>
+            <a:stCxn id="1070" idx="3"/>
+            <a:endCxn id="1066" idx="1"/>
+          </p:cNvCxnSpPr>
+          <p:nvPr/>
+        </p:nvCxnSpPr>
+        <p:spPr>
+          <a:xfrm>
+            <a:off x="6541977" y="3463020"/>
+            <a:ext cx="289639" cy="3466"/>
+          </a:xfrm>
+          <a:prstGeom prst="straightConnector1">
+            <a:avLst/>
+          </a:prstGeom>
+          <a:ln>
+            <a:tailEnd type="triangle"/>
+          </a:ln>
+        </p:spPr>
+        <p:style>
+          <a:lnRef idx="2">
+            <a:schemeClr val="accent1"/>
+          </a:lnRef>
+          <a:fillRef idx="0">
+            <a:schemeClr val="accent1"/>
+          </a:fillRef>
+          <a:effectRef idx="1">
+            <a:schemeClr val="accent1"/>
+          </a:effectRef>
+          <a:fontRef idx="minor">
+            <a:schemeClr val="tx1"/>
+          </a:fontRef>
+        </p:style>
+      </p:cxnSp>
+      <p:cxnSp>
+        <p:nvCxnSpPr>
+          <p:cNvPr id="38" name="Straight Arrow Connector 37">
+            <a:extLst>
+              <a:ext uri="{FF2B5EF4-FFF2-40B4-BE49-F238E27FC236}">
+                <a16:creationId xmlns:a16="http://schemas.microsoft.com/office/drawing/2014/main" id="{E857AD5D-E6CC-CEA9-6D9A-21975AFE97F6}"/>
+              </a:ext>
+            </a:extLst>
+          </p:cNvPr>
+          <p:cNvCxnSpPr>
+            <a:cxnSpLocks/>
+            <a:stCxn id="1066" idx="3"/>
+            <a:endCxn id="1064" idx="1"/>
+          </p:cNvCxnSpPr>
+          <p:nvPr/>
+        </p:nvCxnSpPr>
+        <p:spPr>
+          <a:xfrm>
+            <a:off x="7364007" y="3466486"/>
+            <a:ext cx="349438" cy="6143"/>
+          </a:xfrm>
+          <a:prstGeom prst="straightConnector1">
+            <a:avLst/>
+          </a:prstGeom>
+          <a:ln>
+            <a:tailEnd type="triangle"/>
+          </a:ln>
+        </p:spPr>
+        <p:style>
+          <a:lnRef idx="2">
+            <a:schemeClr val="accent1"/>
+          </a:lnRef>
+          <a:fillRef idx="0">
+            <a:schemeClr val="accent1"/>
+          </a:fillRef>
+          <a:effectRef idx="1">
+            <a:schemeClr val="accent1"/>
+          </a:effectRef>
+          <a:fontRef idx="minor">
+            <a:schemeClr val="tx1"/>
+          </a:fontRef>
+        </p:style>
+      </p:cxnSp>
+      <p:pic>
+        <p:nvPicPr>
+          <p:cNvPr id="46" name="Picture 32">
+            <a:extLst>
+              <a:ext uri="{FF2B5EF4-FFF2-40B4-BE49-F238E27FC236}">
+                <a16:creationId xmlns:a16="http://schemas.microsoft.com/office/drawing/2014/main" id="{5297EF34-E4E6-8BE4-49E1-55F84701D07C}"/>
+              </a:ext>
+            </a:extLst>
+          </p:cNvPr>
+          <p:cNvPicPr>
+            <a:picLocks noChangeAspect="1" noChangeArrowheads="1"/>
+          </p:cNvPicPr>
+          <p:nvPr/>
+        </p:nvPicPr>
+        <p:blipFill>
+          <a:blip r:embed="rId16">
+            <a:extLst>
+              <a:ext uri="{28A0092B-C50C-407E-A947-70E740481C1C}">
+                <a14:useLocalDpi xmlns:a14="http://schemas.microsoft.com/office/drawing/2010/main" val="0"/>
+              </a:ext>
+            </a:extLst>
+          </a:blip>
+          <a:srcRect/>
+          <a:stretch>
+            <a:fillRect/>
+          </a:stretch>
+        </p:blipFill>
+        <p:spPr bwMode="auto">
+          <a:xfrm>
+            <a:off x="8780581" y="4863444"/>
+            <a:ext cx="683786" cy="683786"/>
+          </a:xfrm>
+          <a:prstGeom prst="rect">
+            <a:avLst/>
+          </a:prstGeom>
+          <a:noFill/>
+          <a:extLst>
+            <a:ext uri="{909E8E84-426E-40DD-AFC4-6F175D3DCCD1}">
+              <a14:hiddenFill xmlns:a14="http://schemas.microsoft.com/office/drawing/2010/main">
+                <a:solidFill>
+                  <a:srgbClr val="FFFFFF"/>
+                </a:solidFill>
+              </a14:hiddenFill>
+            </a:ext>
+          </a:extLst>
+        </p:spPr>
+      </p:pic>
+      <p:sp>
+        <p:nvSpPr>
+          <p:cNvPr id="47" name="TextBox 46">
+            <a:extLst>
+              <a:ext uri="{FF2B5EF4-FFF2-40B4-BE49-F238E27FC236}">
+                <a16:creationId xmlns:a16="http://schemas.microsoft.com/office/drawing/2014/main" id="{FECB2264-BC7C-88CE-4950-82AB3238D503}"/>
+              </a:ext>
+            </a:extLst>
+          </p:cNvPr>
+          <p:cNvSpPr txBox="1"/>
+          <p:nvPr/>
+        </p:nvSpPr>
+        <p:spPr>
+          <a:xfrm>
+            <a:off x="8678210" y="5432179"/>
+            <a:ext cx="907542" cy="523220"/>
+          </a:xfrm>
+          <a:prstGeom prst="rect">
+            <a:avLst/>
+          </a:prstGeom>
+          <a:noFill/>
+        </p:spPr>
+        <p:txBody>
+          <a:bodyPr wrap="square" rtlCol="0">
+            <a:spAutoFit/>
+          </a:bodyPr>
+          <a:lstStyle/>
+          <a:p>
+            <a:pPr algn="ctr"/>
+            <a:r>
+              <a:rPr lang="en-US" sz="1400" dirty="0">
+                <a:latin typeface="Calibri" panose="020F0502020204030204" pitchFamily="34" charset="0"/>
+                <a:ea typeface="Calibri" panose="020F0502020204030204" pitchFamily="34" charset="0"/>
+                <a:cs typeface="Calibri" panose="020F0502020204030204" pitchFamily="34" charset="0"/>
+              </a:rPr>
+              <a:t>Power</a:t>
+            </a:r>
+          </a:p>
+          <a:p>
+            <a:pPr algn="ctr"/>
+            <a:r>
+              <a:rPr lang="en-US" sz="1400" dirty="0">
+                <a:latin typeface="Calibri" panose="020F0502020204030204" pitchFamily="34" charset="0"/>
+                <a:ea typeface="Calibri" panose="020F0502020204030204" pitchFamily="34" charset="0"/>
+                <a:cs typeface="Calibri" panose="020F0502020204030204" pitchFamily="34" charset="0"/>
+              </a:rPr>
+              <a:t>Shell</a:t>
+            </a:r>
+          </a:p>
+        </p:txBody>
+      </p:sp>
+      <p:cxnSp>
+        <p:nvCxnSpPr>
+          <p:cNvPr id="51" name="Straight Arrow Connector 50">
+            <a:extLst>
+              <a:ext uri="{FF2B5EF4-FFF2-40B4-BE49-F238E27FC236}">
+                <a16:creationId xmlns:a16="http://schemas.microsoft.com/office/drawing/2014/main" id="{CE8C71A4-1848-F92C-C302-206B06A10C75}"/>
+              </a:ext>
+            </a:extLst>
+          </p:cNvPr>
+          <p:cNvCxnSpPr>
+            <a:cxnSpLocks/>
+            <a:stCxn id="1116" idx="1"/>
+            <a:endCxn id="46" idx="3"/>
+          </p:cNvCxnSpPr>
+          <p:nvPr/>
+        </p:nvCxnSpPr>
+        <p:spPr>
+          <a:xfrm flipH="1">
+            <a:off x="9464367" y="5198227"/>
+            <a:ext cx="660711" cy="7110"/>
           </a:xfrm>
           <a:prstGeom prst="straightConnector1">
             <a:avLst/>

</xml_diff>

<commit_message>
Extract Cabin from Drawer fix
</commit_message>
<xml_diff>
--- a/SolutionArchitecture.pptx
+++ b/SolutionArchitecture.pptx
@@ -259,7 +259,7 @@
           <a:p>
             <a:fld id="{BAD81560-E736-4A3E-98FC-5A2607D45314}" type="datetimeFigureOut">
               <a:rPr lang="en-US" smtClean="0"/>
-              <a:t>4/1/2025</a:t>
+              <a:t>4/2/2025</a:t>
             </a:fld>
             <a:endParaRPr lang="en-US"/>
           </a:p>
@@ -457,7 +457,7 @@
           <a:p>
             <a:fld id="{BAD81560-E736-4A3E-98FC-5A2607D45314}" type="datetimeFigureOut">
               <a:rPr lang="en-US" smtClean="0"/>
-              <a:t>4/1/2025</a:t>
+              <a:t>4/2/2025</a:t>
             </a:fld>
             <a:endParaRPr lang="en-US"/>
           </a:p>
@@ -665,7 +665,7 @@
           <a:p>
             <a:fld id="{BAD81560-E736-4A3E-98FC-5A2607D45314}" type="datetimeFigureOut">
               <a:rPr lang="en-US" smtClean="0"/>
-              <a:t>4/1/2025</a:t>
+              <a:t>4/2/2025</a:t>
             </a:fld>
             <a:endParaRPr lang="en-US"/>
           </a:p>
@@ -863,7 +863,7 @@
           <a:p>
             <a:fld id="{BAD81560-E736-4A3E-98FC-5A2607D45314}" type="datetimeFigureOut">
               <a:rPr lang="en-US" smtClean="0"/>
-              <a:t>4/1/2025</a:t>
+              <a:t>4/2/2025</a:t>
             </a:fld>
             <a:endParaRPr lang="en-US"/>
           </a:p>
@@ -1138,7 +1138,7 @@
           <a:p>
             <a:fld id="{BAD81560-E736-4A3E-98FC-5A2607D45314}" type="datetimeFigureOut">
               <a:rPr lang="en-US" smtClean="0"/>
-              <a:t>4/1/2025</a:t>
+              <a:t>4/2/2025</a:t>
             </a:fld>
             <a:endParaRPr lang="en-US"/>
           </a:p>
@@ -1403,7 +1403,7 @@
           <a:p>
             <a:fld id="{BAD81560-E736-4A3E-98FC-5A2607D45314}" type="datetimeFigureOut">
               <a:rPr lang="en-US" smtClean="0"/>
-              <a:t>4/1/2025</a:t>
+              <a:t>4/2/2025</a:t>
             </a:fld>
             <a:endParaRPr lang="en-US"/>
           </a:p>
@@ -1815,7 +1815,7 @@
           <a:p>
             <a:fld id="{BAD81560-E736-4A3E-98FC-5A2607D45314}" type="datetimeFigureOut">
               <a:rPr lang="en-US" smtClean="0"/>
-              <a:t>4/1/2025</a:t>
+              <a:t>4/2/2025</a:t>
             </a:fld>
             <a:endParaRPr lang="en-US"/>
           </a:p>
@@ -1956,7 +1956,7 @@
           <a:p>
             <a:fld id="{BAD81560-E736-4A3E-98FC-5A2607D45314}" type="datetimeFigureOut">
               <a:rPr lang="en-US" smtClean="0"/>
-              <a:t>4/1/2025</a:t>
+              <a:t>4/2/2025</a:t>
             </a:fld>
             <a:endParaRPr lang="en-US"/>
           </a:p>
@@ -2069,7 +2069,7 @@
           <a:p>
             <a:fld id="{BAD81560-E736-4A3E-98FC-5A2607D45314}" type="datetimeFigureOut">
               <a:rPr lang="en-US" smtClean="0"/>
-              <a:t>4/1/2025</a:t>
+              <a:t>4/2/2025</a:t>
             </a:fld>
             <a:endParaRPr lang="en-US"/>
           </a:p>
@@ -2380,7 +2380,7 @@
           <a:p>
             <a:fld id="{BAD81560-E736-4A3E-98FC-5A2607D45314}" type="datetimeFigureOut">
               <a:rPr lang="en-US" smtClean="0"/>
-              <a:t>4/1/2025</a:t>
+              <a:t>4/2/2025</a:t>
             </a:fld>
             <a:endParaRPr lang="en-US"/>
           </a:p>
@@ -2668,7 +2668,7 @@
           <a:p>
             <a:fld id="{BAD81560-E736-4A3E-98FC-5A2607D45314}" type="datetimeFigureOut">
               <a:rPr lang="en-US" smtClean="0"/>
-              <a:t>4/1/2025</a:t>
+              <a:t>4/2/2025</a:t>
             </a:fld>
             <a:endParaRPr lang="en-US"/>
           </a:p>
@@ -2909,7 +2909,7 @@
           <a:p>
             <a:fld id="{BAD81560-E736-4A3E-98FC-5A2607D45314}" type="datetimeFigureOut">
               <a:rPr lang="en-US" smtClean="0"/>
-              <a:t>4/1/2025</a:t>
+              <a:t>4/2/2025</a:t>
             </a:fld>
             <a:endParaRPr lang="en-US"/>
           </a:p>
@@ -6963,6 +6963,49 @@
             <a:avLst/>
           </a:prstGeom>
           <a:ln>
+            <a:tailEnd type="triangle"/>
+          </a:ln>
+        </p:spPr>
+        <p:style>
+          <a:lnRef idx="2">
+            <a:schemeClr val="accent1"/>
+          </a:lnRef>
+          <a:fillRef idx="0">
+            <a:schemeClr val="accent1"/>
+          </a:fillRef>
+          <a:effectRef idx="1">
+            <a:schemeClr val="accent1"/>
+          </a:effectRef>
+          <a:fontRef idx="minor">
+            <a:schemeClr val="tx1"/>
+          </a:fontRef>
+        </p:style>
+      </p:cxnSp>
+      <p:cxnSp>
+        <p:nvCxnSpPr>
+          <p:cNvPr id="2" name="Straight Arrow Connector 1">
+            <a:extLst>
+              <a:ext uri="{FF2B5EF4-FFF2-40B4-BE49-F238E27FC236}">
+                <a16:creationId xmlns:a16="http://schemas.microsoft.com/office/drawing/2014/main" id="{9E080E3A-6903-0A09-D550-6A796242293E}"/>
+              </a:ext>
+            </a:extLst>
+          </p:cNvPr>
+          <p:cNvCxnSpPr>
+            <a:cxnSpLocks/>
+            <a:stCxn id="1114" idx="2"/>
+          </p:cNvCxnSpPr>
+          <p:nvPr/>
+        </p:nvCxnSpPr>
+        <p:spPr>
+          <a:xfrm rot="5400000">
+            <a:off x="7294096" y="5638354"/>
+            <a:ext cx="539390" cy="902829"/>
+          </a:xfrm>
+          <a:prstGeom prst="bentConnector2">
+            <a:avLst/>
+          </a:prstGeom>
+          <a:ln>
+            <a:headEnd type="triangle"/>
             <a:tailEnd type="triangle"/>
           </a:ln>
         </p:spPr>

</xml_diff>

<commit_message>
Increased Limit to 100
</commit_message>
<xml_diff>
--- a/SolutionArchitecture.pptx
+++ b/SolutionArchitecture.pptx
@@ -6,6 +6,7 @@
   </p:sldMasterIdLst>
   <p:sldIdLst>
     <p:sldId id="256" r:id="rId2"/>
+    <p:sldId id="257" r:id="rId3"/>
   </p:sldIdLst>
   <p:sldSz cx="12192000" cy="6858000"/>
   <p:notesSz cx="6858000" cy="9144000"/>
@@ -259,7 +260,7 @@
           <a:p>
             <a:fld id="{BAD81560-E736-4A3E-98FC-5A2607D45314}" type="datetimeFigureOut">
               <a:rPr lang="en-US" smtClean="0"/>
-              <a:t>4/2/2025</a:t>
+              <a:t>5/7/2025</a:t>
             </a:fld>
             <a:endParaRPr lang="en-US"/>
           </a:p>
@@ -457,7 +458,7 @@
           <a:p>
             <a:fld id="{BAD81560-E736-4A3E-98FC-5A2607D45314}" type="datetimeFigureOut">
               <a:rPr lang="en-US" smtClean="0"/>
-              <a:t>4/2/2025</a:t>
+              <a:t>5/7/2025</a:t>
             </a:fld>
             <a:endParaRPr lang="en-US"/>
           </a:p>
@@ -665,7 +666,7 @@
           <a:p>
             <a:fld id="{BAD81560-E736-4A3E-98FC-5A2607D45314}" type="datetimeFigureOut">
               <a:rPr lang="en-US" smtClean="0"/>
-              <a:t>4/2/2025</a:t>
+              <a:t>5/7/2025</a:t>
             </a:fld>
             <a:endParaRPr lang="en-US"/>
           </a:p>
@@ -863,7 +864,7 @@
           <a:p>
             <a:fld id="{BAD81560-E736-4A3E-98FC-5A2607D45314}" type="datetimeFigureOut">
               <a:rPr lang="en-US" smtClean="0"/>
-              <a:t>4/2/2025</a:t>
+              <a:t>5/7/2025</a:t>
             </a:fld>
             <a:endParaRPr lang="en-US"/>
           </a:p>
@@ -1138,7 +1139,7 @@
           <a:p>
             <a:fld id="{BAD81560-E736-4A3E-98FC-5A2607D45314}" type="datetimeFigureOut">
               <a:rPr lang="en-US" smtClean="0"/>
-              <a:t>4/2/2025</a:t>
+              <a:t>5/7/2025</a:t>
             </a:fld>
             <a:endParaRPr lang="en-US"/>
           </a:p>
@@ -1403,7 +1404,7 @@
           <a:p>
             <a:fld id="{BAD81560-E736-4A3E-98FC-5A2607D45314}" type="datetimeFigureOut">
               <a:rPr lang="en-US" smtClean="0"/>
-              <a:t>4/2/2025</a:t>
+              <a:t>5/7/2025</a:t>
             </a:fld>
             <a:endParaRPr lang="en-US"/>
           </a:p>
@@ -1815,7 +1816,7 @@
           <a:p>
             <a:fld id="{BAD81560-E736-4A3E-98FC-5A2607D45314}" type="datetimeFigureOut">
               <a:rPr lang="en-US" smtClean="0"/>
-              <a:t>4/2/2025</a:t>
+              <a:t>5/7/2025</a:t>
             </a:fld>
             <a:endParaRPr lang="en-US"/>
           </a:p>
@@ -1956,7 +1957,7 @@
           <a:p>
             <a:fld id="{BAD81560-E736-4A3E-98FC-5A2607D45314}" type="datetimeFigureOut">
               <a:rPr lang="en-US" smtClean="0"/>
-              <a:t>4/2/2025</a:t>
+              <a:t>5/7/2025</a:t>
             </a:fld>
             <a:endParaRPr lang="en-US"/>
           </a:p>
@@ -2069,7 +2070,7 @@
           <a:p>
             <a:fld id="{BAD81560-E736-4A3E-98FC-5A2607D45314}" type="datetimeFigureOut">
               <a:rPr lang="en-US" smtClean="0"/>
-              <a:t>4/2/2025</a:t>
+              <a:t>5/7/2025</a:t>
             </a:fld>
             <a:endParaRPr lang="en-US"/>
           </a:p>
@@ -2380,7 +2381,7 @@
           <a:p>
             <a:fld id="{BAD81560-E736-4A3E-98FC-5A2607D45314}" type="datetimeFigureOut">
               <a:rPr lang="en-US" smtClean="0"/>
-              <a:t>4/2/2025</a:t>
+              <a:t>5/7/2025</a:t>
             </a:fld>
             <a:endParaRPr lang="en-US"/>
           </a:p>
@@ -2668,7 +2669,7 @@
           <a:p>
             <a:fld id="{BAD81560-E736-4A3E-98FC-5A2607D45314}" type="datetimeFigureOut">
               <a:rPr lang="en-US" smtClean="0"/>
-              <a:t>4/2/2025</a:t>
+              <a:t>5/7/2025</a:t>
             </a:fld>
             <a:endParaRPr lang="en-US"/>
           </a:p>
@@ -2909,7 +2910,7 @@
           <a:p>
             <a:fld id="{BAD81560-E736-4A3E-98FC-5A2607D45314}" type="datetimeFigureOut">
               <a:rPr lang="en-US" smtClean="0"/>
-              <a:t>4/2/2025</a:t>
+              <a:t>5/7/2025</a:t>
             </a:fld>
             <a:endParaRPr lang="en-US"/>
           </a:p>
@@ -7028,6 +7029,2866 @@
     <p:extLst>
       <p:ext uri="{BB962C8B-B14F-4D97-AF65-F5344CB8AC3E}">
         <p14:creationId xmlns:p14="http://schemas.microsoft.com/office/powerpoint/2010/main" val="1863836544"/>
+      </p:ext>
+    </p:extLst>
+  </p:cSld>
+  <p:clrMapOvr>
+    <a:masterClrMapping/>
+  </p:clrMapOvr>
+</p:sld>
+</file>
+
+<file path=ppt/slides/slide2.xml><?xml version="1.0" encoding="utf-8"?>
+<p:sld xmlns:a="http://schemas.openxmlformats.org/drawingml/2006/main" xmlns:r="http://schemas.openxmlformats.org/officeDocument/2006/relationships" xmlns:p="http://schemas.openxmlformats.org/presentationml/2006/main">
+  <p:cSld>
+    <p:spTree>
+      <p:nvGrpSpPr>
+        <p:cNvPr id="1" name="">
+          <a:extLst>
+            <a:ext uri="{FF2B5EF4-FFF2-40B4-BE49-F238E27FC236}">
+              <a16:creationId xmlns:a16="http://schemas.microsoft.com/office/drawing/2014/main" id="{DCED9538-5132-3C41-E1C9-E51CA0C71654}"/>
+            </a:ext>
+          </a:extLst>
+        </p:cNvPr>
+        <p:cNvGrpSpPr/>
+        <p:nvPr/>
+      </p:nvGrpSpPr>
+      <p:grpSpPr>
+        <a:xfrm>
+          <a:off x="0" y="0"/>
+          <a:ext cx="0" cy="0"/>
+          <a:chOff x="0" y="0"/>
+          <a:chExt cx="0" cy="0"/>
+        </a:xfrm>
+      </p:grpSpPr>
+      <p:pic>
+        <p:nvPicPr>
+          <p:cNvPr id="1026" name="Picture 2" descr="Python Programming Language icon SVG Vector &amp; PNG Free Download | UXWing">
+            <a:extLst>
+              <a:ext uri="{FF2B5EF4-FFF2-40B4-BE49-F238E27FC236}">
+                <a16:creationId xmlns:a16="http://schemas.microsoft.com/office/drawing/2014/main" id="{1CE46F1D-049E-7362-5F6E-8698F1A2E375}"/>
+              </a:ext>
+            </a:extLst>
+          </p:cNvPr>
+          <p:cNvPicPr>
+            <a:picLocks noChangeAspect="1" noChangeArrowheads="1"/>
+          </p:cNvPicPr>
+          <p:nvPr/>
+        </p:nvPicPr>
+        <p:blipFill>
+          <a:blip r:embed="rId2">
+            <a:extLst>
+              <a:ext uri="{28A0092B-C50C-407E-A947-70E740481C1C}">
+                <a14:useLocalDpi xmlns:a14="http://schemas.microsoft.com/office/drawing/2010/main" val="0"/>
+              </a:ext>
+            </a:extLst>
+          </a:blip>
+          <a:srcRect/>
+          <a:stretch>
+            <a:fillRect/>
+          </a:stretch>
+        </p:blipFill>
+        <p:spPr bwMode="auto">
+          <a:xfrm>
+            <a:off x="609600" y="1279176"/>
+            <a:ext cx="352751" cy="380346"/>
+          </a:xfrm>
+          <a:prstGeom prst="rect">
+            <a:avLst/>
+          </a:prstGeom>
+          <a:noFill/>
+          <a:extLst>
+            <a:ext uri="{909E8E84-426E-40DD-AFC4-6F175D3DCCD1}">
+              <a14:hiddenFill xmlns:a14="http://schemas.microsoft.com/office/drawing/2010/main">
+                <a:solidFill>
+                  <a:srgbClr val="FFFFFF"/>
+                </a:solidFill>
+              </a14:hiddenFill>
+            </a:ext>
+          </a:extLst>
+        </p:spPr>
+      </p:pic>
+      <p:pic>
+        <p:nvPicPr>
+          <p:cNvPr id="1028" name="Picture 4" descr="gaction (Branding Logo For Github Actions) · GitHub">
+            <a:extLst>
+              <a:ext uri="{FF2B5EF4-FFF2-40B4-BE49-F238E27FC236}">
+                <a16:creationId xmlns:a16="http://schemas.microsoft.com/office/drawing/2014/main" id="{75D5BD41-0E53-642C-E5A9-25FCC94E973F}"/>
+              </a:ext>
+            </a:extLst>
+          </p:cNvPr>
+          <p:cNvPicPr>
+            <a:picLocks noChangeAspect="1" noChangeArrowheads="1"/>
+          </p:cNvPicPr>
+          <p:nvPr/>
+        </p:nvPicPr>
+        <p:blipFill>
+          <a:blip r:embed="rId3">
+            <a:extLst>
+              <a:ext uri="{28A0092B-C50C-407E-A947-70E740481C1C}">
+                <a14:useLocalDpi xmlns:a14="http://schemas.microsoft.com/office/drawing/2010/main" val="0"/>
+              </a:ext>
+            </a:extLst>
+          </a:blip>
+          <a:srcRect/>
+          <a:stretch>
+            <a:fillRect/>
+          </a:stretch>
+        </p:blipFill>
+        <p:spPr bwMode="auto">
+          <a:xfrm>
+            <a:off x="9772766" y="1277125"/>
+            <a:ext cx="352312" cy="380346"/>
+          </a:xfrm>
+          <a:prstGeom prst="rect">
+            <a:avLst/>
+          </a:prstGeom>
+          <a:noFill/>
+          <a:extLst>
+            <a:ext uri="{909E8E84-426E-40DD-AFC4-6F175D3DCCD1}">
+              <a14:hiddenFill xmlns:a14="http://schemas.microsoft.com/office/drawing/2010/main">
+                <a:solidFill>
+                  <a:srgbClr val="FFFFFF"/>
+                </a:solidFill>
+              </a14:hiddenFill>
+            </a:ext>
+          </a:extLst>
+        </p:spPr>
+      </p:pic>
+      <p:sp>
+        <p:nvSpPr>
+          <p:cNvPr id="9" name="TextBox 8">
+            <a:extLst>
+              <a:ext uri="{FF2B5EF4-FFF2-40B4-BE49-F238E27FC236}">
+                <a16:creationId xmlns:a16="http://schemas.microsoft.com/office/drawing/2014/main" id="{DB18C347-C4D7-FA14-5D89-B0BA89299321}"/>
+              </a:ext>
+            </a:extLst>
+          </p:cNvPr>
+          <p:cNvSpPr txBox="1"/>
+          <p:nvPr/>
+        </p:nvSpPr>
+        <p:spPr>
+          <a:xfrm>
+            <a:off x="9696445" y="1630325"/>
+            <a:ext cx="534281" cy="400110"/>
+          </a:xfrm>
+          <a:prstGeom prst="rect">
+            <a:avLst/>
+          </a:prstGeom>
+          <a:noFill/>
+        </p:spPr>
+        <p:txBody>
+          <a:bodyPr wrap="square" lIns="0" rIns="0" rtlCol="0">
+            <a:spAutoFit/>
+          </a:bodyPr>
+          <a:lstStyle>
+            <a:defPPr>
+              <a:defRPr lang="en-US"/>
+            </a:defPPr>
+            <a:lvl1pPr algn="ctr">
+              <a:defRPr sz="1000">
+                <a:latin typeface="Calibri" panose="020F0502020204030204" pitchFamily="34" charset="0"/>
+                <a:ea typeface="Calibri" panose="020F0502020204030204" pitchFamily="34" charset="0"/>
+                <a:cs typeface="Calibri" panose="020F0502020204030204" pitchFamily="34" charset="0"/>
+              </a:defRPr>
+            </a:lvl1pPr>
+          </a:lstStyle>
+          <a:p>
+            <a:r>
+              <a:rPr lang="en-US" dirty="0"/>
+              <a:t>GitHub Actions</a:t>
+            </a:r>
+          </a:p>
+        </p:txBody>
+      </p:sp>
+      <p:pic>
+        <p:nvPicPr>
+          <p:cNvPr id="1030" name="Picture 6" descr="Github Logo - Free social media icons">
+            <a:extLst>
+              <a:ext uri="{FF2B5EF4-FFF2-40B4-BE49-F238E27FC236}">
+                <a16:creationId xmlns:a16="http://schemas.microsoft.com/office/drawing/2014/main" id="{11508580-6F14-97A9-921D-975F5292FE81}"/>
+              </a:ext>
+            </a:extLst>
+          </p:cNvPr>
+          <p:cNvPicPr>
+            <a:picLocks noChangeAspect="1" noChangeArrowheads="1"/>
+          </p:cNvPicPr>
+          <p:nvPr/>
+        </p:nvPicPr>
+        <p:blipFill>
+          <a:blip r:embed="rId4">
+            <a:extLst>
+              <a:ext uri="{28A0092B-C50C-407E-A947-70E740481C1C}">
+                <a14:useLocalDpi xmlns:a14="http://schemas.microsoft.com/office/drawing/2010/main" val="0"/>
+              </a:ext>
+            </a:extLst>
+          </a:blip>
+          <a:srcRect/>
+          <a:stretch>
+            <a:fillRect/>
+          </a:stretch>
+        </p:blipFill>
+        <p:spPr bwMode="auto">
+          <a:xfrm>
+            <a:off x="7018871" y="1277125"/>
+            <a:ext cx="352751" cy="380497"/>
+          </a:xfrm>
+          <a:prstGeom prst="rect">
+            <a:avLst/>
+          </a:prstGeom>
+          <a:noFill/>
+          <a:extLst>
+            <a:ext uri="{909E8E84-426E-40DD-AFC4-6F175D3DCCD1}">
+              <a14:hiddenFill xmlns:a14="http://schemas.microsoft.com/office/drawing/2010/main">
+                <a:solidFill>
+                  <a:srgbClr val="FFFFFF"/>
+                </a:solidFill>
+              </a14:hiddenFill>
+            </a:ext>
+          </a:extLst>
+        </p:spPr>
+      </p:pic>
+      <p:sp>
+        <p:nvSpPr>
+          <p:cNvPr id="11" name="TextBox 10">
+            <a:extLst>
+              <a:ext uri="{FF2B5EF4-FFF2-40B4-BE49-F238E27FC236}">
+                <a16:creationId xmlns:a16="http://schemas.microsoft.com/office/drawing/2014/main" id="{78723CFA-8C50-F835-0C0D-FCAFBF299D10}"/>
+              </a:ext>
+            </a:extLst>
+          </p:cNvPr>
+          <p:cNvSpPr txBox="1"/>
+          <p:nvPr/>
+        </p:nvSpPr>
+        <p:spPr>
+          <a:xfrm>
+            <a:off x="6880048" y="1593058"/>
+            <a:ext cx="666599" cy="246221"/>
+          </a:xfrm>
+          <a:prstGeom prst="rect">
+            <a:avLst/>
+          </a:prstGeom>
+          <a:noFill/>
+        </p:spPr>
+        <p:txBody>
+          <a:bodyPr wrap="square" lIns="0" rIns="0" rtlCol="0">
+            <a:spAutoFit/>
+          </a:bodyPr>
+          <a:lstStyle>
+            <a:defPPr>
+              <a:defRPr lang="en-US"/>
+            </a:defPPr>
+            <a:lvl1pPr algn="ctr">
+              <a:defRPr sz="1000">
+                <a:latin typeface="Calibri" panose="020F0502020204030204" pitchFamily="34" charset="0"/>
+                <a:ea typeface="Calibri" panose="020F0502020204030204" pitchFamily="34" charset="0"/>
+                <a:cs typeface="Calibri" panose="020F0502020204030204" pitchFamily="34" charset="0"/>
+              </a:defRPr>
+            </a:lvl1pPr>
+          </a:lstStyle>
+          <a:p>
+            <a:r>
+              <a:rPr lang="en-US" dirty="0"/>
+              <a:t>GitHub Repo</a:t>
+            </a:r>
+          </a:p>
+        </p:txBody>
+      </p:sp>
+      <p:pic>
+        <p:nvPicPr>
+          <p:cNvPr id="1032" name="Picture 8">
+            <a:extLst>
+              <a:ext uri="{FF2B5EF4-FFF2-40B4-BE49-F238E27FC236}">
+                <a16:creationId xmlns:a16="http://schemas.microsoft.com/office/drawing/2014/main" id="{74089EAB-16DC-49B9-5B4D-A60D3989B704}"/>
+              </a:ext>
+            </a:extLst>
+          </p:cNvPr>
+          <p:cNvPicPr>
+            <a:picLocks noChangeAspect="1" noChangeArrowheads="1"/>
+          </p:cNvPicPr>
+          <p:nvPr/>
+        </p:nvPicPr>
+        <p:blipFill>
+          <a:blip r:embed="rId5">
+            <a:extLst>
+              <a:ext uri="{28A0092B-C50C-407E-A947-70E740481C1C}">
+                <a14:useLocalDpi xmlns:a14="http://schemas.microsoft.com/office/drawing/2010/main" val="0"/>
+              </a:ext>
+            </a:extLst>
+          </a:blip>
+          <a:srcRect/>
+          <a:stretch>
+            <a:fillRect/>
+          </a:stretch>
+        </p:blipFill>
+        <p:spPr bwMode="auto">
+          <a:xfrm>
+            <a:off x="1250281" y="1279176"/>
+            <a:ext cx="352067" cy="380346"/>
+          </a:xfrm>
+          <a:prstGeom prst="rect">
+            <a:avLst/>
+          </a:prstGeom>
+          <a:noFill/>
+          <a:extLst>
+            <a:ext uri="{909E8E84-426E-40DD-AFC4-6F175D3DCCD1}">
+              <a14:hiddenFill xmlns:a14="http://schemas.microsoft.com/office/drawing/2010/main">
+                <a:solidFill>
+                  <a:srgbClr val="FFFFFF"/>
+                </a:solidFill>
+              </a14:hiddenFill>
+            </a:ext>
+          </a:extLst>
+        </p:spPr>
+      </p:pic>
+      <p:sp>
+        <p:nvSpPr>
+          <p:cNvPr id="12" name="TextBox 11">
+            <a:extLst>
+              <a:ext uri="{FF2B5EF4-FFF2-40B4-BE49-F238E27FC236}">
+                <a16:creationId xmlns:a16="http://schemas.microsoft.com/office/drawing/2014/main" id="{E2EAFA67-CBBE-7647-6B77-0AF427E25832}"/>
+              </a:ext>
+            </a:extLst>
+          </p:cNvPr>
+          <p:cNvSpPr txBox="1"/>
+          <p:nvPr/>
+        </p:nvSpPr>
+        <p:spPr>
+          <a:xfrm>
+            <a:off x="1232710" y="1589049"/>
+            <a:ext cx="450473" cy="246221"/>
+          </a:xfrm>
+          <a:prstGeom prst="rect">
+            <a:avLst/>
+          </a:prstGeom>
+          <a:noFill/>
+        </p:spPr>
+        <p:txBody>
+          <a:bodyPr wrap="square" lIns="0" rIns="0" rtlCol="0">
+            <a:spAutoFit/>
+          </a:bodyPr>
+          <a:lstStyle>
+            <a:defPPr>
+              <a:defRPr lang="en-US"/>
+            </a:defPPr>
+            <a:lvl1pPr algn="ctr">
+              <a:defRPr sz="1000">
+                <a:latin typeface="Calibri" panose="020F0502020204030204" pitchFamily="34" charset="0"/>
+                <a:ea typeface="Calibri" panose="020F0502020204030204" pitchFamily="34" charset="0"/>
+                <a:cs typeface="Calibri" panose="020F0502020204030204" pitchFamily="34" charset="0"/>
+              </a:defRPr>
+            </a:lvl1pPr>
+          </a:lstStyle>
+          <a:p>
+            <a:r>
+              <a:rPr lang="en-US" dirty="0"/>
+              <a:t>VS Code</a:t>
+            </a:r>
+          </a:p>
+        </p:txBody>
+      </p:sp>
+      <p:pic>
+        <p:nvPicPr>
+          <p:cNvPr id="1034" name="Picture 10" descr="Docker, logo, logos icon - Free download on Iconfinder">
+            <a:extLst>
+              <a:ext uri="{FF2B5EF4-FFF2-40B4-BE49-F238E27FC236}">
+                <a16:creationId xmlns:a16="http://schemas.microsoft.com/office/drawing/2014/main" id="{EFAE52B6-4518-295E-A332-B53EEA736233}"/>
+              </a:ext>
+            </a:extLst>
+          </p:cNvPr>
+          <p:cNvPicPr>
+            <a:picLocks noChangeAspect="1" noChangeArrowheads="1"/>
+          </p:cNvPicPr>
+          <p:nvPr/>
+        </p:nvPicPr>
+        <p:blipFill rotWithShape="1">
+          <a:blip r:embed="rId6">
+            <a:extLst>
+              <a:ext uri="{28A0092B-C50C-407E-A947-70E740481C1C}">
+                <a14:useLocalDpi xmlns:a14="http://schemas.microsoft.com/office/drawing/2010/main" val="0"/>
+              </a:ext>
+            </a:extLst>
+          </a:blip>
+          <a:srcRect b="18487"/>
+          <a:stretch/>
+        </p:blipFill>
+        <p:spPr bwMode="auto">
+          <a:xfrm>
+            <a:off x="10529596" y="1220310"/>
+            <a:ext cx="352751" cy="380346"/>
+          </a:xfrm>
+          <a:prstGeom prst="rect">
+            <a:avLst/>
+          </a:prstGeom>
+          <a:noFill/>
+          <a:extLst>
+            <a:ext uri="{909E8E84-426E-40DD-AFC4-6F175D3DCCD1}">
+              <a14:hiddenFill xmlns:a14="http://schemas.microsoft.com/office/drawing/2010/main">
+                <a:solidFill>
+                  <a:srgbClr val="FFFFFF"/>
+                </a:solidFill>
+              </a14:hiddenFill>
+            </a:ext>
+          </a:extLst>
+        </p:spPr>
+      </p:pic>
+      <p:sp>
+        <p:nvSpPr>
+          <p:cNvPr id="28" name="TextBox 27">
+            <a:extLst>
+              <a:ext uri="{FF2B5EF4-FFF2-40B4-BE49-F238E27FC236}">
+                <a16:creationId xmlns:a16="http://schemas.microsoft.com/office/drawing/2014/main" id="{F163803C-C95A-A853-F304-E1A38372D05C}"/>
+              </a:ext>
+            </a:extLst>
+          </p:cNvPr>
+          <p:cNvSpPr txBox="1"/>
+          <p:nvPr/>
+        </p:nvSpPr>
+        <p:spPr>
+          <a:xfrm>
+            <a:off x="10439389" y="1589048"/>
+            <a:ext cx="534281" cy="400110"/>
+          </a:xfrm>
+          <a:prstGeom prst="rect">
+            <a:avLst/>
+          </a:prstGeom>
+          <a:noFill/>
+        </p:spPr>
+        <p:txBody>
+          <a:bodyPr wrap="square" lIns="0" rIns="0" rtlCol="0">
+            <a:spAutoFit/>
+          </a:bodyPr>
+          <a:lstStyle>
+            <a:defPPr>
+              <a:defRPr lang="en-US"/>
+            </a:defPPr>
+            <a:lvl1pPr algn="ctr">
+              <a:defRPr sz="1000">
+                <a:latin typeface="Calibri" panose="020F0502020204030204" pitchFamily="34" charset="0"/>
+                <a:ea typeface="Calibri" panose="020F0502020204030204" pitchFamily="34" charset="0"/>
+                <a:cs typeface="Calibri" panose="020F0502020204030204" pitchFamily="34" charset="0"/>
+              </a:defRPr>
+            </a:lvl1pPr>
+          </a:lstStyle>
+          <a:p>
+            <a:r>
+              <a:rPr lang="en-US" dirty="0"/>
+              <a:t>Docker</a:t>
+            </a:r>
+          </a:p>
+          <a:p>
+            <a:r>
+              <a:rPr lang="en-US" dirty="0"/>
+              <a:t>Build</a:t>
+            </a:r>
+          </a:p>
+        </p:txBody>
+      </p:sp>
+      <p:pic>
+        <p:nvPicPr>
+          <p:cNvPr id="1038" name="Picture 14" descr="terraform&quot; Icon - Download for free – Iconduck">
+            <a:extLst>
+              <a:ext uri="{FF2B5EF4-FFF2-40B4-BE49-F238E27FC236}">
+                <a16:creationId xmlns:a16="http://schemas.microsoft.com/office/drawing/2014/main" id="{FB992BEA-AF8E-5130-BA23-B7F3633C4758}"/>
+              </a:ext>
+            </a:extLst>
+          </p:cNvPr>
+          <p:cNvPicPr>
+            <a:picLocks noChangeAspect="1" noChangeArrowheads="1"/>
+          </p:cNvPicPr>
+          <p:nvPr/>
+        </p:nvPicPr>
+        <p:blipFill>
+          <a:blip r:embed="rId7">
+            <a:extLst>
+              <a:ext uri="{28A0092B-C50C-407E-A947-70E740481C1C}">
+                <a14:useLocalDpi xmlns:a14="http://schemas.microsoft.com/office/drawing/2010/main" val="0"/>
+              </a:ext>
+            </a:extLst>
+          </a:blip>
+          <a:srcRect/>
+          <a:stretch>
+            <a:fillRect/>
+          </a:stretch>
+        </p:blipFill>
+        <p:spPr bwMode="auto">
+          <a:xfrm>
+            <a:off x="1972421" y="1279176"/>
+            <a:ext cx="352751" cy="376244"/>
+          </a:xfrm>
+          <a:prstGeom prst="rect">
+            <a:avLst/>
+          </a:prstGeom>
+          <a:noFill/>
+          <a:extLst>
+            <a:ext uri="{909E8E84-426E-40DD-AFC4-6F175D3DCCD1}">
+              <a14:hiddenFill xmlns:a14="http://schemas.microsoft.com/office/drawing/2010/main">
+                <a:solidFill>
+                  <a:srgbClr val="FFFFFF"/>
+                </a:solidFill>
+              </a14:hiddenFill>
+            </a:ext>
+          </a:extLst>
+        </p:spPr>
+      </p:pic>
+      <p:pic>
+        <p:nvPicPr>
+          <p:cNvPr id="1040" name="Picture 16" descr="Playwright icon - Free Download PNG &amp; SVG | Streamline">
+            <a:extLst>
+              <a:ext uri="{FF2B5EF4-FFF2-40B4-BE49-F238E27FC236}">
+                <a16:creationId xmlns:a16="http://schemas.microsoft.com/office/drawing/2014/main" id="{CB0DB4A2-6DFC-8CB5-727C-3657155113D8}"/>
+              </a:ext>
+            </a:extLst>
+          </p:cNvPr>
+          <p:cNvPicPr>
+            <a:picLocks noChangeAspect="1" noChangeArrowheads="1"/>
+          </p:cNvPicPr>
+          <p:nvPr/>
+        </p:nvPicPr>
+        <p:blipFill>
+          <a:blip r:embed="rId8">
+            <a:extLst>
+              <a:ext uri="{28A0092B-C50C-407E-A947-70E740481C1C}">
+                <a14:useLocalDpi xmlns:a14="http://schemas.microsoft.com/office/drawing/2010/main" val="0"/>
+              </a:ext>
+            </a:extLst>
+          </a:blip>
+          <a:srcRect/>
+          <a:stretch>
+            <a:fillRect/>
+          </a:stretch>
+        </p:blipFill>
+        <p:spPr bwMode="auto">
+          <a:xfrm>
+            <a:off x="8288682" y="1277125"/>
+            <a:ext cx="352751" cy="380346"/>
+          </a:xfrm>
+          <a:prstGeom prst="rect">
+            <a:avLst/>
+          </a:prstGeom>
+          <a:noFill/>
+          <a:extLst>
+            <a:ext uri="{909E8E84-426E-40DD-AFC4-6F175D3DCCD1}">
+              <a14:hiddenFill xmlns:a14="http://schemas.microsoft.com/office/drawing/2010/main">
+                <a:solidFill>
+                  <a:srgbClr val="FFFFFF"/>
+                </a:solidFill>
+              </a14:hiddenFill>
+            </a:ext>
+          </a:extLst>
+        </p:spPr>
+      </p:pic>
+      <p:sp>
+        <p:nvSpPr>
+          <p:cNvPr id="36" name="TextBox 35">
+            <a:extLst>
+              <a:ext uri="{FF2B5EF4-FFF2-40B4-BE49-F238E27FC236}">
+                <a16:creationId xmlns:a16="http://schemas.microsoft.com/office/drawing/2014/main" id="{825E0026-5169-2F34-C128-68DE7C887F96}"/>
+              </a:ext>
+            </a:extLst>
+          </p:cNvPr>
+          <p:cNvSpPr txBox="1"/>
+          <p:nvPr/>
+        </p:nvSpPr>
+        <p:spPr>
+          <a:xfrm>
+            <a:off x="8167079" y="1539999"/>
+            <a:ext cx="595955" cy="246221"/>
+          </a:xfrm>
+          <a:prstGeom prst="rect">
+            <a:avLst/>
+          </a:prstGeom>
+          <a:noFill/>
+        </p:spPr>
+        <p:txBody>
+          <a:bodyPr wrap="square" lIns="0" rIns="0" rtlCol="0">
+            <a:spAutoFit/>
+          </a:bodyPr>
+          <a:lstStyle>
+            <a:defPPr>
+              <a:defRPr lang="en-US"/>
+            </a:defPPr>
+            <a:lvl1pPr algn="ctr">
+              <a:defRPr sz="1000">
+                <a:latin typeface="Calibri" panose="020F0502020204030204" pitchFamily="34" charset="0"/>
+                <a:ea typeface="Calibri" panose="020F0502020204030204" pitchFamily="34" charset="0"/>
+                <a:cs typeface="Calibri" panose="020F0502020204030204" pitchFamily="34" charset="0"/>
+              </a:defRPr>
+            </a:lvl1pPr>
+          </a:lstStyle>
+          <a:p>
+            <a:r>
+              <a:rPr lang="en-US" dirty="0"/>
+              <a:t>Playwright</a:t>
+            </a:r>
+          </a:p>
+        </p:txBody>
+      </p:sp>
+      <p:sp>
+        <p:nvSpPr>
+          <p:cNvPr id="37" name="TextBox 36">
+            <a:extLst>
+              <a:ext uri="{FF2B5EF4-FFF2-40B4-BE49-F238E27FC236}">
+                <a16:creationId xmlns:a16="http://schemas.microsoft.com/office/drawing/2014/main" id="{6F39930B-E3E9-74DD-FA55-C211610BE3BB}"/>
+              </a:ext>
+            </a:extLst>
+          </p:cNvPr>
+          <p:cNvSpPr txBox="1"/>
+          <p:nvPr/>
+        </p:nvSpPr>
+        <p:spPr>
+          <a:xfrm>
+            <a:off x="541862" y="1589050"/>
+            <a:ext cx="488225" cy="246221"/>
+          </a:xfrm>
+          <a:prstGeom prst="rect">
+            <a:avLst/>
+          </a:prstGeom>
+          <a:noFill/>
+        </p:spPr>
+        <p:txBody>
+          <a:bodyPr wrap="square" lIns="0" rIns="0" rtlCol="0">
+            <a:spAutoFit/>
+          </a:bodyPr>
+          <a:lstStyle/>
+          <a:p>
+            <a:pPr algn="ctr"/>
+            <a:r>
+              <a:rPr lang="en-US" sz="1000" dirty="0">
+                <a:latin typeface="Calibri" panose="020F0502020204030204" pitchFamily="34" charset="0"/>
+                <a:ea typeface="Calibri" panose="020F0502020204030204" pitchFamily="34" charset="0"/>
+                <a:cs typeface="Calibri" panose="020F0502020204030204" pitchFamily="34" charset="0"/>
+              </a:rPr>
+              <a:t>Python</a:t>
+            </a:r>
+          </a:p>
+        </p:txBody>
+      </p:sp>
+      <p:pic>
+        <p:nvPicPr>
+          <p:cNvPr id="1042" name="Picture 18" descr="GitHub Actions SVG and transparent PNG icons | TechIcons">
+            <a:extLst>
+              <a:ext uri="{FF2B5EF4-FFF2-40B4-BE49-F238E27FC236}">
+                <a16:creationId xmlns:a16="http://schemas.microsoft.com/office/drawing/2014/main" id="{459C6454-92B6-2A68-69C0-33B638418A7C}"/>
+              </a:ext>
+            </a:extLst>
+          </p:cNvPr>
+          <p:cNvPicPr>
+            <a:picLocks noChangeAspect="1" noChangeArrowheads="1"/>
+          </p:cNvPicPr>
+          <p:nvPr/>
+        </p:nvPicPr>
+        <p:blipFill>
+          <a:blip r:embed="rId9">
+            <a:extLst>
+              <a:ext uri="{28A0092B-C50C-407E-A947-70E740481C1C}">
+                <a14:useLocalDpi xmlns:a14="http://schemas.microsoft.com/office/drawing/2010/main" val="0"/>
+              </a:ext>
+            </a:extLst>
+          </a:blip>
+          <a:srcRect/>
+          <a:stretch>
+            <a:fillRect/>
+          </a:stretch>
+        </p:blipFill>
+        <p:spPr bwMode="auto">
+          <a:xfrm>
+            <a:off x="8973776" y="1326923"/>
+            <a:ext cx="352751" cy="380346"/>
+          </a:xfrm>
+          <a:prstGeom prst="rect">
+            <a:avLst/>
+          </a:prstGeom>
+          <a:noFill/>
+          <a:extLst>
+            <a:ext uri="{909E8E84-426E-40DD-AFC4-6F175D3DCCD1}">
+              <a14:hiddenFill xmlns:a14="http://schemas.microsoft.com/office/drawing/2010/main">
+                <a:solidFill>
+                  <a:srgbClr val="FFFFFF"/>
+                </a:solidFill>
+              </a14:hiddenFill>
+            </a:ext>
+          </a:extLst>
+        </p:spPr>
+      </p:pic>
+      <p:sp>
+        <p:nvSpPr>
+          <p:cNvPr id="39" name="TextBox 38">
+            <a:extLst>
+              <a:ext uri="{FF2B5EF4-FFF2-40B4-BE49-F238E27FC236}">
+                <a16:creationId xmlns:a16="http://schemas.microsoft.com/office/drawing/2014/main" id="{A3DF5376-215F-BF2B-B974-ED694F8ED020}"/>
+              </a:ext>
+            </a:extLst>
+          </p:cNvPr>
+          <p:cNvSpPr txBox="1"/>
+          <p:nvPr/>
+        </p:nvSpPr>
+        <p:spPr>
+          <a:xfrm>
+            <a:off x="8870320" y="1630325"/>
+            <a:ext cx="617462" cy="400110"/>
+          </a:xfrm>
+          <a:prstGeom prst="rect">
+            <a:avLst/>
+          </a:prstGeom>
+          <a:noFill/>
+        </p:spPr>
+        <p:txBody>
+          <a:bodyPr wrap="square" lIns="0" rIns="0" rtlCol="0">
+            <a:spAutoFit/>
+          </a:bodyPr>
+          <a:lstStyle>
+            <a:defPPr>
+              <a:defRPr lang="en-US"/>
+            </a:defPPr>
+            <a:lvl1pPr algn="ctr">
+              <a:defRPr sz="1000">
+                <a:latin typeface="Calibri" panose="020F0502020204030204" pitchFamily="34" charset="0"/>
+                <a:ea typeface="Calibri" panose="020F0502020204030204" pitchFamily="34" charset="0"/>
+                <a:cs typeface="Calibri" panose="020F0502020204030204" pitchFamily="34" charset="0"/>
+              </a:defRPr>
+            </a:lvl1pPr>
+          </a:lstStyle>
+          <a:p>
+            <a:r>
+              <a:rPr lang="en-US" dirty="0"/>
+              <a:t>GitHub Workflow</a:t>
+            </a:r>
+          </a:p>
+        </p:txBody>
+      </p:sp>
+      <p:pic>
+        <p:nvPicPr>
+          <p:cNvPr id="1044" name="Picture 20" descr="Auth0&quot; Icon - Download for free – Iconduck">
+            <a:extLst>
+              <a:ext uri="{FF2B5EF4-FFF2-40B4-BE49-F238E27FC236}">
+                <a16:creationId xmlns:a16="http://schemas.microsoft.com/office/drawing/2014/main" id="{EB9C5265-C121-2934-552F-01EFBE2F1F0A}"/>
+              </a:ext>
+            </a:extLst>
+          </p:cNvPr>
+          <p:cNvPicPr>
+            <a:picLocks noChangeAspect="1" noChangeArrowheads="1"/>
+          </p:cNvPicPr>
+          <p:nvPr/>
+        </p:nvPicPr>
+        <p:blipFill>
+          <a:blip r:embed="rId10">
+            <a:extLst>
+              <a:ext uri="{28A0092B-C50C-407E-A947-70E740481C1C}">
+                <a14:useLocalDpi xmlns:a14="http://schemas.microsoft.com/office/drawing/2010/main" val="0"/>
+              </a:ext>
+            </a:extLst>
+          </a:blip>
+          <a:srcRect/>
+          <a:stretch>
+            <a:fillRect/>
+          </a:stretch>
+        </p:blipFill>
+        <p:spPr bwMode="auto">
+          <a:xfrm>
+            <a:off x="609600" y="2637478"/>
+            <a:ext cx="352751" cy="380346"/>
+          </a:xfrm>
+          <a:prstGeom prst="rect">
+            <a:avLst/>
+          </a:prstGeom>
+          <a:noFill/>
+          <a:extLst>
+            <a:ext uri="{909E8E84-426E-40DD-AFC4-6F175D3DCCD1}">
+              <a14:hiddenFill xmlns:a14="http://schemas.microsoft.com/office/drawing/2010/main">
+                <a:solidFill>
+                  <a:srgbClr val="FFFFFF"/>
+                </a:solidFill>
+              </a14:hiddenFill>
+            </a:ext>
+          </a:extLst>
+        </p:spPr>
+      </p:pic>
+      <p:sp>
+        <p:nvSpPr>
+          <p:cNvPr id="43" name="TextBox 42">
+            <a:extLst>
+              <a:ext uri="{FF2B5EF4-FFF2-40B4-BE49-F238E27FC236}">
+                <a16:creationId xmlns:a16="http://schemas.microsoft.com/office/drawing/2014/main" id="{89F6630A-0778-9411-4D69-E4875D9F92E9}"/>
+              </a:ext>
+            </a:extLst>
+          </p:cNvPr>
+          <p:cNvSpPr txBox="1"/>
+          <p:nvPr/>
+        </p:nvSpPr>
+        <p:spPr>
+          <a:xfrm>
+            <a:off x="553695" y="3006985"/>
+            <a:ext cx="476392" cy="246221"/>
+          </a:xfrm>
+          <a:prstGeom prst="rect">
+            <a:avLst/>
+          </a:prstGeom>
+          <a:noFill/>
+        </p:spPr>
+        <p:txBody>
+          <a:bodyPr wrap="square" lIns="0" rIns="0" rtlCol="0">
+            <a:spAutoFit/>
+          </a:bodyPr>
+          <a:lstStyle>
+            <a:defPPr>
+              <a:defRPr lang="en-US"/>
+            </a:defPPr>
+            <a:lvl1pPr algn="ctr">
+              <a:defRPr sz="1000">
+                <a:latin typeface="Calibri" panose="020F0502020204030204" pitchFamily="34" charset="0"/>
+                <a:ea typeface="Calibri" panose="020F0502020204030204" pitchFamily="34" charset="0"/>
+                <a:cs typeface="Calibri" panose="020F0502020204030204" pitchFamily="34" charset="0"/>
+              </a:defRPr>
+            </a:lvl1pPr>
+          </a:lstStyle>
+          <a:p>
+            <a:r>
+              <a:rPr lang="en-US" dirty="0"/>
+              <a:t>Auth0</a:t>
+            </a:r>
+          </a:p>
+        </p:txBody>
+      </p:sp>
+      <p:pic>
+        <p:nvPicPr>
+          <p:cNvPr id="1046" name="Picture 22" descr="Twilio SendGrid Logo">
+            <a:extLst>
+              <a:ext uri="{FF2B5EF4-FFF2-40B4-BE49-F238E27FC236}">
+                <a16:creationId xmlns:a16="http://schemas.microsoft.com/office/drawing/2014/main" id="{77D0292E-1735-FD2B-60AF-9277DD7263B2}"/>
+              </a:ext>
+            </a:extLst>
+          </p:cNvPr>
+          <p:cNvPicPr>
+            <a:picLocks noChangeAspect="1" noChangeArrowheads="1"/>
+          </p:cNvPicPr>
+          <p:nvPr/>
+        </p:nvPicPr>
+        <p:blipFill>
+          <a:blip r:embed="rId11">
+            <a:extLst>
+              <a:ext uri="{28A0092B-C50C-407E-A947-70E740481C1C}">
+                <a14:useLocalDpi xmlns:a14="http://schemas.microsoft.com/office/drawing/2010/main" val="0"/>
+              </a:ext>
+            </a:extLst>
+          </a:blip>
+          <a:srcRect/>
+          <a:stretch>
+            <a:fillRect/>
+          </a:stretch>
+        </p:blipFill>
+        <p:spPr bwMode="auto">
+          <a:xfrm>
+            <a:off x="1281570" y="2637478"/>
+            <a:ext cx="352751" cy="366539"/>
+          </a:xfrm>
+          <a:prstGeom prst="rect">
+            <a:avLst/>
+          </a:prstGeom>
+          <a:noFill/>
+          <a:extLst>
+            <a:ext uri="{909E8E84-426E-40DD-AFC4-6F175D3DCCD1}">
+              <a14:hiddenFill xmlns:a14="http://schemas.microsoft.com/office/drawing/2010/main">
+                <a:solidFill>
+                  <a:srgbClr val="FFFFFF"/>
+                </a:solidFill>
+              </a14:hiddenFill>
+            </a:ext>
+          </a:extLst>
+        </p:spPr>
+      </p:pic>
+      <p:sp>
+        <p:nvSpPr>
+          <p:cNvPr id="48" name="TextBox 47">
+            <a:extLst>
+              <a:ext uri="{FF2B5EF4-FFF2-40B4-BE49-F238E27FC236}">
+                <a16:creationId xmlns:a16="http://schemas.microsoft.com/office/drawing/2014/main" id="{69A0EB29-8AD0-2ACD-A0D4-03979A0051C4}"/>
+              </a:ext>
+            </a:extLst>
+          </p:cNvPr>
+          <p:cNvSpPr txBox="1"/>
+          <p:nvPr/>
+        </p:nvSpPr>
+        <p:spPr>
+          <a:xfrm>
+            <a:off x="1161835" y="3004017"/>
+            <a:ext cx="528958" cy="246221"/>
+          </a:xfrm>
+          <a:prstGeom prst="rect">
+            <a:avLst/>
+          </a:prstGeom>
+          <a:noFill/>
+        </p:spPr>
+        <p:txBody>
+          <a:bodyPr wrap="square" lIns="0" rIns="0" rtlCol="0">
+            <a:spAutoFit/>
+          </a:bodyPr>
+          <a:lstStyle>
+            <a:defPPr>
+              <a:defRPr lang="en-US"/>
+            </a:defPPr>
+            <a:lvl1pPr algn="ctr">
+              <a:defRPr sz="1000">
+                <a:latin typeface="Calibri" panose="020F0502020204030204" pitchFamily="34" charset="0"/>
+                <a:ea typeface="Calibri" panose="020F0502020204030204" pitchFamily="34" charset="0"/>
+                <a:cs typeface="Calibri" panose="020F0502020204030204" pitchFamily="34" charset="0"/>
+              </a:defRPr>
+            </a:lvl1pPr>
+          </a:lstStyle>
+          <a:p>
+            <a:r>
+              <a:rPr lang="en-US" dirty="0"/>
+              <a:t>SendGrid</a:t>
+            </a:r>
+          </a:p>
+        </p:txBody>
+      </p:sp>
+      <p:pic>
+        <p:nvPicPr>
+          <p:cNvPr id="1048" name="Picture 24" descr="Email Icon Blue transparent PNG - StickPNG">
+            <a:extLst>
+              <a:ext uri="{FF2B5EF4-FFF2-40B4-BE49-F238E27FC236}">
+                <a16:creationId xmlns:a16="http://schemas.microsoft.com/office/drawing/2014/main" id="{42367507-96B2-E8AA-8E82-39D22E47D946}"/>
+              </a:ext>
+            </a:extLst>
+          </p:cNvPr>
+          <p:cNvPicPr>
+            <a:picLocks noChangeAspect="1" noChangeArrowheads="1"/>
+          </p:cNvPicPr>
+          <p:nvPr/>
+        </p:nvPicPr>
+        <p:blipFill>
+          <a:blip r:embed="rId12">
+            <a:extLst>
+              <a:ext uri="{28A0092B-C50C-407E-A947-70E740481C1C}">
+                <a14:useLocalDpi xmlns:a14="http://schemas.microsoft.com/office/drawing/2010/main" val="0"/>
+              </a:ext>
+            </a:extLst>
+          </a:blip>
+          <a:srcRect/>
+          <a:stretch>
+            <a:fillRect/>
+          </a:stretch>
+        </p:blipFill>
+        <p:spPr bwMode="auto">
+          <a:xfrm>
+            <a:off x="3373719" y="2630574"/>
+            <a:ext cx="352751" cy="380346"/>
+          </a:xfrm>
+          <a:prstGeom prst="rect">
+            <a:avLst/>
+          </a:prstGeom>
+          <a:noFill/>
+          <a:extLst>
+            <a:ext uri="{909E8E84-426E-40DD-AFC4-6F175D3DCCD1}">
+              <a14:hiddenFill xmlns:a14="http://schemas.microsoft.com/office/drawing/2010/main">
+                <a:solidFill>
+                  <a:srgbClr val="FFFFFF"/>
+                </a:solidFill>
+              </a14:hiddenFill>
+            </a:ext>
+          </a:extLst>
+        </p:spPr>
+      </p:pic>
+      <p:pic>
+        <p:nvPicPr>
+          <p:cNvPr id="1050" name="Picture 26" descr="End-user | Definition">
+            <a:extLst>
+              <a:ext uri="{FF2B5EF4-FFF2-40B4-BE49-F238E27FC236}">
+                <a16:creationId xmlns:a16="http://schemas.microsoft.com/office/drawing/2014/main" id="{65596FA5-56AA-240B-7D82-E55B598CA769}"/>
+              </a:ext>
+            </a:extLst>
+          </p:cNvPr>
+          <p:cNvPicPr>
+            <a:picLocks noChangeAspect="1" noChangeArrowheads="1"/>
+          </p:cNvPicPr>
+          <p:nvPr/>
+        </p:nvPicPr>
+        <p:blipFill>
+          <a:blip r:embed="rId13">
+            <a:extLst>
+              <a:ext uri="{28A0092B-C50C-407E-A947-70E740481C1C}">
+                <a14:useLocalDpi xmlns:a14="http://schemas.microsoft.com/office/drawing/2010/main" val="0"/>
+              </a:ext>
+            </a:extLst>
+          </a:blip>
+          <a:srcRect/>
+          <a:stretch>
+            <a:fillRect/>
+          </a:stretch>
+        </p:blipFill>
+        <p:spPr bwMode="auto">
+          <a:xfrm>
+            <a:off x="2066751" y="2637478"/>
+            <a:ext cx="256850" cy="385217"/>
+          </a:xfrm>
+          <a:prstGeom prst="rect">
+            <a:avLst/>
+          </a:prstGeom>
+          <a:noFill/>
+          <a:extLst>
+            <a:ext uri="{909E8E84-426E-40DD-AFC4-6F175D3DCCD1}">
+              <a14:hiddenFill xmlns:a14="http://schemas.microsoft.com/office/drawing/2010/main">
+                <a:solidFill>
+                  <a:srgbClr val="FFFFFF"/>
+                </a:solidFill>
+              </a14:hiddenFill>
+            </a:ext>
+          </a:extLst>
+        </p:spPr>
+      </p:pic>
+      <p:sp>
+        <p:nvSpPr>
+          <p:cNvPr id="57" name="TextBox 56">
+            <a:extLst>
+              <a:ext uri="{FF2B5EF4-FFF2-40B4-BE49-F238E27FC236}">
+                <a16:creationId xmlns:a16="http://schemas.microsoft.com/office/drawing/2014/main" id="{057AAF6D-CE67-826D-5DE2-0DCA799E22C7}"/>
+              </a:ext>
+            </a:extLst>
+          </p:cNvPr>
+          <p:cNvSpPr txBox="1"/>
+          <p:nvPr/>
+        </p:nvSpPr>
+        <p:spPr>
+          <a:xfrm>
+            <a:off x="1901262" y="3017824"/>
+            <a:ext cx="587827" cy="246221"/>
+          </a:xfrm>
+          <a:prstGeom prst="rect">
+            <a:avLst/>
+          </a:prstGeom>
+          <a:noFill/>
+        </p:spPr>
+        <p:txBody>
+          <a:bodyPr wrap="square" lIns="0" rIns="0" rtlCol="0">
+            <a:spAutoFit/>
+          </a:bodyPr>
+          <a:lstStyle>
+            <a:defPPr>
+              <a:defRPr lang="en-US"/>
+            </a:defPPr>
+            <a:lvl1pPr algn="ctr">
+              <a:defRPr sz="1000">
+                <a:latin typeface="Calibri" panose="020F0502020204030204" pitchFamily="34" charset="0"/>
+                <a:ea typeface="Calibri" panose="020F0502020204030204" pitchFamily="34" charset="0"/>
+                <a:cs typeface="Calibri" panose="020F0502020204030204" pitchFamily="34" charset="0"/>
+              </a:defRPr>
+            </a:lvl1pPr>
+          </a:lstStyle>
+          <a:p>
+            <a:r>
+              <a:rPr lang="en-US" dirty="0"/>
+              <a:t>End User</a:t>
+            </a:r>
+          </a:p>
+        </p:txBody>
+      </p:sp>
+      <p:pic>
+        <p:nvPicPr>
+          <p:cNvPr id="1052" name="Picture 28" descr="Cloudflare SVG and transparent PNG icons | TechIcons">
+            <a:extLst>
+              <a:ext uri="{FF2B5EF4-FFF2-40B4-BE49-F238E27FC236}">
+                <a16:creationId xmlns:a16="http://schemas.microsoft.com/office/drawing/2014/main" id="{34C03D85-4EB1-BFED-E12B-6C991EC1DA8A}"/>
+              </a:ext>
+            </a:extLst>
+          </p:cNvPr>
+          <p:cNvPicPr>
+            <a:picLocks noChangeAspect="1" noChangeArrowheads="1"/>
+          </p:cNvPicPr>
+          <p:nvPr/>
+        </p:nvPicPr>
+        <p:blipFill rotWithShape="1">
+          <a:blip r:embed="rId14">
+            <a:extLst>
+              <a:ext uri="{28A0092B-C50C-407E-A947-70E740481C1C}">
+                <a14:useLocalDpi xmlns:a14="http://schemas.microsoft.com/office/drawing/2010/main" val="0"/>
+              </a:ext>
+            </a:extLst>
+          </a:blip>
+          <a:srcRect t="23480" b="22055"/>
+          <a:stretch/>
+        </p:blipFill>
+        <p:spPr bwMode="auto">
+          <a:xfrm>
+            <a:off x="10054350" y="2683304"/>
+            <a:ext cx="352751" cy="261078"/>
+          </a:xfrm>
+          <a:prstGeom prst="rect">
+            <a:avLst/>
+          </a:prstGeom>
+          <a:noFill/>
+          <a:extLst>
+            <a:ext uri="{909E8E84-426E-40DD-AFC4-6F175D3DCCD1}">
+              <a14:hiddenFill xmlns:a14="http://schemas.microsoft.com/office/drawing/2010/main">
+                <a:solidFill>
+                  <a:srgbClr val="FFFFFF"/>
+                </a:solidFill>
+              </a14:hiddenFill>
+            </a:ext>
+          </a:extLst>
+        </p:spPr>
+      </p:pic>
+      <p:pic>
+        <p:nvPicPr>
+          <p:cNvPr id="1056" name="Picture 32">
+            <a:extLst>
+              <a:ext uri="{FF2B5EF4-FFF2-40B4-BE49-F238E27FC236}">
+                <a16:creationId xmlns:a16="http://schemas.microsoft.com/office/drawing/2014/main" id="{CCC38B1D-D02B-4A8D-66C9-D726A9607515}"/>
+              </a:ext>
+            </a:extLst>
+          </p:cNvPr>
+          <p:cNvPicPr>
+            <a:picLocks noChangeAspect="1" noChangeArrowheads="1"/>
+          </p:cNvPicPr>
+          <p:nvPr/>
+        </p:nvPicPr>
+        <p:blipFill>
+          <a:blip r:embed="rId15">
+            <a:extLst>
+              <a:ext uri="{28A0092B-C50C-407E-A947-70E740481C1C}">
+                <a14:useLocalDpi xmlns:a14="http://schemas.microsoft.com/office/drawing/2010/main" val="0"/>
+              </a:ext>
+            </a:extLst>
+          </a:blip>
+          <a:srcRect/>
+          <a:stretch>
+            <a:fillRect/>
+          </a:stretch>
+        </p:blipFill>
+        <p:spPr bwMode="auto">
+          <a:xfrm>
+            <a:off x="9318090" y="2637478"/>
+            <a:ext cx="352750" cy="380346"/>
+          </a:xfrm>
+          <a:prstGeom prst="rect">
+            <a:avLst/>
+          </a:prstGeom>
+          <a:noFill/>
+          <a:extLst>
+            <a:ext uri="{909E8E84-426E-40DD-AFC4-6F175D3DCCD1}">
+              <a14:hiddenFill xmlns:a14="http://schemas.microsoft.com/office/drawing/2010/main">
+                <a:solidFill>
+                  <a:srgbClr val="FFFFFF"/>
+                </a:solidFill>
+              </a14:hiddenFill>
+            </a:ext>
+          </a:extLst>
+        </p:spPr>
+      </p:pic>
+      <p:sp>
+        <p:nvSpPr>
+          <p:cNvPr id="1027" name="TextBox 1026">
+            <a:extLst>
+              <a:ext uri="{FF2B5EF4-FFF2-40B4-BE49-F238E27FC236}">
+                <a16:creationId xmlns:a16="http://schemas.microsoft.com/office/drawing/2014/main" id="{A09B0747-3223-656F-95B7-F69055998C05}"/>
+              </a:ext>
+            </a:extLst>
+          </p:cNvPr>
+          <p:cNvSpPr txBox="1"/>
+          <p:nvPr/>
+        </p:nvSpPr>
+        <p:spPr>
+          <a:xfrm>
+            <a:off x="9257914" y="2988775"/>
+            <a:ext cx="459736" cy="400110"/>
+          </a:xfrm>
+          <a:prstGeom prst="rect">
+            <a:avLst/>
+          </a:prstGeom>
+          <a:noFill/>
+        </p:spPr>
+        <p:txBody>
+          <a:bodyPr wrap="square" lIns="0" rIns="0" rtlCol="0">
+            <a:spAutoFit/>
+          </a:bodyPr>
+          <a:lstStyle>
+            <a:defPPr>
+              <a:defRPr lang="en-US"/>
+            </a:defPPr>
+            <a:lvl1pPr algn="ctr">
+              <a:defRPr sz="1000">
+                <a:latin typeface="Calibri" panose="020F0502020204030204" pitchFamily="34" charset="0"/>
+                <a:ea typeface="Calibri" panose="020F0502020204030204" pitchFamily="34" charset="0"/>
+                <a:cs typeface="Calibri" panose="020F0502020204030204" pitchFamily="34" charset="0"/>
+              </a:defRPr>
+            </a:lvl1pPr>
+          </a:lstStyle>
+          <a:p>
+            <a:r>
+              <a:rPr lang="en-US" dirty="0"/>
+              <a:t>Power</a:t>
+            </a:r>
+          </a:p>
+          <a:p>
+            <a:r>
+              <a:rPr lang="en-US" dirty="0"/>
+              <a:t>Shell</a:t>
+            </a:r>
+          </a:p>
+        </p:txBody>
+      </p:sp>
+      <p:sp>
+        <p:nvSpPr>
+          <p:cNvPr id="1058" name="TextBox 1057">
+            <a:extLst>
+              <a:ext uri="{FF2B5EF4-FFF2-40B4-BE49-F238E27FC236}">
+                <a16:creationId xmlns:a16="http://schemas.microsoft.com/office/drawing/2014/main" id="{8AD90DA6-F900-62C8-282E-E08A9CBA293C}"/>
+              </a:ext>
+            </a:extLst>
+          </p:cNvPr>
+          <p:cNvSpPr txBox="1"/>
+          <p:nvPr/>
+        </p:nvSpPr>
+        <p:spPr>
+          <a:xfrm>
+            <a:off x="1770406" y="1589048"/>
+            <a:ext cx="756780" cy="246221"/>
+          </a:xfrm>
+          <a:prstGeom prst="rect">
+            <a:avLst/>
+          </a:prstGeom>
+          <a:noFill/>
+        </p:spPr>
+        <p:txBody>
+          <a:bodyPr wrap="square" lIns="0" rIns="0" rtlCol="0">
+            <a:spAutoFit/>
+          </a:bodyPr>
+          <a:lstStyle>
+            <a:defPPr>
+              <a:defRPr lang="en-US"/>
+            </a:defPPr>
+            <a:lvl1pPr algn="ctr">
+              <a:defRPr sz="1000">
+                <a:latin typeface="Calibri" panose="020F0502020204030204" pitchFamily="34" charset="0"/>
+                <a:ea typeface="Calibri" panose="020F0502020204030204" pitchFamily="34" charset="0"/>
+                <a:cs typeface="Calibri" panose="020F0502020204030204" pitchFamily="34" charset="0"/>
+              </a:defRPr>
+            </a:lvl1pPr>
+          </a:lstStyle>
+          <a:p>
+            <a:r>
+              <a:rPr lang="en-US" dirty="0"/>
+              <a:t>Terraform</a:t>
+            </a:r>
+          </a:p>
+        </p:txBody>
+      </p:sp>
+      <p:pic>
+        <p:nvPicPr>
+          <p:cNvPr id="1064" name="Picture 34" descr="S3 Bucket with Objects | AWS Storage">
+            <a:extLst>
+              <a:ext uri="{FF2B5EF4-FFF2-40B4-BE49-F238E27FC236}">
+                <a16:creationId xmlns:a16="http://schemas.microsoft.com/office/drawing/2014/main" id="{CBE95590-C19F-882C-B79E-05A0C24E2B1D}"/>
+              </a:ext>
+            </a:extLst>
+          </p:cNvPr>
+          <p:cNvPicPr>
+            <a:picLocks noChangeAspect="1" noChangeArrowheads="1"/>
+          </p:cNvPicPr>
+          <p:nvPr/>
+        </p:nvPicPr>
+        <p:blipFill>
+          <a:blip r:embed="rId16">
+            <a:extLst>
+              <a:ext uri="{28A0092B-C50C-407E-A947-70E740481C1C}">
+                <a14:useLocalDpi xmlns:a14="http://schemas.microsoft.com/office/drawing/2010/main" val="0"/>
+              </a:ext>
+            </a:extLst>
+          </a:blip>
+          <a:srcRect/>
+          <a:stretch>
+            <a:fillRect/>
+          </a:stretch>
+        </p:blipFill>
+        <p:spPr bwMode="auto">
+          <a:xfrm>
+            <a:off x="4854282" y="1269160"/>
+            <a:ext cx="352751" cy="380346"/>
+          </a:xfrm>
+          <a:prstGeom prst="rect">
+            <a:avLst/>
+          </a:prstGeom>
+          <a:noFill/>
+          <a:extLst>
+            <a:ext uri="{909E8E84-426E-40DD-AFC4-6F175D3DCCD1}">
+              <a14:hiddenFill xmlns:a14="http://schemas.microsoft.com/office/drawing/2010/main">
+                <a:solidFill>
+                  <a:srgbClr val="FFFFFF"/>
+                </a:solidFill>
+              </a14:hiddenFill>
+            </a:ext>
+          </a:extLst>
+        </p:spPr>
+      </p:pic>
+      <p:sp>
+        <p:nvSpPr>
+          <p:cNvPr id="1065" name="TextBox 1064">
+            <a:extLst>
+              <a:ext uri="{FF2B5EF4-FFF2-40B4-BE49-F238E27FC236}">
+                <a16:creationId xmlns:a16="http://schemas.microsoft.com/office/drawing/2014/main" id="{4DFC4C1F-A953-8115-D8F8-625D820464AE}"/>
+              </a:ext>
+            </a:extLst>
+          </p:cNvPr>
+          <p:cNvSpPr txBox="1"/>
+          <p:nvPr/>
+        </p:nvSpPr>
+        <p:spPr>
+          <a:xfrm>
+            <a:off x="4886273" y="1584159"/>
+            <a:ext cx="288767" cy="246221"/>
+          </a:xfrm>
+          <a:prstGeom prst="rect">
+            <a:avLst/>
+          </a:prstGeom>
+          <a:noFill/>
+        </p:spPr>
+        <p:txBody>
+          <a:bodyPr wrap="square" lIns="0" rIns="0" rtlCol="0">
+            <a:spAutoFit/>
+          </a:bodyPr>
+          <a:lstStyle>
+            <a:defPPr>
+              <a:defRPr lang="en-US"/>
+            </a:defPPr>
+            <a:lvl1pPr algn="ctr">
+              <a:defRPr sz="1000">
+                <a:latin typeface="Calibri" panose="020F0502020204030204" pitchFamily="34" charset="0"/>
+                <a:ea typeface="Calibri" panose="020F0502020204030204" pitchFamily="34" charset="0"/>
+                <a:cs typeface="Calibri" panose="020F0502020204030204" pitchFamily="34" charset="0"/>
+              </a:defRPr>
+            </a:lvl1pPr>
+          </a:lstStyle>
+          <a:p>
+            <a:r>
+              <a:rPr lang="en-US" dirty="0"/>
+              <a:t>S3</a:t>
+            </a:r>
+          </a:p>
+        </p:txBody>
+      </p:sp>
+      <p:pic>
+        <p:nvPicPr>
+          <p:cNvPr id="1066" name="Picture 36" descr="5 New Features in AWS Fargate Version 1.4 | Logicata">
+            <a:extLst>
+              <a:ext uri="{FF2B5EF4-FFF2-40B4-BE49-F238E27FC236}">
+                <a16:creationId xmlns:a16="http://schemas.microsoft.com/office/drawing/2014/main" id="{9C1BA5F8-0B9E-1A86-E4D1-CA2CC38F9ADA}"/>
+              </a:ext>
+            </a:extLst>
+          </p:cNvPr>
+          <p:cNvPicPr>
+            <a:picLocks noChangeAspect="1" noChangeArrowheads="1"/>
+          </p:cNvPicPr>
+          <p:nvPr/>
+        </p:nvPicPr>
+        <p:blipFill>
+          <a:blip r:embed="rId17">
+            <a:extLst>
+              <a:ext uri="{28A0092B-C50C-407E-A947-70E740481C1C}">
+                <a14:useLocalDpi xmlns:a14="http://schemas.microsoft.com/office/drawing/2010/main" val="0"/>
+              </a:ext>
+            </a:extLst>
+          </a:blip>
+          <a:srcRect/>
+          <a:stretch>
+            <a:fillRect/>
+          </a:stretch>
+        </p:blipFill>
+        <p:spPr bwMode="auto">
+          <a:xfrm>
+            <a:off x="4026996" y="1275074"/>
+            <a:ext cx="352751" cy="380346"/>
+          </a:xfrm>
+          <a:prstGeom prst="rect">
+            <a:avLst/>
+          </a:prstGeom>
+          <a:noFill/>
+          <a:extLst>
+            <a:ext uri="{909E8E84-426E-40DD-AFC4-6F175D3DCCD1}">
+              <a14:hiddenFill xmlns:a14="http://schemas.microsoft.com/office/drawing/2010/main">
+                <a:solidFill>
+                  <a:srgbClr val="FFFFFF"/>
+                </a:solidFill>
+              </a14:hiddenFill>
+            </a:ext>
+          </a:extLst>
+        </p:spPr>
+      </p:pic>
+      <p:sp>
+        <p:nvSpPr>
+          <p:cNvPr id="1067" name="TextBox 1066">
+            <a:extLst>
+              <a:ext uri="{FF2B5EF4-FFF2-40B4-BE49-F238E27FC236}">
+                <a16:creationId xmlns:a16="http://schemas.microsoft.com/office/drawing/2014/main" id="{ACEE9E57-9C65-E848-B931-DE6377F6C7B3}"/>
+              </a:ext>
+            </a:extLst>
+          </p:cNvPr>
+          <p:cNvSpPr txBox="1"/>
+          <p:nvPr/>
+        </p:nvSpPr>
+        <p:spPr>
+          <a:xfrm>
+            <a:off x="3840875" y="1649506"/>
+            <a:ext cx="724991" cy="246221"/>
+          </a:xfrm>
+          <a:prstGeom prst="rect">
+            <a:avLst/>
+          </a:prstGeom>
+          <a:noFill/>
+        </p:spPr>
+        <p:txBody>
+          <a:bodyPr wrap="square" lIns="0" rIns="0" rtlCol="0">
+            <a:spAutoFit/>
+          </a:bodyPr>
+          <a:lstStyle>
+            <a:defPPr>
+              <a:defRPr lang="en-US"/>
+            </a:defPPr>
+            <a:lvl1pPr algn="ctr">
+              <a:defRPr sz="1000">
+                <a:latin typeface="Calibri" panose="020F0502020204030204" pitchFamily="34" charset="0"/>
+                <a:ea typeface="Calibri" panose="020F0502020204030204" pitchFamily="34" charset="0"/>
+                <a:cs typeface="Calibri" panose="020F0502020204030204" pitchFamily="34" charset="0"/>
+              </a:defRPr>
+            </a:lvl1pPr>
+          </a:lstStyle>
+          <a:p>
+            <a:r>
+              <a:rPr lang="en-US" dirty="0"/>
+              <a:t>ECS Fargate</a:t>
+            </a:r>
+          </a:p>
+        </p:txBody>
+      </p:sp>
+      <p:pic>
+        <p:nvPicPr>
+          <p:cNvPr id="1068" name="Picture 38" descr="AWS CloudWatch Logs">
+            <a:extLst>
+              <a:ext uri="{FF2B5EF4-FFF2-40B4-BE49-F238E27FC236}">
+                <a16:creationId xmlns:a16="http://schemas.microsoft.com/office/drawing/2014/main" id="{DBA2C1E4-66B4-3B35-196B-2DE353929411}"/>
+              </a:ext>
+            </a:extLst>
+          </p:cNvPr>
+          <p:cNvPicPr>
+            <a:picLocks noChangeAspect="1" noChangeArrowheads="1"/>
+          </p:cNvPicPr>
+          <p:nvPr/>
+        </p:nvPicPr>
+        <p:blipFill>
+          <a:blip r:embed="rId18">
+            <a:extLst>
+              <a:ext uri="{28A0092B-C50C-407E-A947-70E740481C1C}">
+                <a14:useLocalDpi xmlns:a14="http://schemas.microsoft.com/office/drawing/2010/main" val="0"/>
+              </a:ext>
+            </a:extLst>
+          </a:blip>
+          <a:srcRect/>
+          <a:stretch>
+            <a:fillRect/>
+          </a:stretch>
+        </p:blipFill>
+        <p:spPr bwMode="auto">
+          <a:xfrm>
+            <a:off x="6254048" y="1277125"/>
+            <a:ext cx="351646" cy="380346"/>
+          </a:xfrm>
+          <a:prstGeom prst="rect">
+            <a:avLst/>
+          </a:prstGeom>
+          <a:noFill/>
+          <a:extLst>
+            <a:ext uri="{909E8E84-426E-40DD-AFC4-6F175D3DCCD1}">
+              <a14:hiddenFill xmlns:a14="http://schemas.microsoft.com/office/drawing/2010/main">
+                <a:solidFill>
+                  <a:srgbClr val="FFFFFF"/>
+                </a:solidFill>
+              </a14:hiddenFill>
+            </a:ext>
+          </a:extLst>
+        </p:spPr>
+      </p:pic>
+      <p:sp>
+        <p:nvSpPr>
+          <p:cNvPr id="1069" name="TextBox 1068">
+            <a:extLst>
+              <a:ext uri="{FF2B5EF4-FFF2-40B4-BE49-F238E27FC236}">
+                <a16:creationId xmlns:a16="http://schemas.microsoft.com/office/drawing/2014/main" id="{3BC36A3F-BB76-C81D-4253-189ED9B67340}"/>
+              </a:ext>
+            </a:extLst>
+          </p:cNvPr>
+          <p:cNvSpPr txBox="1"/>
+          <p:nvPr/>
+        </p:nvSpPr>
+        <p:spPr>
+          <a:xfrm>
+            <a:off x="6084755" y="1593057"/>
+            <a:ext cx="685038" cy="246221"/>
+          </a:xfrm>
+          <a:prstGeom prst="rect">
+            <a:avLst/>
+          </a:prstGeom>
+          <a:noFill/>
+        </p:spPr>
+        <p:txBody>
+          <a:bodyPr wrap="square" lIns="0" rIns="0" rtlCol="0">
+            <a:spAutoFit/>
+          </a:bodyPr>
+          <a:lstStyle>
+            <a:defPPr>
+              <a:defRPr lang="en-US"/>
+            </a:defPPr>
+            <a:lvl1pPr algn="ctr">
+              <a:defRPr sz="1000">
+                <a:latin typeface="Calibri" panose="020F0502020204030204" pitchFamily="34" charset="0"/>
+                <a:ea typeface="Calibri" panose="020F0502020204030204" pitchFamily="34" charset="0"/>
+                <a:cs typeface="Calibri" panose="020F0502020204030204" pitchFamily="34" charset="0"/>
+              </a:defRPr>
+            </a:lvl1pPr>
+          </a:lstStyle>
+          <a:p>
+            <a:r>
+              <a:rPr lang="en-US" dirty="0"/>
+              <a:t>CloudWatch</a:t>
+            </a:r>
+          </a:p>
+        </p:txBody>
+      </p:sp>
+      <p:pic>
+        <p:nvPicPr>
+          <p:cNvPr id="1070" name="Picture 12" descr="Amazon ECR | AWS Compute">
+            <a:extLst>
+              <a:ext uri="{FF2B5EF4-FFF2-40B4-BE49-F238E27FC236}">
+                <a16:creationId xmlns:a16="http://schemas.microsoft.com/office/drawing/2014/main" id="{E30E0ED3-C791-CEC1-E22D-EA92E9F2B37A}"/>
+              </a:ext>
+            </a:extLst>
+          </p:cNvPr>
+          <p:cNvPicPr>
+            <a:picLocks noChangeAspect="1" noChangeArrowheads="1"/>
+          </p:cNvPicPr>
+          <p:nvPr/>
+        </p:nvPicPr>
+        <p:blipFill>
+          <a:blip r:embed="rId19">
+            <a:extLst>
+              <a:ext uri="{28A0092B-C50C-407E-A947-70E740481C1C}">
+                <a14:useLocalDpi xmlns:a14="http://schemas.microsoft.com/office/drawing/2010/main" val="0"/>
+              </a:ext>
+            </a:extLst>
+          </a:blip>
+          <a:srcRect/>
+          <a:stretch>
+            <a:fillRect/>
+          </a:stretch>
+        </p:blipFill>
+        <p:spPr bwMode="auto">
+          <a:xfrm>
+            <a:off x="3361610" y="1275074"/>
+            <a:ext cx="376970" cy="380346"/>
+          </a:xfrm>
+          <a:prstGeom prst="rect">
+            <a:avLst/>
+          </a:prstGeom>
+          <a:noFill/>
+          <a:extLst>
+            <a:ext uri="{909E8E84-426E-40DD-AFC4-6F175D3DCCD1}">
+              <a14:hiddenFill xmlns:a14="http://schemas.microsoft.com/office/drawing/2010/main">
+                <a:solidFill>
+                  <a:srgbClr val="FFFFFF"/>
+                </a:solidFill>
+              </a14:hiddenFill>
+            </a:ext>
+          </a:extLst>
+        </p:spPr>
+      </p:pic>
+      <p:sp>
+        <p:nvSpPr>
+          <p:cNvPr id="1071" name="TextBox 1070">
+            <a:extLst>
+              <a:ext uri="{FF2B5EF4-FFF2-40B4-BE49-F238E27FC236}">
+                <a16:creationId xmlns:a16="http://schemas.microsoft.com/office/drawing/2014/main" id="{650AF755-B50B-2863-59AC-342400D2BDA5}"/>
+              </a:ext>
+            </a:extLst>
+          </p:cNvPr>
+          <p:cNvSpPr txBox="1"/>
+          <p:nvPr/>
+        </p:nvSpPr>
+        <p:spPr>
+          <a:xfrm>
+            <a:off x="3410099" y="1589048"/>
+            <a:ext cx="279992" cy="246221"/>
+          </a:xfrm>
+          <a:prstGeom prst="rect">
+            <a:avLst/>
+          </a:prstGeom>
+          <a:noFill/>
+        </p:spPr>
+        <p:txBody>
+          <a:bodyPr wrap="square" lIns="0" rIns="0" rtlCol="0">
+            <a:spAutoFit/>
+          </a:bodyPr>
+          <a:lstStyle>
+            <a:defPPr>
+              <a:defRPr lang="en-US"/>
+            </a:defPPr>
+            <a:lvl1pPr algn="ctr">
+              <a:defRPr sz="1000">
+                <a:latin typeface="Calibri" panose="020F0502020204030204" pitchFamily="34" charset="0"/>
+                <a:ea typeface="Calibri" panose="020F0502020204030204" pitchFamily="34" charset="0"/>
+                <a:cs typeface="Calibri" panose="020F0502020204030204" pitchFamily="34" charset="0"/>
+              </a:defRPr>
+            </a:lvl1pPr>
+          </a:lstStyle>
+          <a:p>
+            <a:r>
+              <a:rPr lang="en-US" dirty="0"/>
+              <a:t>ECR</a:t>
+            </a:r>
+          </a:p>
+        </p:txBody>
+      </p:sp>
+      <p:pic>
+        <p:nvPicPr>
+          <p:cNvPr id="1075" name="Picture 1074">
+            <a:extLst>
+              <a:ext uri="{FF2B5EF4-FFF2-40B4-BE49-F238E27FC236}">
+                <a16:creationId xmlns:a16="http://schemas.microsoft.com/office/drawing/2014/main" id="{4696ED94-893B-0F86-4DCC-43C8D1727432}"/>
+              </a:ext>
+            </a:extLst>
+          </p:cNvPr>
+          <p:cNvPicPr>
+            <a:picLocks noChangeAspect="1"/>
+          </p:cNvPicPr>
+          <p:nvPr/>
+        </p:nvPicPr>
+        <p:blipFill>
+          <a:blip r:embed="rId20"/>
+          <a:srcRect l="11468" t="6564" r="7282" b="7650"/>
+          <a:stretch/>
+        </p:blipFill>
+        <p:spPr>
+          <a:xfrm>
+            <a:off x="5460122" y="1277125"/>
+            <a:ext cx="352750" cy="380346"/>
+          </a:xfrm>
+          <a:prstGeom prst="rect">
+            <a:avLst/>
+          </a:prstGeom>
+        </p:spPr>
+      </p:pic>
+      <p:sp>
+        <p:nvSpPr>
+          <p:cNvPr id="1076" name="TextBox 1075">
+            <a:extLst>
+              <a:ext uri="{FF2B5EF4-FFF2-40B4-BE49-F238E27FC236}">
+                <a16:creationId xmlns:a16="http://schemas.microsoft.com/office/drawing/2014/main" id="{25207517-A879-B4D2-46B3-0DED21868E5F}"/>
+              </a:ext>
+            </a:extLst>
+          </p:cNvPr>
+          <p:cNvSpPr txBox="1"/>
+          <p:nvPr/>
+        </p:nvSpPr>
+        <p:spPr>
+          <a:xfrm>
+            <a:off x="5285220" y="1588442"/>
+            <a:ext cx="702553" cy="246221"/>
+          </a:xfrm>
+          <a:prstGeom prst="rect">
+            <a:avLst/>
+          </a:prstGeom>
+          <a:noFill/>
+        </p:spPr>
+        <p:txBody>
+          <a:bodyPr wrap="square" lIns="0" rIns="0" rtlCol="0">
+            <a:spAutoFit/>
+          </a:bodyPr>
+          <a:lstStyle>
+            <a:defPPr>
+              <a:defRPr lang="en-US"/>
+            </a:defPPr>
+            <a:lvl1pPr algn="ctr">
+              <a:defRPr sz="1000">
+                <a:latin typeface="Calibri" panose="020F0502020204030204" pitchFamily="34" charset="0"/>
+                <a:ea typeface="Calibri" panose="020F0502020204030204" pitchFamily="34" charset="0"/>
+                <a:cs typeface="Calibri" panose="020F0502020204030204" pitchFamily="34" charset="0"/>
+              </a:defRPr>
+            </a:lvl1pPr>
+          </a:lstStyle>
+          <a:p>
+            <a:r>
+              <a:rPr lang="en-US" dirty="0"/>
+              <a:t>Event Bridge</a:t>
+            </a:r>
+          </a:p>
+        </p:txBody>
+      </p:sp>
+      <p:sp>
+        <p:nvSpPr>
+          <p:cNvPr id="1094" name="TextBox 1093">
+            <a:extLst>
+              <a:ext uri="{FF2B5EF4-FFF2-40B4-BE49-F238E27FC236}">
+                <a16:creationId xmlns:a16="http://schemas.microsoft.com/office/drawing/2014/main" id="{274C854D-3567-8BAF-B78F-E3F0FA3995F7}"/>
+              </a:ext>
+            </a:extLst>
+          </p:cNvPr>
+          <p:cNvSpPr txBox="1"/>
+          <p:nvPr/>
+        </p:nvSpPr>
+        <p:spPr>
+          <a:xfrm>
+            <a:off x="3317047" y="3017824"/>
+            <a:ext cx="466093" cy="246221"/>
+          </a:xfrm>
+          <a:prstGeom prst="rect">
+            <a:avLst/>
+          </a:prstGeom>
+          <a:noFill/>
+        </p:spPr>
+        <p:txBody>
+          <a:bodyPr wrap="square" lIns="0" rIns="0" rtlCol="0">
+            <a:spAutoFit/>
+          </a:bodyPr>
+          <a:lstStyle>
+            <a:defPPr>
+              <a:defRPr lang="en-US"/>
+            </a:defPPr>
+            <a:lvl1pPr algn="ctr">
+              <a:defRPr sz="1000">
+                <a:latin typeface="Calibri" panose="020F0502020204030204" pitchFamily="34" charset="0"/>
+                <a:ea typeface="Calibri" panose="020F0502020204030204" pitchFamily="34" charset="0"/>
+                <a:cs typeface="Calibri" panose="020F0502020204030204" pitchFamily="34" charset="0"/>
+              </a:defRPr>
+            </a:lvl1pPr>
+          </a:lstStyle>
+          <a:p>
+            <a:r>
+              <a:rPr lang="en-US" dirty="0"/>
+              <a:t>Email</a:t>
+            </a:r>
+          </a:p>
+        </p:txBody>
+      </p:sp>
+      <p:pic>
+        <p:nvPicPr>
+          <p:cNvPr id="1105" name="Picture 44">
+            <a:extLst>
+              <a:ext uri="{FF2B5EF4-FFF2-40B4-BE49-F238E27FC236}">
+                <a16:creationId xmlns:a16="http://schemas.microsoft.com/office/drawing/2014/main" id="{7E01FDFB-1B44-584C-8278-72B010F5DF2D}"/>
+              </a:ext>
+            </a:extLst>
+          </p:cNvPr>
+          <p:cNvPicPr>
+            <a:picLocks noChangeAspect="1" noChangeArrowheads="1"/>
+          </p:cNvPicPr>
+          <p:nvPr/>
+        </p:nvPicPr>
+        <p:blipFill>
+          <a:blip r:embed="rId21">
+            <a:extLst>
+              <a:ext uri="{28A0092B-C50C-407E-A947-70E740481C1C}">
+                <a14:useLocalDpi xmlns:a14="http://schemas.microsoft.com/office/drawing/2010/main" val="0"/>
+              </a:ext>
+            </a:extLst>
+          </a:blip>
+          <a:srcRect/>
+          <a:stretch>
+            <a:fillRect/>
+          </a:stretch>
+        </p:blipFill>
+        <p:spPr bwMode="auto">
+          <a:xfrm>
+            <a:off x="4854218" y="2630574"/>
+            <a:ext cx="352815" cy="380346"/>
+          </a:xfrm>
+          <a:prstGeom prst="rect">
+            <a:avLst/>
+          </a:prstGeom>
+          <a:noFill/>
+          <a:extLst>
+            <a:ext uri="{909E8E84-426E-40DD-AFC4-6F175D3DCCD1}">
+              <a14:hiddenFill xmlns:a14="http://schemas.microsoft.com/office/drawing/2010/main">
+                <a:solidFill>
+                  <a:srgbClr val="FFFFFF"/>
+                </a:solidFill>
+              </a14:hiddenFill>
+            </a:ext>
+          </a:extLst>
+        </p:spPr>
+      </p:pic>
+      <p:sp>
+        <p:nvSpPr>
+          <p:cNvPr id="1106" name="TextBox 1105">
+            <a:extLst>
+              <a:ext uri="{FF2B5EF4-FFF2-40B4-BE49-F238E27FC236}">
+                <a16:creationId xmlns:a16="http://schemas.microsoft.com/office/drawing/2014/main" id="{89C816A3-F1E1-8EF0-9154-612E8649F752}"/>
+              </a:ext>
+            </a:extLst>
+          </p:cNvPr>
+          <p:cNvSpPr txBox="1"/>
+          <p:nvPr/>
+        </p:nvSpPr>
+        <p:spPr>
+          <a:xfrm>
+            <a:off x="4819106" y="3004016"/>
+            <a:ext cx="423037" cy="246221"/>
+          </a:xfrm>
+          <a:prstGeom prst="rect">
+            <a:avLst/>
+          </a:prstGeom>
+          <a:noFill/>
+        </p:spPr>
+        <p:txBody>
+          <a:bodyPr wrap="square" lIns="0" rIns="0" rtlCol="0">
+            <a:spAutoFit/>
+          </a:bodyPr>
+          <a:lstStyle>
+            <a:defPPr>
+              <a:defRPr lang="en-US"/>
+            </a:defPPr>
+            <a:lvl1pPr algn="ctr">
+              <a:defRPr sz="1000">
+                <a:latin typeface="Calibri" panose="020F0502020204030204" pitchFamily="34" charset="0"/>
+                <a:ea typeface="Calibri" panose="020F0502020204030204" pitchFamily="34" charset="0"/>
+                <a:cs typeface="Calibri" panose="020F0502020204030204" pitchFamily="34" charset="0"/>
+              </a:defRPr>
+            </a:lvl1pPr>
+          </a:lstStyle>
+          <a:p>
+            <a:r>
+              <a:rPr lang="en-US" dirty="0"/>
+              <a:t>React</a:t>
+            </a:r>
+          </a:p>
+        </p:txBody>
+      </p:sp>
+      <p:pic>
+        <p:nvPicPr>
+          <p:cNvPr id="1082" name="Picture 1081">
+            <a:extLst>
+              <a:ext uri="{FF2B5EF4-FFF2-40B4-BE49-F238E27FC236}">
+                <a16:creationId xmlns:a16="http://schemas.microsoft.com/office/drawing/2014/main" id="{1EBD8925-A000-D6F9-E0FE-A2A1D13CE746}"/>
+              </a:ext>
+            </a:extLst>
+          </p:cNvPr>
+          <p:cNvPicPr>
+            <a:picLocks noChangeAspect="1"/>
+          </p:cNvPicPr>
+          <p:nvPr/>
+        </p:nvPicPr>
+        <p:blipFill>
+          <a:blip r:embed="rId22"/>
+          <a:stretch>
+            <a:fillRect/>
+          </a:stretch>
+        </p:blipFill>
+        <p:spPr>
+          <a:xfrm>
+            <a:off x="2610108" y="1275074"/>
+            <a:ext cx="341769" cy="380346"/>
+          </a:xfrm>
+          <a:prstGeom prst="rect">
+            <a:avLst/>
+          </a:prstGeom>
+        </p:spPr>
+      </p:pic>
+      <p:sp>
+        <p:nvSpPr>
+          <p:cNvPr id="1107" name="TextBox 1106">
+            <a:extLst>
+              <a:ext uri="{FF2B5EF4-FFF2-40B4-BE49-F238E27FC236}">
+                <a16:creationId xmlns:a16="http://schemas.microsoft.com/office/drawing/2014/main" id="{FD30D259-4C61-B3E4-D655-B95F2EEC7EAC}"/>
+              </a:ext>
+            </a:extLst>
+          </p:cNvPr>
+          <p:cNvSpPr txBox="1"/>
+          <p:nvPr/>
+        </p:nvSpPr>
+        <p:spPr>
+          <a:xfrm>
+            <a:off x="2542393" y="1589048"/>
+            <a:ext cx="534281" cy="400110"/>
+          </a:xfrm>
+          <a:prstGeom prst="rect">
+            <a:avLst/>
+          </a:prstGeom>
+          <a:noFill/>
+        </p:spPr>
+        <p:txBody>
+          <a:bodyPr wrap="square" lIns="0" rIns="0" rtlCol="0">
+            <a:spAutoFit/>
+          </a:bodyPr>
+          <a:lstStyle>
+            <a:defPPr>
+              <a:defRPr lang="en-US"/>
+            </a:defPPr>
+            <a:lvl1pPr algn="ctr">
+              <a:defRPr sz="1000">
+                <a:latin typeface="Calibri" panose="020F0502020204030204" pitchFamily="34" charset="0"/>
+                <a:ea typeface="Calibri" panose="020F0502020204030204" pitchFamily="34" charset="0"/>
+                <a:cs typeface="Calibri" panose="020F0502020204030204" pitchFamily="34" charset="0"/>
+              </a:defRPr>
+            </a:lvl1pPr>
+          </a:lstStyle>
+          <a:p>
+            <a:r>
+              <a:rPr lang="en-US" dirty="0"/>
+              <a:t>Secrets Manager</a:t>
+            </a:r>
+          </a:p>
+        </p:txBody>
+      </p:sp>
+      <p:pic>
+        <p:nvPicPr>
+          <p:cNvPr id="1110" name="Picture 46" descr="aws iam&quot; Icon - Download for free – Iconduck">
+            <a:extLst>
+              <a:ext uri="{FF2B5EF4-FFF2-40B4-BE49-F238E27FC236}">
+                <a16:creationId xmlns:a16="http://schemas.microsoft.com/office/drawing/2014/main" id="{1705A0A7-5221-2BE5-383F-68FAB8F596D7}"/>
+              </a:ext>
+            </a:extLst>
+          </p:cNvPr>
+          <p:cNvPicPr>
+            <a:picLocks noChangeAspect="1" noChangeArrowheads="1"/>
+          </p:cNvPicPr>
+          <p:nvPr/>
+        </p:nvPicPr>
+        <p:blipFill>
+          <a:blip r:embed="rId23">
+            <a:extLst>
+              <a:ext uri="{28A0092B-C50C-407E-A947-70E740481C1C}">
+                <a14:useLocalDpi xmlns:a14="http://schemas.microsoft.com/office/drawing/2010/main" val="0"/>
+              </a:ext>
+            </a:extLst>
+          </a:blip>
+          <a:srcRect/>
+          <a:stretch>
+            <a:fillRect/>
+          </a:stretch>
+        </p:blipFill>
+        <p:spPr bwMode="auto">
+          <a:xfrm>
+            <a:off x="7754938" y="1267745"/>
+            <a:ext cx="199828" cy="381761"/>
+          </a:xfrm>
+          <a:prstGeom prst="rect">
+            <a:avLst/>
+          </a:prstGeom>
+          <a:noFill/>
+          <a:extLst>
+            <a:ext uri="{909E8E84-426E-40DD-AFC4-6F175D3DCCD1}">
+              <a14:hiddenFill xmlns:a14="http://schemas.microsoft.com/office/drawing/2010/main">
+                <a:solidFill>
+                  <a:srgbClr val="FFFFFF"/>
+                </a:solidFill>
+              </a14:hiddenFill>
+            </a:ext>
+          </a:extLst>
+        </p:spPr>
+      </p:pic>
+      <p:sp>
+        <p:nvSpPr>
+          <p:cNvPr id="1111" name="TextBox 1110">
+            <a:extLst>
+              <a:ext uri="{FF2B5EF4-FFF2-40B4-BE49-F238E27FC236}">
+                <a16:creationId xmlns:a16="http://schemas.microsoft.com/office/drawing/2014/main" id="{42A49317-598A-C632-0DF4-A4FA5007B68D}"/>
+              </a:ext>
+            </a:extLst>
+          </p:cNvPr>
+          <p:cNvSpPr txBox="1"/>
+          <p:nvPr/>
+        </p:nvSpPr>
+        <p:spPr>
+          <a:xfrm>
+            <a:off x="7679508" y="1593056"/>
+            <a:ext cx="342012" cy="246221"/>
+          </a:xfrm>
+          <a:prstGeom prst="rect">
+            <a:avLst/>
+          </a:prstGeom>
+          <a:noFill/>
+        </p:spPr>
+        <p:txBody>
+          <a:bodyPr wrap="square" lIns="0" rIns="0" rtlCol="0">
+            <a:spAutoFit/>
+          </a:bodyPr>
+          <a:lstStyle>
+            <a:defPPr>
+              <a:defRPr lang="en-US"/>
+            </a:defPPr>
+            <a:lvl1pPr algn="ctr">
+              <a:defRPr sz="1000">
+                <a:latin typeface="Calibri" panose="020F0502020204030204" pitchFamily="34" charset="0"/>
+                <a:ea typeface="Calibri" panose="020F0502020204030204" pitchFamily="34" charset="0"/>
+                <a:cs typeface="Calibri" panose="020F0502020204030204" pitchFamily="34" charset="0"/>
+              </a:defRPr>
+            </a:lvl1pPr>
+          </a:lstStyle>
+          <a:p>
+            <a:r>
+              <a:rPr lang="en-US" dirty="0"/>
+              <a:t>IAM</a:t>
+            </a:r>
+          </a:p>
+        </p:txBody>
+      </p:sp>
+      <p:pic>
+        <p:nvPicPr>
+          <p:cNvPr id="1113" name="Picture 48" descr="aws cloudfront&quot; Icon - Download for free – Iconduck">
+            <a:extLst>
+              <a:ext uri="{FF2B5EF4-FFF2-40B4-BE49-F238E27FC236}">
+                <a16:creationId xmlns:a16="http://schemas.microsoft.com/office/drawing/2014/main" id="{3D7694A8-69E6-2B2C-96B1-9E8C4B28EF65}"/>
+              </a:ext>
+            </a:extLst>
+          </p:cNvPr>
+          <p:cNvPicPr>
+            <a:picLocks noChangeAspect="1" noChangeArrowheads="1"/>
+          </p:cNvPicPr>
+          <p:nvPr/>
+        </p:nvPicPr>
+        <p:blipFill>
+          <a:blip r:embed="rId24">
+            <a:extLst>
+              <a:ext uri="{28A0092B-C50C-407E-A947-70E740481C1C}">
+                <a14:useLocalDpi xmlns:a14="http://schemas.microsoft.com/office/drawing/2010/main" val="0"/>
+              </a:ext>
+            </a:extLst>
+          </a:blip>
+          <a:srcRect/>
+          <a:stretch>
+            <a:fillRect/>
+          </a:stretch>
+        </p:blipFill>
+        <p:spPr bwMode="auto">
+          <a:xfrm>
+            <a:off x="2745143" y="2637478"/>
+            <a:ext cx="352751" cy="385218"/>
+          </a:xfrm>
+          <a:prstGeom prst="rect">
+            <a:avLst/>
+          </a:prstGeom>
+          <a:noFill/>
+          <a:extLst>
+            <a:ext uri="{909E8E84-426E-40DD-AFC4-6F175D3DCCD1}">
+              <a14:hiddenFill xmlns:a14="http://schemas.microsoft.com/office/drawing/2010/main">
+                <a:solidFill>
+                  <a:srgbClr val="FFFFFF"/>
+                </a:solidFill>
+              </a14:hiddenFill>
+            </a:ext>
+          </a:extLst>
+        </p:spPr>
+      </p:pic>
+      <p:sp>
+        <p:nvSpPr>
+          <p:cNvPr id="1114" name="TextBox 1113">
+            <a:extLst>
+              <a:ext uri="{FF2B5EF4-FFF2-40B4-BE49-F238E27FC236}">
+                <a16:creationId xmlns:a16="http://schemas.microsoft.com/office/drawing/2014/main" id="{17DD6BB0-060C-3A72-A2CE-07F93A6A4FF3}"/>
+              </a:ext>
+            </a:extLst>
+          </p:cNvPr>
+          <p:cNvSpPr txBox="1"/>
+          <p:nvPr/>
+        </p:nvSpPr>
+        <p:spPr>
+          <a:xfrm>
+            <a:off x="2589558" y="3004017"/>
+            <a:ext cx="666599" cy="246221"/>
+          </a:xfrm>
+          <a:prstGeom prst="rect">
+            <a:avLst/>
+          </a:prstGeom>
+          <a:noFill/>
+        </p:spPr>
+        <p:txBody>
+          <a:bodyPr wrap="square" lIns="0" rIns="0" rtlCol="0">
+            <a:spAutoFit/>
+          </a:bodyPr>
+          <a:lstStyle>
+            <a:defPPr>
+              <a:defRPr lang="en-US"/>
+            </a:defPPr>
+            <a:lvl1pPr algn="ctr">
+              <a:defRPr sz="1000">
+                <a:latin typeface="Calibri" panose="020F0502020204030204" pitchFamily="34" charset="0"/>
+                <a:ea typeface="Calibri" panose="020F0502020204030204" pitchFamily="34" charset="0"/>
+                <a:cs typeface="Calibri" panose="020F0502020204030204" pitchFamily="34" charset="0"/>
+              </a:defRPr>
+            </a:lvl1pPr>
+          </a:lstStyle>
+          <a:p>
+            <a:r>
+              <a:rPr lang="en-US" dirty="0"/>
+              <a:t>CloudFront</a:t>
+            </a:r>
+          </a:p>
+        </p:txBody>
+      </p:sp>
+      <p:pic>
+        <p:nvPicPr>
+          <p:cNvPr id="1116" name="Picture 52" descr="Node.js Explained - A beginner guide">
+            <a:extLst>
+              <a:ext uri="{FF2B5EF4-FFF2-40B4-BE49-F238E27FC236}">
+                <a16:creationId xmlns:a16="http://schemas.microsoft.com/office/drawing/2014/main" id="{CDEA8747-79C7-58AE-134F-561A51184134}"/>
+              </a:ext>
+            </a:extLst>
+          </p:cNvPr>
+          <p:cNvPicPr>
+            <a:picLocks noChangeAspect="1" noChangeArrowheads="1"/>
+          </p:cNvPicPr>
+          <p:nvPr/>
+        </p:nvPicPr>
+        <p:blipFill>
+          <a:blip r:embed="rId25">
+            <a:extLst>
+              <a:ext uri="{28A0092B-C50C-407E-A947-70E740481C1C}">
+                <a14:useLocalDpi xmlns:a14="http://schemas.microsoft.com/office/drawing/2010/main" val="0"/>
+              </a:ext>
+            </a:extLst>
+          </a:blip>
+          <a:srcRect/>
+          <a:stretch>
+            <a:fillRect/>
+          </a:stretch>
+        </p:blipFill>
+        <p:spPr bwMode="auto">
+          <a:xfrm>
+            <a:off x="4026996" y="2637478"/>
+            <a:ext cx="352751" cy="380346"/>
+          </a:xfrm>
+          <a:prstGeom prst="rect">
+            <a:avLst/>
+          </a:prstGeom>
+          <a:noFill/>
+          <a:extLst>
+            <a:ext uri="{909E8E84-426E-40DD-AFC4-6F175D3DCCD1}">
+              <a14:hiddenFill xmlns:a14="http://schemas.microsoft.com/office/drawing/2010/main">
+                <a:solidFill>
+                  <a:srgbClr val="FFFFFF"/>
+                </a:solidFill>
+              </a14:hiddenFill>
+            </a:ext>
+          </a:extLst>
+        </p:spPr>
+      </p:pic>
+      <p:sp>
+        <p:nvSpPr>
+          <p:cNvPr id="1117" name="TextBox 1116">
+            <a:extLst>
+              <a:ext uri="{FF2B5EF4-FFF2-40B4-BE49-F238E27FC236}">
+                <a16:creationId xmlns:a16="http://schemas.microsoft.com/office/drawing/2014/main" id="{D1A20D11-6C57-C11F-8E4C-EA957BBC89DF}"/>
+              </a:ext>
+            </a:extLst>
+          </p:cNvPr>
+          <p:cNvSpPr txBox="1"/>
+          <p:nvPr/>
+        </p:nvSpPr>
+        <p:spPr>
+          <a:xfrm>
+            <a:off x="3936229" y="3017824"/>
+            <a:ext cx="534281" cy="246221"/>
+          </a:xfrm>
+          <a:prstGeom prst="rect">
+            <a:avLst/>
+          </a:prstGeom>
+          <a:noFill/>
+        </p:spPr>
+        <p:txBody>
+          <a:bodyPr wrap="square" lIns="0" rIns="0" rtlCol="0">
+            <a:spAutoFit/>
+          </a:bodyPr>
+          <a:lstStyle>
+            <a:defPPr>
+              <a:defRPr lang="en-US"/>
+            </a:defPPr>
+            <a:lvl1pPr algn="ctr">
+              <a:defRPr sz="1000">
+                <a:latin typeface="Calibri" panose="020F0502020204030204" pitchFamily="34" charset="0"/>
+                <a:ea typeface="Calibri" panose="020F0502020204030204" pitchFamily="34" charset="0"/>
+                <a:cs typeface="Calibri" panose="020F0502020204030204" pitchFamily="34" charset="0"/>
+              </a:defRPr>
+            </a:lvl1pPr>
+          </a:lstStyle>
+          <a:p>
+            <a:r>
+              <a:rPr lang="en-US" dirty="0"/>
+              <a:t>Node/</a:t>
+            </a:r>
+            <a:r>
+              <a:rPr lang="en-US" dirty="0" err="1"/>
+              <a:t>js</a:t>
+            </a:r>
+            <a:endParaRPr lang="en-US" dirty="0"/>
+          </a:p>
+        </p:txBody>
+      </p:sp>
+      <p:pic>
+        <p:nvPicPr>
+          <p:cNvPr id="46" name="Picture 32">
+            <a:extLst>
+              <a:ext uri="{FF2B5EF4-FFF2-40B4-BE49-F238E27FC236}">
+                <a16:creationId xmlns:a16="http://schemas.microsoft.com/office/drawing/2014/main" id="{C9C51CBE-049E-B632-5CE9-DA1B9CF3006A}"/>
+              </a:ext>
+            </a:extLst>
+          </p:cNvPr>
+          <p:cNvPicPr>
+            <a:picLocks noChangeAspect="1" noChangeArrowheads="1"/>
+          </p:cNvPicPr>
+          <p:nvPr/>
+        </p:nvPicPr>
+        <p:blipFill>
+          <a:blip r:embed="rId15">
+            <a:extLst>
+              <a:ext uri="{28A0092B-C50C-407E-A947-70E740481C1C}">
+                <a14:useLocalDpi xmlns:a14="http://schemas.microsoft.com/office/drawing/2010/main" val="0"/>
+              </a:ext>
+            </a:extLst>
+          </a:blip>
+          <a:srcRect/>
+          <a:stretch>
+            <a:fillRect/>
+          </a:stretch>
+        </p:blipFill>
+        <p:spPr bwMode="auto">
+          <a:xfrm>
+            <a:off x="11232379" y="1267745"/>
+            <a:ext cx="352751" cy="380346"/>
+          </a:xfrm>
+          <a:prstGeom prst="rect">
+            <a:avLst/>
+          </a:prstGeom>
+          <a:noFill/>
+          <a:extLst>
+            <a:ext uri="{909E8E84-426E-40DD-AFC4-6F175D3DCCD1}">
+              <a14:hiddenFill xmlns:a14="http://schemas.microsoft.com/office/drawing/2010/main">
+                <a:solidFill>
+                  <a:srgbClr val="FFFFFF"/>
+                </a:solidFill>
+              </a14:hiddenFill>
+            </a:ext>
+          </a:extLst>
+        </p:spPr>
+      </p:pic>
+      <p:sp>
+        <p:nvSpPr>
+          <p:cNvPr id="47" name="TextBox 46">
+            <a:extLst>
+              <a:ext uri="{FF2B5EF4-FFF2-40B4-BE49-F238E27FC236}">
+                <a16:creationId xmlns:a16="http://schemas.microsoft.com/office/drawing/2014/main" id="{98C701EC-6DEC-3CA4-FF57-1F8B6772E2C8}"/>
+              </a:ext>
+            </a:extLst>
+          </p:cNvPr>
+          <p:cNvSpPr txBox="1"/>
+          <p:nvPr/>
+        </p:nvSpPr>
+        <p:spPr>
+          <a:xfrm>
+            <a:off x="11214690" y="1572561"/>
+            <a:ext cx="378119" cy="400110"/>
+          </a:xfrm>
+          <a:prstGeom prst="rect">
+            <a:avLst/>
+          </a:prstGeom>
+          <a:noFill/>
+        </p:spPr>
+        <p:txBody>
+          <a:bodyPr wrap="square" lIns="0" rIns="0" rtlCol="0">
+            <a:spAutoFit/>
+          </a:bodyPr>
+          <a:lstStyle>
+            <a:defPPr>
+              <a:defRPr lang="en-US"/>
+            </a:defPPr>
+            <a:lvl1pPr algn="ctr">
+              <a:defRPr sz="1000">
+                <a:latin typeface="Calibri" panose="020F0502020204030204" pitchFamily="34" charset="0"/>
+                <a:ea typeface="Calibri" panose="020F0502020204030204" pitchFamily="34" charset="0"/>
+                <a:cs typeface="Calibri" panose="020F0502020204030204" pitchFamily="34" charset="0"/>
+              </a:defRPr>
+            </a:lvl1pPr>
+          </a:lstStyle>
+          <a:p>
+            <a:r>
+              <a:rPr lang="en-US" dirty="0"/>
+              <a:t>Power</a:t>
+            </a:r>
+          </a:p>
+          <a:p>
+            <a:r>
+              <a:rPr lang="en-US" dirty="0"/>
+              <a:t>Shell</a:t>
+            </a:r>
+          </a:p>
+        </p:txBody>
+      </p:sp>
+      <p:sp>
+        <p:nvSpPr>
+          <p:cNvPr id="7" name="Rectangle 6">
+            <a:extLst>
+              <a:ext uri="{FF2B5EF4-FFF2-40B4-BE49-F238E27FC236}">
+                <a16:creationId xmlns:a16="http://schemas.microsoft.com/office/drawing/2014/main" id="{8B266C33-0414-114D-F5A2-35A8204D700A}"/>
+              </a:ext>
+            </a:extLst>
+          </p:cNvPr>
+          <p:cNvSpPr/>
+          <p:nvPr/>
+        </p:nvSpPr>
+        <p:spPr>
+          <a:xfrm>
+            <a:off x="609600" y="422208"/>
+            <a:ext cx="352751" cy="380346"/>
+          </a:xfrm>
+          <a:prstGeom prst="rect">
+            <a:avLst/>
+          </a:prstGeom>
+          <a:noFill/>
+        </p:spPr>
+        <p:style>
+          <a:lnRef idx="2">
+            <a:schemeClr val="accent1">
+              <a:shade val="15000"/>
+            </a:schemeClr>
+          </a:lnRef>
+          <a:fillRef idx="1">
+            <a:schemeClr val="accent1"/>
+          </a:fillRef>
+          <a:effectRef idx="0">
+            <a:schemeClr val="accent1"/>
+          </a:effectRef>
+          <a:fontRef idx="minor">
+            <a:schemeClr val="lt1"/>
+          </a:fontRef>
+        </p:style>
+        <p:txBody>
+          <a:bodyPr rtlCol="0" anchor="ctr"/>
+          <a:lstStyle/>
+          <a:p>
+            <a:pPr algn="ctr"/>
+            <a:endParaRPr lang="en-US"/>
+          </a:p>
+        </p:txBody>
+      </p:sp>
+      <p:pic>
+        <p:nvPicPr>
+          <p:cNvPr id="8" name="Picture 2" descr="Cloud Icons | AWS Lambda">
+            <a:extLst>
+              <a:ext uri="{FF2B5EF4-FFF2-40B4-BE49-F238E27FC236}">
+                <a16:creationId xmlns:a16="http://schemas.microsoft.com/office/drawing/2014/main" id="{48836009-4475-080E-0807-B3522874D297}"/>
+              </a:ext>
+            </a:extLst>
+          </p:cNvPr>
+          <p:cNvPicPr>
+            <a:picLocks noChangeAspect="1" noChangeArrowheads="1"/>
+          </p:cNvPicPr>
+          <p:nvPr/>
+        </p:nvPicPr>
+        <p:blipFill>
+          <a:blip r:embed="rId26">
+            <a:extLst>
+              <a:ext uri="{28A0092B-C50C-407E-A947-70E740481C1C}">
+                <a14:useLocalDpi xmlns:a14="http://schemas.microsoft.com/office/drawing/2010/main" val="0"/>
+              </a:ext>
+            </a:extLst>
+          </a:blip>
+          <a:srcRect/>
+          <a:stretch>
+            <a:fillRect/>
+          </a:stretch>
+        </p:blipFill>
+        <p:spPr bwMode="auto">
+          <a:xfrm>
+            <a:off x="5491149" y="2637478"/>
+            <a:ext cx="352751" cy="385218"/>
+          </a:xfrm>
+          <a:prstGeom prst="rect">
+            <a:avLst/>
+          </a:prstGeom>
+          <a:noFill/>
+          <a:extLst>
+            <a:ext uri="{909E8E84-426E-40DD-AFC4-6F175D3DCCD1}">
+              <a14:hiddenFill xmlns:a14="http://schemas.microsoft.com/office/drawing/2010/main">
+                <a:solidFill>
+                  <a:srgbClr val="FFFFFF"/>
+                </a:solidFill>
+              </a14:hiddenFill>
+            </a:ext>
+          </a:extLst>
+        </p:spPr>
+      </p:pic>
+      <p:sp>
+        <p:nvSpPr>
+          <p:cNvPr id="10" name="TextBox 9">
+            <a:extLst>
+              <a:ext uri="{FF2B5EF4-FFF2-40B4-BE49-F238E27FC236}">
+                <a16:creationId xmlns:a16="http://schemas.microsoft.com/office/drawing/2014/main" id="{84E5133C-B6CD-EAA2-6386-9B19CD94F6ED}"/>
+              </a:ext>
+            </a:extLst>
+          </p:cNvPr>
+          <p:cNvSpPr txBox="1"/>
+          <p:nvPr/>
+        </p:nvSpPr>
+        <p:spPr>
+          <a:xfrm>
+            <a:off x="5456005" y="3004016"/>
+            <a:ext cx="423037" cy="246221"/>
+          </a:xfrm>
+          <a:prstGeom prst="rect">
+            <a:avLst/>
+          </a:prstGeom>
+          <a:noFill/>
+        </p:spPr>
+        <p:txBody>
+          <a:bodyPr wrap="square" lIns="0" rIns="0" rtlCol="0">
+            <a:spAutoFit/>
+          </a:bodyPr>
+          <a:lstStyle>
+            <a:defPPr>
+              <a:defRPr lang="en-US"/>
+            </a:defPPr>
+            <a:lvl1pPr algn="ctr">
+              <a:defRPr sz="1000">
+                <a:latin typeface="Calibri" panose="020F0502020204030204" pitchFamily="34" charset="0"/>
+                <a:ea typeface="Calibri" panose="020F0502020204030204" pitchFamily="34" charset="0"/>
+                <a:cs typeface="Calibri" panose="020F0502020204030204" pitchFamily="34" charset="0"/>
+              </a:defRPr>
+            </a:lvl1pPr>
+          </a:lstStyle>
+          <a:p>
+            <a:r>
+              <a:rPr lang="en-US" dirty="0"/>
+              <a:t>Lambda</a:t>
+            </a:r>
+          </a:p>
+        </p:txBody>
+      </p:sp>
+      <p:pic>
+        <p:nvPicPr>
+          <p:cNvPr id="13" name="Picture 4" descr="aws api gateway&quot; Icon - Download for free – Iconduck">
+            <a:extLst>
+              <a:ext uri="{FF2B5EF4-FFF2-40B4-BE49-F238E27FC236}">
+                <a16:creationId xmlns:a16="http://schemas.microsoft.com/office/drawing/2014/main" id="{7B611B19-1431-5374-98BF-30CCB10CA387}"/>
+              </a:ext>
+            </a:extLst>
+          </p:cNvPr>
+          <p:cNvPicPr>
+            <a:picLocks noChangeAspect="1" noChangeArrowheads="1"/>
+          </p:cNvPicPr>
+          <p:nvPr/>
+        </p:nvPicPr>
+        <p:blipFill>
+          <a:blip r:embed="rId27">
+            <a:extLst>
+              <a:ext uri="{28A0092B-C50C-407E-A947-70E740481C1C}">
+                <a14:useLocalDpi xmlns:a14="http://schemas.microsoft.com/office/drawing/2010/main" val="0"/>
+              </a:ext>
+            </a:extLst>
+          </a:blip>
+          <a:srcRect/>
+          <a:stretch>
+            <a:fillRect/>
+          </a:stretch>
+        </p:blipFill>
+        <p:spPr bwMode="auto">
+          <a:xfrm>
+            <a:off x="6250898" y="2623670"/>
+            <a:ext cx="352751" cy="380346"/>
+          </a:xfrm>
+          <a:prstGeom prst="rect">
+            <a:avLst/>
+          </a:prstGeom>
+          <a:noFill/>
+          <a:extLst>
+            <a:ext uri="{909E8E84-426E-40DD-AFC4-6F175D3DCCD1}">
+              <a14:hiddenFill xmlns:a14="http://schemas.microsoft.com/office/drawing/2010/main">
+                <a:solidFill>
+                  <a:srgbClr val="FFFFFF"/>
+                </a:solidFill>
+              </a14:hiddenFill>
+            </a:ext>
+          </a:extLst>
+        </p:spPr>
+      </p:pic>
+      <p:sp>
+        <p:nvSpPr>
+          <p:cNvPr id="14" name="TextBox 13">
+            <a:extLst>
+              <a:ext uri="{FF2B5EF4-FFF2-40B4-BE49-F238E27FC236}">
+                <a16:creationId xmlns:a16="http://schemas.microsoft.com/office/drawing/2014/main" id="{00CA9E10-BC46-7F91-CF26-E06FEC57E923}"/>
+              </a:ext>
+            </a:extLst>
+          </p:cNvPr>
+          <p:cNvSpPr txBox="1"/>
+          <p:nvPr/>
+        </p:nvSpPr>
+        <p:spPr>
+          <a:xfrm>
+            <a:off x="6139654" y="3004015"/>
+            <a:ext cx="583874" cy="400110"/>
+          </a:xfrm>
+          <a:prstGeom prst="rect">
+            <a:avLst/>
+          </a:prstGeom>
+          <a:noFill/>
+        </p:spPr>
+        <p:txBody>
+          <a:bodyPr wrap="square" lIns="0" rIns="0" rtlCol="0">
+            <a:spAutoFit/>
+          </a:bodyPr>
+          <a:lstStyle>
+            <a:defPPr>
+              <a:defRPr lang="en-US"/>
+            </a:defPPr>
+            <a:lvl1pPr algn="ctr">
+              <a:defRPr sz="1000">
+                <a:latin typeface="Calibri" panose="020F0502020204030204" pitchFamily="34" charset="0"/>
+                <a:ea typeface="Calibri" panose="020F0502020204030204" pitchFamily="34" charset="0"/>
+                <a:cs typeface="Calibri" panose="020F0502020204030204" pitchFamily="34" charset="0"/>
+              </a:defRPr>
+            </a:lvl1pPr>
+          </a:lstStyle>
+          <a:p>
+            <a:r>
+              <a:rPr lang="en-US" dirty="0"/>
+              <a:t>API Gateway</a:t>
+            </a:r>
+          </a:p>
+        </p:txBody>
+      </p:sp>
+      <p:pic>
+        <p:nvPicPr>
+          <p:cNvPr id="18" name="Picture 17">
+            <a:extLst>
+              <a:ext uri="{FF2B5EF4-FFF2-40B4-BE49-F238E27FC236}">
+                <a16:creationId xmlns:a16="http://schemas.microsoft.com/office/drawing/2014/main" id="{72469F19-59B9-81C0-5C32-4832E7D00449}"/>
+              </a:ext>
+            </a:extLst>
+          </p:cNvPr>
+          <p:cNvPicPr>
+            <a:picLocks noChangeAspect="1"/>
+          </p:cNvPicPr>
+          <p:nvPr/>
+        </p:nvPicPr>
+        <p:blipFill>
+          <a:blip r:embed="rId28"/>
+          <a:stretch>
+            <a:fillRect/>
+          </a:stretch>
+        </p:blipFill>
+        <p:spPr>
+          <a:xfrm>
+            <a:off x="6984140" y="2637478"/>
+            <a:ext cx="352751" cy="380347"/>
+          </a:xfrm>
+          <a:prstGeom prst="rect">
+            <a:avLst/>
+          </a:prstGeom>
+        </p:spPr>
+      </p:pic>
+      <p:sp>
+        <p:nvSpPr>
+          <p:cNvPr id="19" name="TextBox 18">
+            <a:extLst>
+              <a:ext uri="{FF2B5EF4-FFF2-40B4-BE49-F238E27FC236}">
+                <a16:creationId xmlns:a16="http://schemas.microsoft.com/office/drawing/2014/main" id="{9BCE3E45-696E-57CA-C3D9-332A271CD5BE}"/>
+              </a:ext>
+            </a:extLst>
+          </p:cNvPr>
+          <p:cNvSpPr txBox="1"/>
+          <p:nvPr/>
+        </p:nvSpPr>
+        <p:spPr>
+          <a:xfrm>
+            <a:off x="6948585" y="3005065"/>
+            <a:ext cx="423037" cy="246221"/>
+          </a:xfrm>
+          <a:prstGeom prst="rect">
+            <a:avLst/>
+          </a:prstGeom>
+          <a:noFill/>
+        </p:spPr>
+        <p:txBody>
+          <a:bodyPr wrap="square" lIns="0" rIns="0" rtlCol="0">
+            <a:spAutoFit/>
+          </a:bodyPr>
+          <a:lstStyle>
+            <a:defPPr>
+              <a:defRPr lang="en-US"/>
+            </a:defPPr>
+            <a:lvl1pPr algn="ctr">
+              <a:defRPr sz="1000">
+                <a:latin typeface="Calibri" panose="020F0502020204030204" pitchFamily="34" charset="0"/>
+                <a:ea typeface="Calibri" panose="020F0502020204030204" pitchFamily="34" charset="0"/>
+                <a:cs typeface="Calibri" panose="020F0502020204030204" pitchFamily="34" charset="0"/>
+              </a:defRPr>
+            </a:lvl1pPr>
+          </a:lstStyle>
+          <a:p>
+            <a:r>
+              <a:rPr lang="en-US" dirty="0"/>
+              <a:t>JWT</a:t>
+            </a:r>
+          </a:p>
+        </p:txBody>
+      </p:sp>
+      <p:pic>
+        <p:nvPicPr>
+          <p:cNvPr id="24" name="Picture 14" descr="Firefox Relay">
+            <a:extLst>
+              <a:ext uri="{FF2B5EF4-FFF2-40B4-BE49-F238E27FC236}">
+                <a16:creationId xmlns:a16="http://schemas.microsoft.com/office/drawing/2014/main" id="{9D535874-F585-7778-0A3A-A0F0F42833E3}"/>
+              </a:ext>
+            </a:extLst>
+          </p:cNvPr>
+          <p:cNvPicPr>
+            <a:picLocks noChangeAspect="1" noChangeArrowheads="1"/>
+          </p:cNvPicPr>
+          <p:nvPr/>
+        </p:nvPicPr>
+        <p:blipFill>
+          <a:blip r:embed="rId29">
+            <a:clrChange>
+              <a:clrFrom>
+                <a:srgbClr val="FFFFFF"/>
+              </a:clrFrom>
+              <a:clrTo>
+                <a:srgbClr val="FFFFFF">
+                  <a:alpha val="0"/>
+                </a:srgbClr>
+              </a:clrTo>
+            </a:clrChange>
+            <a:extLst>
+              <a:ext uri="{28A0092B-C50C-407E-A947-70E740481C1C}">
+                <a14:useLocalDpi xmlns:a14="http://schemas.microsoft.com/office/drawing/2010/main" val="0"/>
+              </a:ext>
+            </a:extLst>
+          </a:blip>
+          <a:srcRect/>
+          <a:stretch>
+            <a:fillRect/>
+          </a:stretch>
+        </p:blipFill>
+        <p:spPr bwMode="auto">
+          <a:xfrm>
+            <a:off x="7717382" y="2637478"/>
+            <a:ext cx="352751" cy="385218"/>
+          </a:xfrm>
+          <a:prstGeom prst="rect">
+            <a:avLst/>
+          </a:prstGeom>
+          <a:noFill/>
+          <a:extLst>
+            <a:ext uri="{909E8E84-426E-40DD-AFC4-6F175D3DCCD1}">
+              <a14:hiddenFill xmlns:a14="http://schemas.microsoft.com/office/drawing/2010/main">
+                <a:solidFill>
+                  <a:srgbClr val="FFFFFF"/>
+                </a:solidFill>
+              </a14:hiddenFill>
+            </a:ext>
+          </a:extLst>
+        </p:spPr>
+      </p:pic>
+      <p:sp>
+        <p:nvSpPr>
+          <p:cNvPr id="26" name="TextBox 25">
+            <a:extLst>
+              <a:ext uri="{FF2B5EF4-FFF2-40B4-BE49-F238E27FC236}">
+                <a16:creationId xmlns:a16="http://schemas.microsoft.com/office/drawing/2014/main" id="{DBB0026A-CD97-8F5E-93CA-F828739467D3}"/>
+              </a:ext>
+            </a:extLst>
+          </p:cNvPr>
+          <p:cNvSpPr txBox="1"/>
+          <p:nvPr/>
+        </p:nvSpPr>
+        <p:spPr>
+          <a:xfrm>
+            <a:off x="7607532" y="2988775"/>
+            <a:ext cx="583874" cy="400110"/>
+          </a:xfrm>
+          <a:prstGeom prst="rect">
+            <a:avLst/>
+          </a:prstGeom>
+          <a:noFill/>
+        </p:spPr>
+        <p:txBody>
+          <a:bodyPr wrap="square" lIns="0" rIns="0" rtlCol="0">
+            <a:spAutoFit/>
+          </a:bodyPr>
+          <a:lstStyle>
+            <a:defPPr>
+              <a:defRPr lang="en-US"/>
+            </a:defPPr>
+            <a:lvl1pPr algn="ctr">
+              <a:defRPr sz="1000">
+                <a:latin typeface="Calibri" panose="020F0502020204030204" pitchFamily="34" charset="0"/>
+                <a:ea typeface="Calibri" panose="020F0502020204030204" pitchFamily="34" charset="0"/>
+                <a:cs typeface="Calibri" panose="020F0502020204030204" pitchFamily="34" charset="0"/>
+              </a:defRPr>
+            </a:lvl1pPr>
+          </a:lstStyle>
+          <a:p>
+            <a:r>
+              <a:rPr lang="en-US" dirty="0"/>
+              <a:t>Firefox Relay</a:t>
+            </a:r>
+          </a:p>
+        </p:txBody>
+      </p:sp>
+      <p:pic>
+        <p:nvPicPr>
+          <p:cNvPr id="27" name="Picture 16" descr="Lindblad logo">
+            <a:extLst>
+              <a:ext uri="{FF2B5EF4-FFF2-40B4-BE49-F238E27FC236}">
+                <a16:creationId xmlns:a16="http://schemas.microsoft.com/office/drawing/2014/main" id="{C3EBEB37-EC70-2470-2EB8-60E6933BCAAA}"/>
+              </a:ext>
+            </a:extLst>
+          </p:cNvPr>
+          <p:cNvPicPr>
+            <a:picLocks noChangeAspect="1" noChangeArrowheads="1"/>
+          </p:cNvPicPr>
+          <p:nvPr/>
+        </p:nvPicPr>
+        <p:blipFill>
+          <a:blip r:embed="rId30">
+            <a:clrChange>
+              <a:clrFrom>
+                <a:srgbClr val="FFFFFF"/>
+              </a:clrFrom>
+              <a:clrTo>
+                <a:srgbClr val="FFFFFF">
+                  <a:alpha val="0"/>
+                </a:srgbClr>
+              </a:clrTo>
+            </a:clrChange>
+            <a:extLst>
+              <a:ext uri="{28A0092B-C50C-407E-A947-70E740481C1C}">
+                <a14:useLocalDpi xmlns:a14="http://schemas.microsoft.com/office/drawing/2010/main" val="0"/>
+              </a:ext>
+            </a:extLst>
+          </a:blip>
+          <a:srcRect/>
+          <a:stretch>
+            <a:fillRect/>
+          </a:stretch>
+        </p:blipFill>
+        <p:spPr bwMode="auto">
+          <a:xfrm>
+            <a:off x="8559978" y="2637478"/>
+            <a:ext cx="352751" cy="380346"/>
+          </a:xfrm>
+          <a:prstGeom prst="rect">
+            <a:avLst/>
+          </a:prstGeom>
+          <a:noFill/>
+          <a:extLst>
+            <a:ext uri="{909E8E84-426E-40DD-AFC4-6F175D3DCCD1}">
+              <a14:hiddenFill xmlns:a14="http://schemas.microsoft.com/office/drawing/2010/main">
+                <a:solidFill>
+                  <a:srgbClr val="FFFFFF"/>
+                </a:solidFill>
+              </a14:hiddenFill>
+            </a:ext>
+          </a:extLst>
+        </p:spPr>
+      </p:pic>
+      <p:sp>
+        <p:nvSpPr>
+          <p:cNvPr id="29" name="TextBox 28">
+            <a:extLst>
+              <a:ext uri="{FF2B5EF4-FFF2-40B4-BE49-F238E27FC236}">
+                <a16:creationId xmlns:a16="http://schemas.microsoft.com/office/drawing/2014/main" id="{67E0418B-7482-8366-EF18-A02A9F6BD0DE}"/>
+              </a:ext>
+            </a:extLst>
+          </p:cNvPr>
+          <p:cNvSpPr txBox="1"/>
+          <p:nvPr/>
+        </p:nvSpPr>
+        <p:spPr>
+          <a:xfrm>
+            <a:off x="8444416" y="2998410"/>
+            <a:ext cx="583874" cy="400110"/>
+          </a:xfrm>
+          <a:prstGeom prst="rect">
+            <a:avLst/>
+          </a:prstGeom>
+          <a:noFill/>
+        </p:spPr>
+        <p:txBody>
+          <a:bodyPr wrap="square" lIns="0" rIns="0" rtlCol="0">
+            <a:spAutoFit/>
+          </a:bodyPr>
+          <a:lstStyle>
+            <a:defPPr>
+              <a:defRPr lang="en-US"/>
+            </a:defPPr>
+            <a:lvl1pPr algn="ctr">
+              <a:defRPr sz="1000">
+                <a:latin typeface="Calibri" panose="020F0502020204030204" pitchFamily="34" charset="0"/>
+                <a:ea typeface="Calibri" panose="020F0502020204030204" pitchFamily="34" charset="0"/>
+                <a:cs typeface="Calibri" panose="020F0502020204030204" pitchFamily="34" charset="0"/>
+              </a:defRPr>
+            </a:lvl1pPr>
+          </a:lstStyle>
+          <a:p>
+            <a:r>
+              <a:rPr lang="en-US" dirty="0"/>
+              <a:t>Cruise Viewer</a:t>
+            </a:r>
+          </a:p>
+        </p:txBody>
+      </p:sp>
+      <p:sp>
+        <p:nvSpPr>
+          <p:cNvPr id="2" name="TextBox 1">
+            <a:extLst>
+              <a:ext uri="{FF2B5EF4-FFF2-40B4-BE49-F238E27FC236}">
+                <a16:creationId xmlns:a16="http://schemas.microsoft.com/office/drawing/2014/main" id="{36480B35-5F8C-8295-4866-5F2A75C94EDF}"/>
+              </a:ext>
+            </a:extLst>
+          </p:cNvPr>
+          <p:cNvSpPr txBox="1"/>
+          <p:nvPr/>
+        </p:nvSpPr>
+        <p:spPr>
+          <a:xfrm>
+            <a:off x="10000857" y="2927071"/>
+            <a:ext cx="459736" cy="400110"/>
+          </a:xfrm>
+          <a:prstGeom prst="rect">
+            <a:avLst/>
+          </a:prstGeom>
+          <a:noFill/>
+        </p:spPr>
+        <p:txBody>
+          <a:bodyPr wrap="square" lIns="0" rIns="0" rtlCol="0" anchor="t">
+            <a:spAutoFit/>
+          </a:bodyPr>
+          <a:lstStyle>
+            <a:defPPr>
+              <a:defRPr lang="en-US"/>
+            </a:defPPr>
+            <a:lvl1pPr algn="ctr">
+              <a:defRPr sz="1000">
+                <a:latin typeface="Calibri" panose="020F0502020204030204" pitchFamily="34" charset="0"/>
+                <a:ea typeface="Calibri" panose="020F0502020204030204" pitchFamily="34" charset="0"/>
+                <a:cs typeface="Calibri" panose="020F0502020204030204" pitchFamily="34" charset="0"/>
+              </a:defRPr>
+            </a:lvl1pPr>
+          </a:lstStyle>
+          <a:p>
+            <a:r>
+              <a:rPr lang="en-US" dirty="0"/>
+              <a:t>Cloud</a:t>
+            </a:r>
+          </a:p>
+          <a:p>
+            <a:r>
+              <a:rPr lang="en-US" dirty="0"/>
+              <a:t>Flare</a:t>
+            </a:r>
+          </a:p>
+        </p:txBody>
+      </p:sp>
+    </p:spTree>
+    <p:extLst>
+      <p:ext uri="{BB962C8B-B14F-4D97-AF65-F5344CB8AC3E}">
+        <p14:creationId xmlns:p14="http://schemas.microsoft.com/office/powerpoint/2010/main" val="3004675614"/>
       </p:ext>
     </p:extLst>
   </p:cSld>

</xml_diff>

<commit_message>
Added container insites & cloud front to terraform
</commit_message>
<xml_diff>
--- a/SolutionArchitecture.pptx
+++ b/SolutionArchitecture.pptx
@@ -260,7 +260,7 @@
           <a:p>
             <a:fld id="{BAD81560-E736-4A3E-98FC-5A2607D45314}" type="datetimeFigureOut">
               <a:rPr lang="en-US" smtClean="0"/>
-              <a:t>5/7/2025</a:t>
+              <a:t>5/17/2025</a:t>
             </a:fld>
             <a:endParaRPr lang="en-US"/>
           </a:p>
@@ -458,7 +458,7 @@
           <a:p>
             <a:fld id="{BAD81560-E736-4A3E-98FC-5A2607D45314}" type="datetimeFigureOut">
               <a:rPr lang="en-US" smtClean="0"/>
-              <a:t>5/7/2025</a:t>
+              <a:t>5/17/2025</a:t>
             </a:fld>
             <a:endParaRPr lang="en-US"/>
           </a:p>
@@ -666,7 +666,7 @@
           <a:p>
             <a:fld id="{BAD81560-E736-4A3E-98FC-5A2607D45314}" type="datetimeFigureOut">
               <a:rPr lang="en-US" smtClean="0"/>
-              <a:t>5/7/2025</a:t>
+              <a:t>5/17/2025</a:t>
             </a:fld>
             <a:endParaRPr lang="en-US"/>
           </a:p>
@@ -864,7 +864,7 @@
           <a:p>
             <a:fld id="{BAD81560-E736-4A3E-98FC-5A2607D45314}" type="datetimeFigureOut">
               <a:rPr lang="en-US" smtClean="0"/>
-              <a:t>5/7/2025</a:t>
+              <a:t>5/17/2025</a:t>
             </a:fld>
             <a:endParaRPr lang="en-US"/>
           </a:p>
@@ -1139,7 +1139,7 @@
           <a:p>
             <a:fld id="{BAD81560-E736-4A3E-98FC-5A2607D45314}" type="datetimeFigureOut">
               <a:rPr lang="en-US" smtClean="0"/>
-              <a:t>5/7/2025</a:t>
+              <a:t>5/17/2025</a:t>
             </a:fld>
             <a:endParaRPr lang="en-US"/>
           </a:p>
@@ -1404,7 +1404,7 @@
           <a:p>
             <a:fld id="{BAD81560-E736-4A3E-98FC-5A2607D45314}" type="datetimeFigureOut">
               <a:rPr lang="en-US" smtClean="0"/>
-              <a:t>5/7/2025</a:t>
+              <a:t>5/17/2025</a:t>
             </a:fld>
             <a:endParaRPr lang="en-US"/>
           </a:p>
@@ -1816,7 +1816,7 @@
           <a:p>
             <a:fld id="{BAD81560-E736-4A3E-98FC-5A2607D45314}" type="datetimeFigureOut">
               <a:rPr lang="en-US" smtClean="0"/>
-              <a:t>5/7/2025</a:t>
+              <a:t>5/17/2025</a:t>
             </a:fld>
             <a:endParaRPr lang="en-US"/>
           </a:p>
@@ -1957,7 +1957,7 @@
           <a:p>
             <a:fld id="{BAD81560-E736-4A3E-98FC-5A2607D45314}" type="datetimeFigureOut">
               <a:rPr lang="en-US" smtClean="0"/>
-              <a:t>5/7/2025</a:t>
+              <a:t>5/17/2025</a:t>
             </a:fld>
             <a:endParaRPr lang="en-US"/>
           </a:p>
@@ -2070,7 +2070,7 @@
           <a:p>
             <a:fld id="{BAD81560-E736-4A3E-98FC-5A2607D45314}" type="datetimeFigureOut">
               <a:rPr lang="en-US" smtClean="0"/>
-              <a:t>5/7/2025</a:t>
+              <a:t>5/17/2025</a:t>
             </a:fld>
             <a:endParaRPr lang="en-US"/>
           </a:p>
@@ -2381,7 +2381,7 @@
           <a:p>
             <a:fld id="{BAD81560-E736-4A3E-98FC-5A2607D45314}" type="datetimeFigureOut">
               <a:rPr lang="en-US" smtClean="0"/>
-              <a:t>5/7/2025</a:t>
+              <a:t>5/17/2025</a:t>
             </a:fld>
             <a:endParaRPr lang="en-US"/>
           </a:p>
@@ -2669,7 +2669,7 @@
           <a:p>
             <a:fld id="{BAD81560-E736-4A3E-98FC-5A2607D45314}" type="datetimeFigureOut">
               <a:rPr lang="en-US" smtClean="0"/>
-              <a:t>5/7/2025</a:t>
+              <a:t>5/17/2025</a:t>
             </a:fld>
             <a:endParaRPr lang="en-US"/>
           </a:p>
@@ -2910,7 +2910,7 @@
           <a:p>
             <a:fld id="{BAD81560-E736-4A3E-98FC-5A2607D45314}" type="datetimeFigureOut">
               <a:rPr lang="en-US" smtClean="0"/>
-              <a:t>5/7/2025</a:t>
+              <a:t>5/17/2025</a:t>
             </a:fld>
             <a:endParaRPr lang="en-US"/>
           </a:p>
@@ -9881,6 +9881,190 @@
             <a:r>
               <a:rPr lang="en-US" dirty="0"/>
               <a:t>Flare</a:t>
+            </a:r>
+          </a:p>
+        </p:txBody>
+      </p:sp>
+      <p:pic>
+        <p:nvPicPr>
+          <p:cNvPr id="3" name="Picture 2" descr="Container Insights with enhanced observability now available in Amazon ECS  | AWS News Blog">
+            <a:extLst>
+              <a:ext uri="{FF2B5EF4-FFF2-40B4-BE49-F238E27FC236}">
+                <a16:creationId xmlns:a16="http://schemas.microsoft.com/office/drawing/2014/main" id="{2957F40C-B0A6-206C-264C-F0E5B59851C3}"/>
+              </a:ext>
+            </a:extLst>
+          </p:cNvPr>
+          <p:cNvPicPr>
+            <a:picLocks noChangeAspect="1" noChangeArrowheads="1"/>
+          </p:cNvPicPr>
+          <p:nvPr/>
+        </p:nvPicPr>
+        <p:blipFill rotWithShape="1">
+          <a:blip r:embed="rId31">
+            <a:extLst>
+              <a:ext uri="{28A0092B-C50C-407E-A947-70E740481C1C}">
+                <a14:useLocalDpi xmlns:a14="http://schemas.microsoft.com/office/drawing/2010/main" val="0"/>
+              </a:ext>
+            </a:extLst>
+          </a:blip>
+          <a:srcRect l="34773" t="22000" r="34773" b="22000"/>
+          <a:stretch/>
+        </p:blipFill>
+        <p:spPr bwMode="auto">
+          <a:xfrm>
+            <a:off x="10772375" y="2637478"/>
+            <a:ext cx="352751" cy="380346"/>
+          </a:xfrm>
+          <a:prstGeom prst="rect">
+            <a:avLst/>
+          </a:prstGeom>
+          <a:noFill/>
+          <a:extLst>
+            <a:ext uri="{909E8E84-426E-40DD-AFC4-6F175D3DCCD1}">
+              <a14:hiddenFill xmlns:a14="http://schemas.microsoft.com/office/drawing/2010/main">
+                <a:solidFill>
+                  <a:srgbClr val="FFFFFF"/>
+                </a:solidFill>
+              </a14:hiddenFill>
+            </a:ext>
+          </a:extLst>
+        </p:spPr>
+      </p:pic>
+      <p:sp>
+        <p:nvSpPr>
+          <p:cNvPr id="4" name="TextBox 3">
+            <a:extLst>
+              <a:ext uri="{FF2B5EF4-FFF2-40B4-BE49-F238E27FC236}">
+                <a16:creationId xmlns:a16="http://schemas.microsoft.com/office/drawing/2014/main" id="{3EC3518F-E426-3AE4-3CF1-331E2F816FCE}"/>
+              </a:ext>
+            </a:extLst>
+          </p:cNvPr>
+          <p:cNvSpPr txBox="1"/>
+          <p:nvPr/>
+        </p:nvSpPr>
+        <p:spPr>
+          <a:xfrm>
+            <a:off x="10648505" y="2988775"/>
+            <a:ext cx="602660" cy="400110"/>
+          </a:xfrm>
+          <a:prstGeom prst="rect">
+            <a:avLst/>
+          </a:prstGeom>
+          <a:noFill/>
+        </p:spPr>
+        <p:txBody>
+          <a:bodyPr wrap="square" lIns="0" rIns="0" rtlCol="0" anchor="t">
+            <a:spAutoFit/>
+          </a:bodyPr>
+          <a:lstStyle>
+            <a:defPPr>
+              <a:defRPr lang="en-US"/>
+            </a:defPPr>
+            <a:lvl1pPr algn="ctr">
+              <a:defRPr sz="1000">
+                <a:latin typeface="Calibri" panose="020F0502020204030204" pitchFamily="34" charset="0"/>
+                <a:ea typeface="Calibri" panose="020F0502020204030204" pitchFamily="34" charset="0"/>
+                <a:cs typeface="Calibri" panose="020F0502020204030204" pitchFamily="34" charset="0"/>
+              </a:defRPr>
+            </a:lvl1pPr>
+          </a:lstStyle>
+          <a:p>
+            <a:r>
+              <a:rPr lang="en-US" dirty="0"/>
+              <a:t>Container Insights</a:t>
+            </a:r>
+          </a:p>
+        </p:txBody>
+      </p:sp>
+      <p:pic>
+        <p:nvPicPr>
+          <p:cNvPr id="5" name="Picture 4" descr="Aws Sqs icon - Free Download PNG &amp; SVG | Streamline">
+            <a:extLst>
+              <a:ext uri="{FF2B5EF4-FFF2-40B4-BE49-F238E27FC236}">
+                <a16:creationId xmlns:a16="http://schemas.microsoft.com/office/drawing/2014/main" id="{9027F4C3-B291-3BE2-7BC8-9DAF6CDC6740}"/>
+              </a:ext>
+            </a:extLst>
+          </p:cNvPr>
+          <p:cNvPicPr>
+            <a:picLocks noChangeAspect="1" noChangeArrowheads="1"/>
+          </p:cNvPicPr>
+          <p:nvPr/>
+        </p:nvPicPr>
+        <p:blipFill>
+          <a:blip r:embed="rId32">
+            <a:extLst>
+              <a:ext uri="{28A0092B-C50C-407E-A947-70E740481C1C}">
+                <a14:useLocalDpi xmlns:a14="http://schemas.microsoft.com/office/drawing/2010/main" val="0"/>
+              </a:ext>
+            </a:extLst>
+          </a:blip>
+          <a:srcRect/>
+          <a:stretch>
+            <a:fillRect/>
+          </a:stretch>
+        </p:blipFill>
+        <p:spPr bwMode="auto">
+          <a:xfrm>
+            <a:off x="11638305" y="2637478"/>
+            <a:ext cx="352751" cy="385218"/>
+          </a:xfrm>
+          <a:prstGeom prst="rect">
+            <a:avLst/>
+          </a:prstGeom>
+          <a:noFill/>
+          <a:extLst>
+            <a:ext uri="{909E8E84-426E-40DD-AFC4-6F175D3DCCD1}">
+              <a14:hiddenFill xmlns:a14="http://schemas.microsoft.com/office/drawing/2010/main">
+                <a:solidFill>
+                  <a:srgbClr val="FFFFFF"/>
+                </a:solidFill>
+              </a14:hiddenFill>
+            </a:ext>
+          </a:extLst>
+        </p:spPr>
+      </p:pic>
+      <p:sp>
+        <p:nvSpPr>
+          <p:cNvPr id="6" name="TextBox 5">
+            <a:extLst>
+              <a:ext uri="{FF2B5EF4-FFF2-40B4-BE49-F238E27FC236}">
+                <a16:creationId xmlns:a16="http://schemas.microsoft.com/office/drawing/2014/main" id="{25545621-0027-FD78-45FC-3EE058873F72}"/>
+              </a:ext>
+            </a:extLst>
+          </p:cNvPr>
+          <p:cNvSpPr txBox="1"/>
+          <p:nvPr/>
+        </p:nvSpPr>
+        <p:spPr>
+          <a:xfrm>
+            <a:off x="11603161" y="3017824"/>
+            <a:ext cx="423037" cy="246221"/>
+          </a:xfrm>
+          <a:prstGeom prst="rect">
+            <a:avLst/>
+          </a:prstGeom>
+          <a:noFill/>
+        </p:spPr>
+        <p:txBody>
+          <a:bodyPr wrap="square" lIns="0" rIns="0" rtlCol="0">
+            <a:spAutoFit/>
+          </a:bodyPr>
+          <a:lstStyle>
+            <a:defPPr>
+              <a:defRPr lang="en-US"/>
+            </a:defPPr>
+            <a:lvl1pPr algn="ctr">
+              <a:defRPr sz="1000">
+                <a:latin typeface="Calibri" panose="020F0502020204030204" pitchFamily="34" charset="0"/>
+                <a:ea typeface="Calibri" panose="020F0502020204030204" pitchFamily="34" charset="0"/>
+                <a:cs typeface="Calibri" panose="020F0502020204030204" pitchFamily="34" charset="0"/>
+              </a:defRPr>
+            </a:lvl1pPr>
+          </a:lstStyle>
+          <a:p>
+            <a:r>
+              <a:rPr lang="en-US" dirty="0"/>
+              <a:t>SQS</a:t>
             </a:r>
           </a:p>
         </p:txBody>

</xml_diff>

<commit_message>
refactor(secrets): remove unused Secrets Manager code and consolidate IAM policies
- Removed src/aws_secrets.py (unused Secrets Manager module)
- Simplified S3 client to use IAM role credentials directly
- Updated infra/main.tf with scoped IAM policy resources
- Created Phase 0 IAM cleanup documentation in infra/setup/
- Added CHANGELOG.md and copilot-instructions.md
- Consolidated terraform user from 10 to 5 clean policies (terraform-lcf-*)
- All markdown files linted and cleaned
</commit_message>
<xml_diff>
--- a/SolutionArchitecture.pptx
+++ b/SolutionArchitecture.pptx
@@ -199,7 +199,7 @@
           <a:p>
             <a:fld id="{3D8E887A-6233-4CAB-94B9-3010756F85B5}" type="datetimeFigureOut">
               <a:rPr lang="en-US" smtClean="0"/>
-              <a:t>5/29/2025</a:t>
+              <a:t>6/5/2025</a:t>
             </a:fld>
             <a:endParaRPr lang="en-US"/>
           </a:p>
@@ -697,7 +697,7 @@
           <a:p>
             <a:fld id="{BAD81560-E736-4A3E-98FC-5A2607D45314}" type="datetimeFigureOut">
               <a:rPr lang="en-US" smtClean="0"/>
-              <a:t>5/29/2025</a:t>
+              <a:t>6/5/2025</a:t>
             </a:fld>
             <a:endParaRPr lang="en-US"/>
           </a:p>
@@ -895,7 +895,7 @@
           <a:p>
             <a:fld id="{BAD81560-E736-4A3E-98FC-5A2607D45314}" type="datetimeFigureOut">
               <a:rPr lang="en-US" smtClean="0"/>
-              <a:t>5/29/2025</a:t>
+              <a:t>6/5/2025</a:t>
             </a:fld>
             <a:endParaRPr lang="en-US"/>
           </a:p>
@@ -1103,7 +1103,7 @@
           <a:p>
             <a:fld id="{BAD81560-E736-4A3E-98FC-5A2607D45314}" type="datetimeFigureOut">
               <a:rPr lang="en-US" smtClean="0"/>
-              <a:t>5/29/2025</a:t>
+              <a:t>6/5/2025</a:t>
             </a:fld>
             <a:endParaRPr lang="en-US"/>
           </a:p>
@@ -1301,7 +1301,7 @@
           <a:p>
             <a:fld id="{BAD81560-E736-4A3E-98FC-5A2607D45314}" type="datetimeFigureOut">
               <a:rPr lang="en-US" smtClean="0"/>
-              <a:t>5/29/2025</a:t>
+              <a:t>6/5/2025</a:t>
             </a:fld>
             <a:endParaRPr lang="en-US"/>
           </a:p>
@@ -1576,7 +1576,7 @@
           <a:p>
             <a:fld id="{BAD81560-E736-4A3E-98FC-5A2607D45314}" type="datetimeFigureOut">
               <a:rPr lang="en-US" smtClean="0"/>
-              <a:t>5/29/2025</a:t>
+              <a:t>6/5/2025</a:t>
             </a:fld>
             <a:endParaRPr lang="en-US"/>
           </a:p>
@@ -1841,7 +1841,7 @@
           <a:p>
             <a:fld id="{BAD81560-E736-4A3E-98FC-5A2607D45314}" type="datetimeFigureOut">
               <a:rPr lang="en-US" smtClean="0"/>
-              <a:t>5/29/2025</a:t>
+              <a:t>6/5/2025</a:t>
             </a:fld>
             <a:endParaRPr lang="en-US"/>
           </a:p>
@@ -2253,7 +2253,7 @@
           <a:p>
             <a:fld id="{BAD81560-E736-4A3E-98FC-5A2607D45314}" type="datetimeFigureOut">
               <a:rPr lang="en-US" smtClean="0"/>
-              <a:t>5/29/2025</a:t>
+              <a:t>6/5/2025</a:t>
             </a:fld>
             <a:endParaRPr lang="en-US"/>
           </a:p>
@@ -2394,7 +2394,7 @@
           <a:p>
             <a:fld id="{BAD81560-E736-4A3E-98FC-5A2607D45314}" type="datetimeFigureOut">
               <a:rPr lang="en-US" smtClean="0"/>
-              <a:t>5/29/2025</a:t>
+              <a:t>6/5/2025</a:t>
             </a:fld>
             <a:endParaRPr lang="en-US"/>
           </a:p>
@@ -2507,7 +2507,7 @@
           <a:p>
             <a:fld id="{BAD81560-E736-4A3E-98FC-5A2607D45314}" type="datetimeFigureOut">
               <a:rPr lang="en-US" smtClean="0"/>
-              <a:t>5/29/2025</a:t>
+              <a:t>6/5/2025</a:t>
             </a:fld>
             <a:endParaRPr lang="en-US"/>
           </a:p>
@@ -2818,7 +2818,7 @@
           <a:p>
             <a:fld id="{BAD81560-E736-4A3E-98FC-5A2607D45314}" type="datetimeFigureOut">
               <a:rPr lang="en-US" smtClean="0"/>
-              <a:t>5/29/2025</a:t>
+              <a:t>6/5/2025</a:t>
             </a:fld>
             <a:endParaRPr lang="en-US"/>
           </a:p>
@@ -3106,7 +3106,7 @@
           <a:p>
             <a:fld id="{BAD81560-E736-4A3E-98FC-5A2607D45314}" type="datetimeFigureOut">
               <a:rPr lang="en-US" smtClean="0"/>
-              <a:t>5/29/2025</a:t>
+              <a:t>6/5/2025</a:t>
             </a:fld>
             <a:endParaRPr lang="en-US"/>
           </a:p>
@@ -3347,7 +3347,7 @@
           <a:p>
             <a:fld id="{BAD81560-E736-4A3E-98FC-5A2607D45314}" type="datetimeFigureOut">
               <a:rPr lang="en-US" smtClean="0"/>
-              <a:t>5/29/2025</a:t>
+              <a:t>6/5/2025</a:t>
             </a:fld>
             <a:endParaRPr lang="en-US"/>
           </a:p>
@@ -14235,6 +14235,192 @@
           </a:p>
         </p:txBody>
       </p:sp>
+      <p:sp>
+        <p:nvSpPr>
+          <p:cNvPr id="21" name="TextBox 20">
+            <a:extLst>
+              <a:ext uri="{FF2B5EF4-FFF2-40B4-BE49-F238E27FC236}">
+                <a16:creationId xmlns:a16="http://schemas.microsoft.com/office/drawing/2014/main" id="{2CD68F72-269D-0E09-A15D-D94F36E44CA5}"/>
+              </a:ext>
+            </a:extLst>
+          </p:cNvPr>
+          <p:cNvSpPr txBox="1"/>
+          <p:nvPr/>
+        </p:nvSpPr>
+        <p:spPr>
+          <a:xfrm>
+            <a:off x="1164537" y="3933445"/>
+            <a:ext cx="528958" cy="246221"/>
+          </a:xfrm>
+          <a:prstGeom prst="rect">
+            <a:avLst/>
+          </a:prstGeom>
+          <a:noFill/>
+        </p:spPr>
+        <p:txBody>
+          <a:bodyPr wrap="square" lIns="0" rIns="0" rtlCol="0">
+            <a:spAutoFit/>
+          </a:bodyPr>
+          <a:lstStyle>
+            <a:defPPr>
+              <a:defRPr lang="en-US"/>
+            </a:defPPr>
+            <a:lvl1pPr algn="ctr">
+              <a:defRPr sz="1000">
+                <a:latin typeface="Calibri" panose="020F0502020204030204" pitchFamily="34" charset="0"/>
+                <a:ea typeface="Calibri" panose="020F0502020204030204" pitchFamily="34" charset="0"/>
+                <a:cs typeface="Calibri" panose="020F0502020204030204" pitchFamily="34" charset="0"/>
+              </a:defRPr>
+            </a:lvl1pPr>
+          </a:lstStyle>
+          <a:p>
+            <a:r>
+              <a:rPr lang="en-US" dirty="0"/>
+              <a:t>AWS CLI</a:t>
+            </a:r>
+          </a:p>
+        </p:txBody>
+      </p:sp>
+      <p:pic>
+        <p:nvPicPr>
+          <p:cNvPr id="22" name="Picture 4" descr="Download HD Cube - Aws Cli Logo Transparent PNG Image - NicePNG.com">
+            <a:extLst>
+              <a:ext uri="{FF2B5EF4-FFF2-40B4-BE49-F238E27FC236}">
+                <a16:creationId xmlns:a16="http://schemas.microsoft.com/office/drawing/2014/main" id="{5DCE2325-59C0-658D-591D-C42292D9F152}"/>
+              </a:ext>
+            </a:extLst>
+          </p:cNvPr>
+          <p:cNvPicPr>
+            <a:picLocks noChangeAspect="1" noChangeArrowheads="1"/>
+          </p:cNvPicPr>
+          <p:nvPr/>
+        </p:nvPicPr>
+        <p:blipFill>
+          <a:blip r:embed="rId34">
+            <a:extLst>
+              <a:ext uri="{28A0092B-C50C-407E-A947-70E740481C1C}">
+                <a14:useLocalDpi xmlns:a14="http://schemas.microsoft.com/office/drawing/2010/main" val="0"/>
+              </a:ext>
+            </a:extLst>
+          </a:blip>
+          <a:srcRect/>
+          <a:stretch>
+            <a:fillRect/>
+          </a:stretch>
+        </p:blipFill>
+        <p:spPr bwMode="auto">
+          <a:xfrm>
+            <a:off x="1239528" y="3604795"/>
+            <a:ext cx="352751" cy="364708"/>
+          </a:xfrm>
+          <a:prstGeom prst="rect">
+            <a:avLst/>
+          </a:prstGeom>
+          <a:noFill/>
+          <a:extLst>
+            <a:ext uri="{909E8E84-426E-40DD-AFC4-6F175D3DCCD1}">
+              <a14:hiddenFill xmlns:a14="http://schemas.microsoft.com/office/drawing/2010/main">
+                <a:solidFill>
+                  <a:srgbClr val="FFFFFF"/>
+                </a:solidFill>
+              </a14:hiddenFill>
+            </a:ext>
+          </a:extLst>
+        </p:spPr>
+      </p:pic>
+      <p:sp>
+        <p:nvSpPr>
+          <p:cNvPr id="23" name="TextBox 22">
+            <a:extLst>
+              <a:ext uri="{FF2B5EF4-FFF2-40B4-BE49-F238E27FC236}">
+                <a16:creationId xmlns:a16="http://schemas.microsoft.com/office/drawing/2014/main" id="{F07B13C6-49EC-053D-DD44-3A72C4966DF5}"/>
+              </a:ext>
+            </a:extLst>
+          </p:cNvPr>
+          <p:cNvSpPr txBox="1"/>
+          <p:nvPr/>
+        </p:nvSpPr>
+        <p:spPr>
+          <a:xfrm>
+            <a:off x="1866716" y="3933444"/>
+            <a:ext cx="528958" cy="400110"/>
+          </a:xfrm>
+          <a:prstGeom prst="rect">
+            <a:avLst/>
+          </a:prstGeom>
+          <a:noFill/>
+        </p:spPr>
+        <p:txBody>
+          <a:bodyPr wrap="square" lIns="0" rIns="0" rtlCol="0">
+            <a:spAutoFit/>
+          </a:bodyPr>
+          <a:lstStyle>
+            <a:defPPr>
+              <a:defRPr lang="en-US"/>
+            </a:defPPr>
+            <a:lvl1pPr algn="ctr">
+              <a:defRPr sz="1000">
+                <a:latin typeface="Calibri" panose="020F0502020204030204" pitchFamily="34" charset="0"/>
+                <a:ea typeface="Calibri" panose="020F0502020204030204" pitchFamily="34" charset="0"/>
+                <a:cs typeface="Calibri" panose="020F0502020204030204" pitchFamily="34" charset="0"/>
+              </a:defRPr>
+            </a:lvl1pPr>
+          </a:lstStyle>
+          <a:p>
+            <a:r>
+              <a:rPr lang="en-US" dirty="0"/>
+              <a:t>Session Manager</a:t>
+            </a:r>
+          </a:p>
+        </p:txBody>
+      </p:sp>
+      <p:pic>
+        <p:nvPicPr>
+          <p:cNvPr id="25" name="Picture 6" descr="Install amazon-ssm-agent on Linux | Snap Store">
+            <a:extLst>
+              <a:ext uri="{FF2B5EF4-FFF2-40B4-BE49-F238E27FC236}">
+                <a16:creationId xmlns:a16="http://schemas.microsoft.com/office/drawing/2014/main" id="{D18BA270-B3A8-13EF-479D-C604F5272822}"/>
+              </a:ext>
+            </a:extLst>
+          </p:cNvPr>
+          <p:cNvPicPr>
+            <a:picLocks noChangeAspect="1" noChangeArrowheads="1"/>
+          </p:cNvPicPr>
+          <p:nvPr/>
+        </p:nvPicPr>
+        <p:blipFill>
+          <a:blip r:embed="rId35">
+            <a:extLst>
+              <a:ext uri="{28A0092B-C50C-407E-A947-70E740481C1C}">
+                <a14:useLocalDpi xmlns:a14="http://schemas.microsoft.com/office/drawing/2010/main" val="0"/>
+              </a:ext>
+            </a:extLst>
+          </a:blip>
+          <a:srcRect/>
+          <a:stretch>
+            <a:fillRect/>
+          </a:stretch>
+        </p:blipFill>
+        <p:spPr bwMode="auto">
+          <a:xfrm>
+            <a:off x="1948877" y="3589157"/>
+            <a:ext cx="364635" cy="380346"/>
+          </a:xfrm>
+          <a:prstGeom prst="rect">
+            <a:avLst/>
+          </a:prstGeom>
+          <a:noFill/>
+          <a:extLst>
+            <a:ext uri="{909E8E84-426E-40DD-AFC4-6F175D3DCCD1}">
+              <a14:hiddenFill xmlns:a14="http://schemas.microsoft.com/office/drawing/2010/main">
+                <a:solidFill>
+                  <a:srgbClr val="FFFFFF"/>
+                </a:solidFill>
+              </a14:hiddenFill>
+            </a:ext>
+          </a:extLst>
+        </p:spPr>
+      </p:pic>
     </p:spTree>
     <p:extLst>
       <p:ext uri="{BB962C8B-B14F-4D97-AF65-F5344CB8AC3E}">

</xml_diff>